<commit_message>
Fleshed out numpy/scipy in broad strokes
</commit_message>
<xml_diff>
--- a/2016/computing_workgroup/python_modules/python_scientific_modules.pptx
+++ b/2016/computing_workgroup/python_modules/python_scientific_modules.pptx
@@ -5,7 +5,7 @@
     <p:sldMasterId id="2147483648" r:id="rId1"/>
   </p:sldMasterIdLst>
   <p:notesMasterIdLst>
-    <p:notesMasterId r:id="rId21"/>
+    <p:notesMasterId r:id="rId30"/>
   </p:notesMasterIdLst>
   <p:sldIdLst>
     <p:sldId id="256" r:id="rId2"/>
@@ -13,20 +13,29 @@
     <p:sldId id="367" r:id="rId4"/>
     <p:sldId id="354" r:id="rId5"/>
     <p:sldId id="360" r:id="rId6"/>
-    <p:sldId id="361" r:id="rId7"/>
-    <p:sldId id="359" r:id="rId8"/>
-    <p:sldId id="353" r:id="rId9"/>
-    <p:sldId id="358" r:id="rId10"/>
-    <p:sldId id="357" r:id="rId11"/>
-    <p:sldId id="362" r:id="rId12"/>
-    <p:sldId id="363" r:id="rId13"/>
-    <p:sldId id="365" r:id="rId14"/>
-    <p:sldId id="355" r:id="rId15"/>
-    <p:sldId id="364" r:id="rId16"/>
-    <p:sldId id="356" r:id="rId17"/>
-    <p:sldId id="366" r:id="rId18"/>
-    <p:sldId id="339" r:id="rId19"/>
-    <p:sldId id="340" r:id="rId20"/>
+    <p:sldId id="359" r:id="rId7"/>
+    <p:sldId id="353" r:id="rId8"/>
+    <p:sldId id="370" r:id="rId9"/>
+    <p:sldId id="368" r:id="rId10"/>
+    <p:sldId id="381" r:id="rId11"/>
+    <p:sldId id="369" r:id="rId12"/>
+    <p:sldId id="361" r:id="rId13"/>
+    <p:sldId id="373" r:id="rId14"/>
+    <p:sldId id="375" r:id="rId15"/>
+    <p:sldId id="378" r:id="rId16"/>
+    <p:sldId id="379" r:id="rId17"/>
+    <p:sldId id="380" r:id="rId18"/>
+    <p:sldId id="371" r:id="rId19"/>
+    <p:sldId id="358" r:id="rId20"/>
+    <p:sldId id="365" r:id="rId21"/>
+    <p:sldId id="355" r:id="rId22"/>
+    <p:sldId id="339" r:id="rId23"/>
+    <p:sldId id="340" r:id="rId24"/>
+    <p:sldId id="357" r:id="rId25"/>
+    <p:sldId id="362" r:id="rId26"/>
+    <p:sldId id="364" r:id="rId27"/>
+    <p:sldId id="356" r:id="rId28"/>
+    <p:sldId id="366" r:id="rId29"/>
   </p:sldIdLst>
   <p:sldSz cx="9144000" cy="6858000" type="screen4x3"/>
   <p:notesSz cx="6858000" cy="9144000"/>
@@ -128,12 +137,12 @@
   <p:extLst>
     <p:ext uri="{EFAFB233-063F-42B5-8137-9DF3F51BA10A}">
       <p15:sldGuideLst xmlns:p15="http://schemas.microsoft.com/office/powerpoint/2012/main">
-        <p15:guide id="1" orient="horz" pos="2064" userDrawn="1">
+        <p15:guide id="1" orient="horz" pos="2160" userDrawn="1">
           <p15:clr>
             <a:srgbClr val="A4A3A4"/>
           </p15:clr>
         </p15:guide>
-        <p15:guide id="2" pos="2880">
+        <p15:guide id="2" pos="2736" userDrawn="1">
           <p15:clr>
             <a:srgbClr val="A4A3A4"/>
           </p15:clr>
@@ -226,7 +235,7 @@
           <a:p>
             <a:fld id="{6096A192-89F2-44C6-B07F-1B83CE44D511}" type="datetimeFigureOut">
               <a:rPr lang="en-US" smtClean="0"/>
-              <a:t>9/6/2016</a:t>
+              <a:t>9/8/2016</a:t>
             </a:fld>
             <a:endParaRPr lang="en-US"/>
           </a:p>
@@ -787,7 +796,7 @@
           <a:p>
             <a:fld id="{7181039F-CB0C-E14D-A7EF-3BACE2CEF4EA}" type="datetimeFigureOut">
               <a:rPr lang="en-US" smtClean="0"/>
-              <a:t>9/6/2016</a:t>
+              <a:t>9/8/2016</a:t>
             </a:fld>
             <a:endParaRPr lang="en-US"/>
           </a:p>
@@ -1047,7 +1056,7 @@
           <a:p>
             <a:fld id="{7181039F-CB0C-E14D-A7EF-3BACE2CEF4EA}" type="datetimeFigureOut">
               <a:rPr lang="en-US" smtClean="0"/>
-              <a:t>9/6/2016</a:t>
+              <a:t>9/8/2016</a:t>
             </a:fld>
             <a:endParaRPr lang="en-US"/>
           </a:p>
@@ -1312,7 +1321,7 @@
           <a:p>
             <a:fld id="{7181039F-CB0C-E14D-A7EF-3BACE2CEF4EA}" type="datetimeFigureOut">
               <a:rPr lang="en-US" smtClean="0"/>
-              <a:t>9/6/2016</a:t>
+              <a:t>9/8/2016</a:t>
             </a:fld>
             <a:endParaRPr lang="en-US"/>
           </a:p>
@@ -1475,7 +1484,7 @@
           <a:p>
             <a:fld id="{7181039F-CB0C-E14D-A7EF-3BACE2CEF4EA}" type="datetimeFigureOut">
               <a:rPr lang="en-US" smtClean="0"/>
-              <a:t>9/6/2016</a:t>
+              <a:t>9/8/2016</a:t>
             </a:fld>
             <a:endParaRPr lang="en-US"/>
           </a:p>
@@ -1752,7 +1761,7 @@
           <a:p>
             <a:fld id="{7181039F-CB0C-E14D-A7EF-3BACE2CEF4EA}" type="datetimeFigureOut">
               <a:rPr lang="en-US" smtClean="0"/>
-              <a:t>9/6/2016</a:t>
+              <a:t>9/8/2016</a:t>
             </a:fld>
             <a:endParaRPr lang="en-US"/>
           </a:p>
@@ -2011,7 +2020,7 @@
           <a:p>
             <a:fld id="{7181039F-CB0C-E14D-A7EF-3BACE2CEF4EA}" type="datetimeFigureOut">
               <a:rPr lang="en-US" smtClean="0"/>
-              <a:t>9/6/2016</a:t>
+              <a:t>9/8/2016</a:t>
             </a:fld>
             <a:endParaRPr lang="en-US"/>
           </a:p>
@@ -2224,7 +2233,7 @@
           <a:p>
             <a:fld id="{7181039F-CB0C-E14D-A7EF-3BACE2CEF4EA}" type="datetimeFigureOut">
               <a:rPr lang="en-US" smtClean="0"/>
-              <a:t>9/6/2016</a:t>
+              <a:t>9/8/2016</a:t>
             </a:fld>
             <a:endParaRPr lang="en-US"/>
           </a:p>
@@ -2938,7 +2947,7 @@
                 <a:latin typeface="Miriam" panose="020B0502050101010101" pitchFamily="34" charset="-79"/>
                 <a:cs typeface="Miriam" panose="020B0502050101010101" pitchFamily="34" charset="-79"/>
               </a:rPr>
-              <a:t>September 6, 2016</a:t>
+              <a:t>September 8, 2016</a:t>
             </a:fld>
             <a:endParaRPr lang="en-US" sz="1600" dirty="0" smtClean="0">
               <a:latin typeface="Miriam" panose="020B0502050101010101" pitchFamily="34" charset="-79"/>
@@ -3187,15 +3196,15 @@
           <a:p>
             <a:r>
               <a:rPr lang="en-US" dirty="0" smtClean="0"/>
-              <a:t>Symbolic libraries: </a:t>
+              <a:t>Misc. </a:t>
             </a:r>
             <a:r>
               <a:rPr lang="en-US" dirty="0" err="1" smtClean="0"/>
-              <a:t>SymPy</a:t>
-            </a:r>
-            <a:r>
-              <a:rPr lang="en-US" dirty="0" smtClean="0"/>
-              <a:t> / Sage</a:t>
+              <a:t>Numpy</a:t>
+            </a:r>
+            <a:r>
+              <a:rPr lang="en-US" dirty="0" smtClean="0"/>
+              <a:t> tips</a:t>
             </a:r>
             <a:endParaRPr lang="en-US" dirty="0"/>
           </a:p>
@@ -3216,20 +3225,60 @@
           <a:bodyPr/>
           <a:lstStyle/>
           <a:p>
-            <a:endParaRPr lang="en-US"/>
+            <a:r>
+              <a:rPr lang="en-US" dirty="0" smtClean="0"/>
+              <a:t>Division by zero, </a:t>
+            </a:r>
+            <a:r>
+              <a:rPr lang="en-US" dirty="0" err="1" smtClean="0"/>
+              <a:t>inf</a:t>
+            </a:r>
+            <a:r>
+              <a:rPr lang="en-US" dirty="0" smtClean="0"/>
+              <a:t>, </a:t>
+            </a:r>
+            <a:r>
+              <a:rPr lang="en-US" dirty="0" err="1" smtClean="0"/>
+              <a:t>NaN</a:t>
+            </a:r>
+            <a:r>
+              <a:rPr lang="en-US" dirty="0" smtClean="0"/>
+              <a:t>…</a:t>
+            </a:r>
+          </a:p>
+          <a:p>
+            <a:r>
+              <a:rPr lang="en-US" dirty="0" smtClean="0"/>
+              <a:t>Array slicing using </a:t>
+            </a:r>
+            <a:r>
+              <a:rPr lang="en-US" dirty="0" err="1" smtClean="0"/>
+              <a:t>numpy.where</a:t>
+            </a:r>
+            <a:r>
+              <a:rPr lang="en-US" dirty="0" smtClean="0"/>
+              <a:t> etc.</a:t>
+            </a:r>
           </a:p>
         </p:txBody>
       </p:sp>
     </p:spTree>
     <p:extLst>
       <p:ext uri="{BB962C8B-B14F-4D97-AF65-F5344CB8AC3E}">
-        <p14:creationId xmlns:p14="http://schemas.microsoft.com/office/powerpoint/2010/main" val="3261099077"/>
+        <p14:creationId xmlns:p14="http://schemas.microsoft.com/office/powerpoint/2010/main" val="2811285782"/>
       </p:ext>
     </p:extLst>
   </p:cSld>
   <p:clrMapOvr>
     <a:masterClrMapping/>
   </p:clrMapOvr>
+  <p:timing>
+    <p:tnLst>
+      <p:par>
+        <p:cTn id="1" dur="indefinite" restart="never" nodeType="tmRoot"/>
+      </p:par>
+    </p:tnLst>
+  </p:timing>
 </p:sld>
 </file>
 
@@ -3266,12 +3315,16 @@
           <a:lstStyle/>
           <a:p>
             <a:r>
-              <a:rPr lang="en-US" dirty="0"/>
-              <a:t>N</a:t>
-            </a:r>
-            <a:r>
-              <a:rPr lang="en-US" dirty="0" smtClean="0"/>
-              <a:t>ose</a:t>
+              <a:rPr lang="en-US" dirty="0" smtClean="0"/>
+              <a:t>Misc. </a:t>
+            </a:r>
+            <a:r>
+              <a:rPr lang="en-US" dirty="0" err="1" smtClean="0"/>
+              <a:t>Numpy</a:t>
+            </a:r>
+            <a:r>
+              <a:rPr lang="en-US" dirty="0" smtClean="0"/>
+              <a:t> tips</a:t>
             </a:r>
             <a:endParaRPr lang="en-US" dirty="0"/>
           </a:p>
@@ -3287,25 +3340,252 @@
             <p:ph idx="1"/>
           </p:nvPr>
         </p:nvSpPr>
-        <p:spPr/>
+        <p:spPr>
+          <a:xfrm>
+            <a:off x="457200" y="2049270"/>
+            <a:ext cx="8229600" cy="4076893"/>
+          </a:xfrm>
+        </p:spPr>
         <p:txBody>
           <a:bodyPr/>
           <a:lstStyle/>
           <a:p>
-            <a:endParaRPr lang="en-US"/>
+            <a:r>
+              <a:rPr lang="en-US" u="sng" dirty="0" smtClean="0"/>
+              <a:t>Broadcasting</a:t>
+            </a:r>
+            <a:r>
+              <a:rPr lang="en-US" dirty="0" smtClean="0"/>
+              <a:t> allows for operations using arrays of different shape, if they are the same size along one axis.</a:t>
+            </a:r>
+          </a:p>
+          <a:p>
+            <a:pPr lvl="1"/>
+            <a:r>
+              <a:rPr lang="en-US" dirty="0" smtClean="0"/>
+              <a:t>Try: </a:t>
+            </a:r>
+            <a:br>
+              <a:rPr lang="en-US" dirty="0" smtClean="0"/>
+            </a:br>
+            <a:r>
+              <a:rPr lang="en-US" dirty="0" err="1" smtClean="0">
+                <a:solidFill>
+                  <a:schemeClr val="tx2"/>
+                </a:solidFill>
+              </a:rPr>
+              <a:t>np.arange</a:t>
+            </a:r>
+            <a:r>
+              <a:rPr lang="en-US" dirty="0" smtClean="0">
+                <a:solidFill>
+                  <a:schemeClr val="tx2"/>
+                </a:solidFill>
+              </a:rPr>
+              <a:t>(0,5</a:t>
+            </a:r>
+            <a:r>
+              <a:rPr lang="en-US" dirty="0">
+                <a:solidFill>
+                  <a:schemeClr val="tx2"/>
+                </a:solidFill>
+              </a:rPr>
+              <a:t>) * </a:t>
+            </a:r>
+            <a:r>
+              <a:rPr lang="en-US" dirty="0" err="1">
+                <a:solidFill>
+                  <a:schemeClr val="tx2"/>
+                </a:solidFill>
+              </a:rPr>
+              <a:t>np.eye</a:t>
+            </a:r>
+            <a:r>
+              <a:rPr lang="en-US" dirty="0">
+                <a:solidFill>
+                  <a:schemeClr val="tx2"/>
+                </a:solidFill>
+              </a:rPr>
+              <a:t>(10).reshape(20,5</a:t>
+            </a:r>
+            <a:r>
+              <a:rPr lang="en-US" dirty="0" smtClean="0">
+                <a:solidFill>
+                  <a:schemeClr val="tx2"/>
+                </a:solidFill>
+              </a:rPr>
+              <a:t>)</a:t>
+            </a:r>
+          </a:p>
+          <a:p>
+            <a:r>
+              <a:rPr lang="en-US" dirty="0" smtClean="0"/>
+              <a:t>Good write-up </a:t>
+            </a:r>
+            <a:r>
+              <a:rPr lang="en-US" dirty="0"/>
+              <a:t>of broadcasting:</a:t>
+            </a:r>
+            <a:br>
+              <a:rPr lang="en-US" dirty="0"/>
+            </a:br>
+            <a:r>
+              <a:rPr lang="en-US" sz="2000" dirty="0">
+                <a:hlinkClick r:id="rId2"/>
+              </a:rPr>
+              <a:t>http://</a:t>
+            </a:r>
+            <a:r>
+              <a:rPr lang="en-US" sz="2000" dirty="0" smtClean="0">
+                <a:hlinkClick r:id="rId2"/>
+              </a:rPr>
+              <a:t>scipy.github.io/old-wiki/pages/EricsBroadcastingDoc</a:t>
+            </a:r>
+            <a:r>
+              <a:rPr lang="en-US" sz="2000" dirty="0" smtClean="0"/>
+              <a:t> </a:t>
+            </a:r>
           </a:p>
         </p:txBody>
       </p:sp>
     </p:spTree>
     <p:extLst>
       <p:ext uri="{BB962C8B-B14F-4D97-AF65-F5344CB8AC3E}">
-        <p14:creationId xmlns:p14="http://schemas.microsoft.com/office/powerpoint/2010/main" val="3993609276"/>
+        <p14:creationId xmlns:p14="http://schemas.microsoft.com/office/powerpoint/2010/main" val="800882235"/>
       </p:ext>
     </p:extLst>
   </p:cSld>
   <p:clrMapOvr>
     <a:masterClrMapping/>
   </p:clrMapOvr>
+  <p:timing>
+    <p:tnLst>
+      <p:par>
+        <p:cTn id="1" dur="indefinite" restart="never" nodeType="tmRoot">
+          <p:childTnLst>
+            <p:seq concurrent="1" nextAc="seek">
+              <p:cTn id="2" dur="indefinite" nodeType="mainSeq">
+                <p:childTnLst>
+                  <p:par>
+                    <p:cTn id="3" fill="hold">
+                      <p:stCondLst>
+                        <p:cond delay="indefinite"/>
+                      </p:stCondLst>
+                      <p:childTnLst>
+                        <p:par>
+                          <p:cTn id="4" fill="hold">
+                            <p:stCondLst>
+                              <p:cond delay="0"/>
+                            </p:stCondLst>
+                            <p:childTnLst>
+                              <p:par>
+                                <p:cTn id="5" presetID="1" presetClass="entr" presetSubtype="0" fill="hold" nodeType="clickEffect">
+                                  <p:stCondLst>
+                                    <p:cond delay="0"/>
+                                  </p:stCondLst>
+                                  <p:childTnLst>
+                                    <p:set>
+                                      <p:cBhvr>
+                                        <p:cTn id="6" dur="1" fill="hold">
+                                          <p:stCondLst>
+                                            <p:cond delay="0"/>
+                                          </p:stCondLst>
+                                        </p:cTn>
+                                        <p:tgtEl>
+                                          <p:spTgt spid="3">
+                                            <p:txEl>
+                                              <p:pRg st="1" end="1"/>
+                                            </p:txEl>
+                                          </p:spTgt>
+                                        </p:tgtEl>
+                                        <p:attrNameLst>
+                                          <p:attrName>style.visibility</p:attrName>
+                                        </p:attrNameLst>
+                                      </p:cBhvr>
+                                      <p:to>
+                                        <p:strVal val="visible"/>
+                                      </p:to>
+                                    </p:set>
+                                  </p:childTnLst>
+                                </p:cTn>
+                              </p:par>
+                            </p:childTnLst>
+                          </p:cTn>
+                        </p:par>
+                      </p:childTnLst>
+                    </p:cTn>
+                  </p:par>
+                  <p:par>
+                    <p:cTn id="7" fill="hold">
+                      <p:stCondLst>
+                        <p:cond delay="indefinite"/>
+                      </p:stCondLst>
+                      <p:childTnLst>
+                        <p:par>
+                          <p:cTn id="8" fill="hold">
+                            <p:stCondLst>
+                              <p:cond delay="0"/>
+                            </p:stCondLst>
+                            <p:childTnLst>
+                              <p:par>
+                                <p:cTn id="9" presetID="1" presetClass="entr" presetSubtype="0" fill="hold" nodeType="clickEffect">
+                                  <p:stCondLst>
+                                    <p:cond delay="0"/>
+                                  </p:stCondLst>
+                                  <p:childTnLst>
+                                    <p:set>
+                                      <p:cBhvr>
+                                        <p:cTn id="10" dur="1" fill="hold">
+                                          <p:stCondLst>
+                                            <p:cond delay="0"/>
+                                          </p:stCondLst>
+                                        </p:cTn>
+                                        <p:tgtEl>
+                                          <p:spTgt spid="3">
+                                            <p:txEl>
+                                              <p:pRg st="2" end="2"/>
+                                            </p:txEl>
+                                          </p:spTgt>
+                                        </p:tgtEl>
+                                        <p:attrNameLst>
+                                          <p:attrName>style.visibility</p:attrName>
+                                        </p:attrNameLst>
+                                      </p:cBhvr>
+                                      <p:to>
+                                        <p:strVal val="visible"/>
+                                      </p:to>
+                                    </p:set>
+                                  </p:childTnLst>
+                                </p:cTn>
+                              </p:par>
+                            </p:childTnLst>
+                          </p:cTn>
+                        </p:par>
+                      </p:childTnLst>
+                    </p:cTn>
+                  </p:par>
+                </p:childTnLst>
+              </p:cTn>
+              <p:prevCondLst>
+                <p:cond evt="onPrev" delay="0">
+                  <p:tgtEl>
+                    <p:sldTgt/>
+                  </p:tgtEl>
+                </p:cond>
+              </p:prevCondLst>
+              <p:nextCondLst>
+                <p:cond evt="onNext" delay="0">
+                  <p:tgtEl>
+                    <p:sldTgt/>
+                  </p:tgtEl>
+                </p:cond>
+              </p:nextCondLst>
+            </p:seq>
+          </p:childTnLst>
+        </p:cTn>
+      </p:par>
+    </p:tnLst>
+  </p:timing>
 </p:sld>
 </file>
 
@@ -3342,8 +3622,12 @@
           <a:lstStyle/>
           <a:p>
             <a:r>
-              <a:rPr lang="en-US" dirty="0" smtClean="0"/>
-              <a:t>Other libraries of interest</a:t>
+              <a:rPr lang="en-US" dirty="0" err="1" smtClean="0"/>
+              <a:t>SciPy</a:t>
+            </a:r>
+            <a:r>
+              <a:rPr lang="en-US" dirty="0" smtClean="0"/>
+              <a:t> library</a:t>
             </a:r>
             <a:endParaRPr lang="en-US" dirty="0"/>
           </a:p>
@@ -3361,23 +3645,79 @@
         </p:nvSpPr>
         <p:spPr/>
         <p:txBody>
-          <a:bodyPr/>
+          <a:bodyPr>
+            <a:normAutofit/>
+          </a:bodyPr>
           <a:lstStyle/>
           <a:p>
-            <a:endParaRPr lang="en-US"/>
+            <a:r>
+              <a:rPr lang="en-US" dirty="0" smtClean="0"/>
+              <a:t>Where </a:t>
+            </a:r>
+            <a:r>
+              <a:rPr lang="en-US" dirty="0" err="1" smtClean="0"/>
+              <a:t>numpy</a:t>
+            </a:r>
+            <a:r>
+              <a:rPr lang="en-US" dirty="0" smtClean="0"/>
+              <a:t> is all about shuffling arrays…</a:t>
+            </a:r>
+          </a:p>
+          <a:p>
+            <a:pPr marL="0" indent="0">
+              <a:buNone/>
+            </a:pPr>
+            <a:endParaRPr lang="en-US" dirty="0" smtClean="0"/>
+          </a:p>
+          <a:p>
+            <a:r>
+              <a:rPr lang="en-US" dirty="0" smtClean="0"/>
+              <a:t>“</a:t>
+            </a:r>
+            <a:r>
+              <a:rPr lang="en-US" dirty="0" err="1"/>
+              <a:t>SciPy</a:t>
+            </a:r>
+            <a:r>
+              <a:rPr lang="en-US" dirty="0"/>
+              <a:t> is a collection of mathematical algorithms and convenience functions built on the </a:t>
+            </a:r>
+            <a:r>
+              <a:rPr lang="en-US" dirty="0" err="1"/>
+              <a:t>Numpy</a:t>
+            </a:r>
+            <a:r>
+              <a:rPr lang="en-US" dirty="0"/>
+              <a:t> extension of Python</a:t>
+            </a:r>
+            <a:r>
+              <a:rPr lang="en-US" dirty="0" smtClean="0"/>
+              <a:t>.”</a:t>
+            </a:r>
+            <a:endParaRPr lang="en-US" dirty="0" smtClean="0"/>
+          </a:p>
+          <a:p>
+            <a:endParaRPr lang="en-US" dirty="0" smtClean="0"/>
           </a:p>
         </p:txBody>
       </p:sp>
     </p:spTree>
     <p:extLst>
       <p:ext uri="{BB962C8B-B14F-4D97-AF65-F5344CB8AC3E}">
-        <p14:creationId xmlns:p14="http://schemas.microsoft.com/office/powerpoint/2010/main" val="1199928925"/>
+        <p14:creationId xmlns:p14="http://schemas.microsoft.com/office/powerpoint/2010/main" val="3649248177"/>
       </p:ext>
     </p:extLst>
   </p:cSld>
   <p:clrMapOvr>
     <a:masterClrMapping/>
   </p:clrMapOvr>
+  <p:timing>
+    <p:tnLst>
+      <p:par>
+        <p:cTn id="1" dur="indefinite" restart="never" nodeType="tmRoot"/>
+      </p:par>
+    </p:tnLst>
+  </p:timing>
 </p:sld>
 </file>
 
@@ -3414,8 +3754,16 @@
           <a:lstStyle/>
           <a:p>
             <a:r>
-              <a:rPr lang="en-US" dirty="0" smtClean="0"/>
-              <a:t>h5py</a:t>
+              <a:rPr lang="en-US" dirty="0" err="1" smtClean="0"/>
+              <a:t>SciPy</a:t>
+            </a:r>
+            <a:r>
+              <a:rPr lang="en-US" dirty="0" smtClean="0"/>
+              <a:t> </a:t>
+            </a:r>
+            <a:r>
+              <a:rPr lang="en-US" dirty="0" err="1" smtClean="0"/>
+              <a:t>subpackages</a:t>
             </a:r>
             <a:endParaRPr lang="en-US" dirty="0"/>
           </a:p>
@@ -3431,25 +3779,452 @@
             <p:ph idx="1"/>
           </p:nvPr>
         </p:nvSpPr>
-        <p:spPr/>
-        <p:txBody>
-          <a:bodyPr/>
+        <p:spPr>
+          <a:xfrm>
+            <a:off x="457200" y="2049270"/>
+            <a:ext cx="3760259" cy="4076893"/>
+          </a:xfrm>
+        </p:spPr>
+        <p:txBody>
+          <a:bodyPr>
+            <a:normAutofit/>
+          </a:bodyPr>
           <a:lstStyle/>
           <a:p>
-            <a:endParaRPr lang="en-US"/>
-          </a:p>
-        </p:txBody>
-      </p:sp>
+            <a:r>
+              <a:rPr lang="en-US" dirty="0" err="1" smtClean="0"/>
+              <a:t>tl;dr</a:t>
+            </a:r>
+            <a:r>
+              <a:rPr lang="en-US" dirty="0" smtClean="0"/>
+              <a:t> – there are a ton of them!</a:t>
+            </a:r>
+          </a:p>
+          <a:p>
+            <a:r>
+              <a:rPr lang="en-US" dirty="0" smtClean="0"/>
+              <a:t>These are the ones we’ll talk about.</a:t>
+            </a:r>
+            <a:endParaRPr lang="en-US" dirty="0" smtClean="0"/>
+          </a:p>
+        </p:txBody>
+      </p:sp>
+      <p:pic>
+        <p:nvPicPr>
+          <p:cNvPr id="4" name="Picture 3"/>
+          <p:cNvPicPr>
+            <a:picLocks noChangeAspect="1"/>
+          </p:cNvPicPr>
+          <p:nvPr/>
+        </p:nvPicPr>
+        <p:blipFill rotWithShape="1">
+          <a:blip r:embed="rId2"/>
+          <a:srcRect b="5703"/>
+          <a:stretch/>
+        </p:blipFill>
+        <p:spPr>
+          <a:xfrm>
+            <a:off x="4217459" y="1852933"/>
+            <a:ext cx="4638675" cy="4598667"/>
+          </a:xfrm>
+          <a:prstGeom prst="rect">
+            <a:avLst/>
+          </a:prstGeom>
+        </p:spPr>
+      </p:pic>
+      <p:cxnSp>
+        <p:nvCxnSpPr>
+          <p:cNvPr id="13" name="Straight Arrow Connector 12"/>
+          <p:cNvCxnSpPr/>
+          <p:nvPr/>
+        </p:nvCxnSpPr>
+        <p:spPr>
+          <a:xfrm>
+            <a:off x="3886201" y="6079066"/>
+            <a:ext cx="448733" cy="0"/>
+          </a:xfrm>
+          <a:prstGeom prst="straightConnector1">
+            <a:avLst/>
+          </a:prstGeom>
+          <a:ln>
+            <a:solidFill>
+              <a:srgbClr val="500000"/>
+            </a:solidFill>
+            <a:tailEnd type="triangle"/>
+          </a:ln>
+        </p:spPr>
+        <p:style>
+          <a:lnRef idx="2">
+            <a:schemeClr val="accent1"/>
+          </a:lnRef>
+          <a:fillRef idx="0">
+            <a:schemeClr val="accent1"/>
+          </a:fillRef>
+          <a:effectRef idx="1">
+            <a:schemeClr val="accent1"/>
+          </a:effectRef>
+          <a:fontRef idx="minor">
+            <a:schemeClr val="tx1"/>
+          </a:fontRef>
+        </p:style>
+      </p:cxnSp>
+      <p:cxnSp>
+        <p:nvCxnSpPr>
+          <p:cNvPr id="29" name="Straight Arrow Connector 28"/>
+          <p:cNvCxnSpPr/>
+          <p:nvPr/>
+        </p:nvCxnSpPr>
+        <p:spPr>
+          <a:xfrm>
+            <a:off x="3886201" y="5283199"/>
+            <a:ext cx="448733" cy="0"/>
+          </a:xfrm>
+          <a:prstGeom prst="straightConnector1">
+            <a:avLst/>
+          </a:prstGeom>
+          <a:ln>
+            <a:solidFill>
+              <a:srgbClr val="500000"/>
+            </a:solidFill>
+            <a:tailEnd type="triangle"/>
+          </a:ln>
+        </p:spPr>
+        <p:style>
+          <a:lnRef idx="2">
+            <a:schemeClr val="accent1"/>
+          </a:lnRef>
+          <a:fillRef idx="0">
+            <a:schemeClr val="accent1"/>
+          </a:fillRef>
+          <a:effectRef idx="1">
+            <a:schemeClr val="accent1"/>
+          </a:effectRef>
+          <a:fontRef idx="minor">
+            <a:schemeClr val="tx1"/>
+          </a:fontRef>
+        </p:style>
+      </p:cxnSp>
+      <p:cxnSp>
+        <p:nvCxnSpPr>
+          <p:cNvPr id="30" name="Straight Arrow Connector 29"/>
+          <p:cNvCxnSpPr/>
+          <p:nvPr/>
+        </p:nvCxnSpPr>
+        <p:spPr>
+          <a:xfrm>
+            <a:off x="3886201" y="5071532"/>
+            <a:ext cx="448733" cy="0"/>
+          </a:xfrm>
+          <a:prstGeom prst="straightConnector1">
+            <a:avLst/>
+          </a:prstGeom>
+          <a:ln>
+            <a:solidFill>
+              <a:srgbClr val="500000"/>
+            </a:solidFill>
+            <a:tailEnd type="triangle"/>
+          </a:ln>
+        </p:spPr>
+        <p:style>
+          <a:lnRef idx="2">
+            <a:schemeClr val="accent1"/>
+          </a:lnRef>
+          <a:fillRef idx="0">
+            <a:schemeClr val="accent1"/>
+          </a:fillRef>
+          <a:effectRef idx="1">
+            <a:schemeClr val="accent1"/>
+          </a:effectRef>
+          <a:fontRef idx="minor">
+            <a:schemeClr val="tx1"/>
+          </a:fontRef>
+        </p:style>
+      </p:cxnSp>
+      <p:cxnSp>
+        <p:nvCxnSpPr>
+          <p:cNvPr id="31" name="Straight Arrow Connector 30"/>
+          <p:cNvCxnSpPr/>
+          <p:nvPr/>
+        </p:nvCxnSpPr>
+        <p:spPr>
+          <a:xfrm>
+            <a:off x="3886201" y="3691466"/>
+            <a:ext cx="448733" cy="0"/>
+          </a:xfrm>
+          <a:prstGeom prst="straightConnector1">
+            <a:avLst/>
+          </a:prstGeom>
+          <a:ln>
+            <a:solidFill>
+              <a:srgbClr val="500000"/>
+            </a:solidFill>
+            <a:tailEnd type="triangle"/>
+          </a:ln>
+        </p:spPr>
+        <p:style>
+          <a:lnRef idx="2">
+            <a:schemeClr val="accent1"/>
+          </a:lnRef>
+          <a:fillRef idx="0">
+            <a:schemeClr val="accent1"/>
+          </a:fillRef>
+          <a:effectRef idx="1">
+            <a:schemeClr val="accent1"/>
+          </a:effectRef>
+          <a:fontRef idx="minor">
+            <a:schemeClr val="tx1"/>
+          </a:fontRef>
+        </p:style>
+      </p:cxnSp>
     </p:spTree>
     <p:extLst>
       <p:ext uri="{BB962C8B-B14F-4D97-AF65-F5344CB8AC3E}">
-        <p14:creationId xmlns:p14="http://schemas.microsoft.com/office/powerpoint/2010/main" val="2078919648"/>
+        <p14:creationId xmlns:p14="http://schemas.microsoft.com/office/powerpoint/2010/main" val="3053640835"/>
       </p:ext>
     </p:extLst>
   </p:cSld>
   <p:clrMapOvr>
     <a:masterClrMapping/>
   </p:clrMapOvr>
+  <p:timing>
+    <p:tnLst>
+      <p:par>
+        <p:cTn id="1" dur="indefinite" restart="never" nodeType="tmRoot">
+          <p:childTnLst>
+            <p:seq concurrent="1" nextAc="seek">
+              <p:cTn id="2" dur="indefinite" nodeType="mainSeq">
+                <p:childTnLst>
+                  <p:par>
+                    <p:cTn id="3" fill="hold">
+                      <p:stCondLst>
+                        <p:cond delay="indefinite"/>
+                      </p:stCondLst>
+                      <p:childTnLst>
+                        <p:par>
+                          <p:cTn id="4" fill="hold">
+                            <p:stCondLst>
+                              <p:cond delay="0"/>
+                            </p:stCondLst>
+                            <p:childTnLst>
+                              <p:par>
+                                <p:cTn id="5" presetID="1" presetClass="entr" presetSubtype="0" fill="hold" grpId="0" nodeType="clickEffect">
+                                  <p:stCondLst>
+                                    <p:cond delay="0"/>
+                                  </p:stCondLst>
+                                  <p:childTnLst>
+                                    <p:set>
+                                      <p:cBhvr>
+                                        <p:cTn id="6" dur="1" fill="hold">
+                                          <p:stCondLst>
+                                            <p:cond delay="0"/>
+                                          </p:stCondLst>
+                                        </p:cTn>
+                                        <p:tgtEl>
+                                          <p:spTgt spid="3">
+                                            <p:txEl>
+                                              <p:pRg st="0" end="0"/>
+                                            </p:txEl>
+                                          </p:spTgt>
+                                        </p:tgtEl>
+                                        <p:attrNameLst>
+                                          <p:attrName>style.visibility</p:attrName>
+                                        </p:attrNameLst>
+                                      </p:cBhvr>
+                                      <p:to>
+                                        <p:strVal val="visible"/>
+                                      </p:to>
+                                    </p:set>
+                                  </p:childTnLst>
+                                </p:cTn>
+                              </p:par>
+                            </p:childTnLst>
+                          </p:cTn>
+                        </p:par>
+                      </p:childTnLst>
+                    </p:cTn>
+                  </p:par>
+                  <p:par>
+                    <p:cTn id="7" fill="hold">
+                      <p:stCondLst>
+                        <p:cond delay="indefinite"/>
+                      </p:stCondLst>
+                      <p:childTnLst>
+                        <p:par>
+                          <p:cTn id="8" fill="hold">
+                            <p:stCondLst>
+                              <p:cond delay="0"/>
+                            </p:stCondLst>
+                            <p:childTnLst>
+                              <p:par>
+                                <p:cTn id="9" presetID="1" presetClass="entr" presetSubtype="0" fill="hold" grpId="0" nodeType="clickEffect">
+                                  <p:stCondLst>
+                                    <p:cond delay="0"/>
+                                  </p:stCondLst>
+                                  <p:childTnLst>
+                                    <p:set>
+                                      <p:cBhvr>
+                                        <p:cTn id="10" dur="1" fill="hold">
+                                          <p:stCondLst>
+                                            <p:cond delay="0"/>
+                                          </p:stCondLst>
+                                        </p:cTn>
+                                        <p:tgtEl>
+                                          <p:spTgt spid="3">
+                                            <p:txEl>
+                                              <p:pRg st="1" end="1"/>
+                                            </p:txEl>
+                                          </p:spTgt>
+                                        </p:tgtEl>
+                                        <p:attrNameLst>
+                                          <p:attrName>style.visibility</p:attrName>
+                                        </p:attrNameLst>
+                                      </p:cBhvr>
+                                      <p:to>
+                                        <p:strVal val="visible"/>
+                                      </p:to>
+                                    </p:set>
+                                  </p:childTnLst>
+                                </p:cTn>
+                              </p:par>
+                              <p:par>
+                                <p:cTn id="11" presetID="1" presetClass="entr" presetSubtype="0" fill="hold" nodeType="withEffect">
+                                  <p:stCondLst>
+                                    <p:cond delay="0"/>
+                                  </p:stCondLst>
+                                  <p:childTnLst>
+                                    <p:set>
+                                      <p:cBhvr>
+                                        <p:cTn id="12" dur="1" fill="hold">
+                                          <p:stCondLst>
+                                            <p:cond delay="0"/>
+                                          </p:stCondLst>
+                                        </p:cTn>
+                                        <p:tgtEl>
+                                          <p:spTgt spid="13"/>
+                                        </p:tgtEl>
+                                        <p:attrNameLst>
+                                          <p:attrName>style.visibility</p:attrName>
+                                        </p:attrNameLst>
+                                      </p:cBhvr>
+                                      <p:to>
+                                        <p:strVal val="visible"/>
+                                      </p:to>
+                                    </p:set>
+                                  </p:childTnLst>
+                                </p:cTn>
+                              </p:par>
+                              <p:par>
+                                <p:cTn id="13" presetID="1" presetClass="entr" presetSubtype="0" fill="hold" nodeType="withEffect">
+                                  <p:stCondLst>
+                                    <p:cond delay="0"/>
+                                  </p:stCondLst>
+                                  <p:childTnLst>
+                                    <p:set>
+                                      <p:cBhvr>
+                                        <p:cTn id="14" dur="1" fill="hold">
+                                          <p:stCondLst>
+                                            <p:cond delay="0"/>
+                                          </p:stCondLst>
+                                        </p:cTn>
+                                        <p:tgtEl>
+                                          <p:spTgt spid="29"/>
+                                        </p:tgtEl>
+                                        <p:attrNameLst>
+                                          <p:attrName>style.visibility</p:attrName>
+                                        </p:attrNameLst>
+                                      </p:cBhvr>
+                                      <p:to>
+                                        <p:strVal val="visible"/>
+                                      </p:to>
+                                    </p:set>
+                                  </p:childTnLst>
+                                </p:cTn>
+                              </p:par>
+                              <p:par>
+                                <p:cTn id="15" presetID="1" presetClass="entr" presetSubtype="0" fill="hold" nodeType="withEffect">
+                                  <p:stCondLst>
+                                    <p:cond delay="0"/>
+                                  </p:stCondLst>
+                                  <p:childTnLst>
+                                    <p:set>
+                                      <p:cBhvr>
+                                        <p:cTn id="16" dur="1" fill="hold">
+                                          <p:stCondLst>
+                                            <p:cond delay="0"/>
+                                          </p:stCondLst>
+                                        </p:cTn>
+                                        <p:tgtEl>
+                                          <p:spTgt spid="30"/>
+                                        </p:tgtEl>
+                                        <p:attrNameLst>
+                                          <p:attrName>style.visibility</p:attrName>
+                                        </p:attrNameLst>
+                                      </p:cBhvr>
+                                      <p:to>
+                                        <p:strVal val="visible"/>
+                                      </p:to>
+                                    </p:set>
+                                  </p:childTnLst>
+                                </p:cTn>
+                              </p:par>
+                              <p:par>
+                                <p:cTn id="17" presetID="1" presetClass="entr" presetSubtype="0" fill="hold" nodeType="withEffect">
+                                  <p:stCondLst>
+                                    <p:cond delay="0"/>
+                                  </p:stCondLst>
+                                  <p:childTnLst>
+                                    <p:set>
+                                      <p:cBhvr>
+                                        <p:cTn id="18" dur="1" fill="hold">
+                                          <p:stCondLst>
+                                            <p:cond delay="0"/>
+                                          </p:stCondLst>
+                                        </p:cTn>
+                                        <p:tgtEl>
+                                          <p:spTgt spid="31"/>
+                                        </p:tgtEl>
+                                        <p:attrNameLst>
+                                          <p:attrName>style.visibility</p:attrName>
+                                        </p:attrNameLst>
+                                      </p:cBhvr>
+                                      <p:to>
+                                        <p:strVal val="visible"/>
+                                      </p:to>
+                                    </p:set>
+                                  </p:childTnLst>
+                                </p:cTn>
+                              </p:par>
+                            </p:childTnLst>
+                          </p:cTn>
+                        </p:par>
+                      </p:childTnLst>
+                    </p:cTn>
+                  </p:par>
+                </p:childTnLst>
+              </p:cTn>
+              <p:prevCondLst>
+                <p:cond evt="onPrev" delay="0">
+                  <p:tgtEl>
+                    <p:sldTgt/>
+                  </p:tgtEl>
+                </p:cond>
+              </p:prevCondLst>
+              <p:nextCondLst>
+                <p:cond evt="onNext" delay="0">
+                  <p:tgtEl>
+                    <p:sldTgt/>
+                  </p:tgtEl>
+                </p:cond>
+              </p:nextCondLst>
+            </p:seq>
+          </p:childTnLst>
+        </p:cTn>
+      </p:par>
+    </p:tnLst>
+    <p:bldLst>
+      <p:bldP spid="3" grpId="0" build="p"/>
+    </p:bldLst>
+  </p:timing>
 </p:sld>
 </file>
 
@@ -3486,10 +4261,10 @@
           <a:lstStyle/>
           <a:p>
             <a:r>
-              <a:rPr lang="en-US" smtClean="0"/>
-              <a:t>Astropy</a:t>
-            </a:r>
-            <a:endParaRPr lang="en-US"/>
+              <a:rPr lang="en-US" dirty="0" err="1" smtClean="0"/>
+              <a:t>scipy.integrate</a:t>
+            </a:r>
+            <a:endParaRPr lang="en-US" dirty="0"/>
           </a:p>
         </p:txBody>
       </p:sp>
@@ -3505,23 +4280,52 @@
         </p:nvSpPr>
         <p:spPr/>
         <p:txBody>
-          <a:bodyPr/>
+          <a:bodyPr>
+            <a:normAutofit/>
+          </a:bodyPr>
           <a:lstStyle/>
           <a:p>
-            <a:endParaRPr lang="en-US"/>
+            <a:r>
+              <a:rPr lang="en-US" dirty="0" smtClean="0"/>
+              <a:t>Simple example of integration</a:t>
+            </a:r>
+          </a:p>
+          <a:p>
+            <a:r>
+              <a:rPr lang="en-US" dirty="0" smtClean="0"/>
+              <a:t>Brief discussion of options</a:t>
+            </a:r>
+          </a:p>
+          <a:p>
+            <a:r>
+              <a:rPr lang="en-US" dirty="0" smtClean="0"/>
+              <a:t>Special callout of </a:t>
+            </a:r>
+            <a:r>
+              <a:rPr lang="en-US" dirty="0" err="1" smtClean="0"/>
+              <a:t>odeint</a:t>
+            </a:r>
+            <a:endParaRPr lang="en-US" dirty="0" smtClean="0"/>
           </a:p>
         </p:txBody>
       </p:sp>
     </p:spTree>
     <p:extLst>
       <p:ext uri="{BB962C8B-B14F-4D97-AF65-F5344CB8AC3E}">
-        <p14:creationId xmlns:p14="http://schemas.microsoft.com/office/powerpoint/2010/main" val="290858453"/>
+        <p14:creationId xmlns:p14="http://schemas.microsoft.com/office/powerpoint/2010/main" val="2908805790"/>
       </p:ext>
     </p:extLst>
   </p:cSld>
   <p:clrMapOvr>
     <a:masterClrMapping/>
   </p:clrMapOvr>
+  <p:timing>
+    <p:tnLst>
+      <p:par>
+        <p:cTn id="1" dur="indefinite" restart="never" nodeType="tmRoot"/>
+      </p:par>
+    </p:tnLst>
+  </p:timing>
 </p:sld>
 </file>
 
@@ -3558,16 +4362,8 @@
           <a:lstStyle/>
           <a:p>
             <a:r>
-              <a:rPr lang="en-US" dirty="0" smtClean="0"/>
-              <a:t>Profiling (</a:t>
-            </a:r>
-            <a:r>
               <a:rPr lang="en-US" dirty="0" err="1" smtClean="0"/>
-              <a:t>cProfile</a:t>
-            </a:r>
-            <a:r>
-              <a:rPr lang="en-US" dirty="0" smtClean="0"/>
-              <a:t> + ???)</a:t>
+              <a:t>scipy.optimize</a:t>
             </a:r>
             <a:endParaRPr lang="en-US" dirty="0"/>
           </a:p>
@@ -3585,50 +4381,91 @@
         </p:nvSpPr>
         <p:spPr/>
         <p:txBody>
-          <a:bodyPr/>
+          <a:bodyPr>
+            <a:normAutofit/>
+          </a:bodyPr>
           <a:lstStyle/>
           <a:p>
             <a:r>
               <a:rPr lang="en-US" dirty="0" smtClean="0"/>
-              <a:t>If code is slow, the first step to going faster is knowing </a:t>
+              <a:t>Multiple minimization algorithms</a:t>
+            </a:r>
+          </a:p>
+          <a:p>
+            <a:r>
+              <a:rPr lang="en-US" dirty="0" smtClean="0"/>
+              <a:t>Fitting example </a:t>
+            </a:r>
+            <a:r>
+              <a:rPr lang="en-US" dirty="0"/>
+              <a:t>from cookbook:</a:t>
+            </a:r>
+            <a:br>
+              <a:rPr lang="en-US" dirty="0"/>
+            </a:br>
+            <a:r>
+              <a:rPr lang="en-US" sz="1800" dirty="0">
+                <a:hlinkClick r:id="rId2"/>
+              </a:rPr>
+              <a:t>http://</a:t>
+            </a:r>
+            <a:r>
+              <a:rPr lang="en-US" sz="1800" dirty="0" smtClean="0">
+                <a:hlinkClick r:id="rId2"/>
+              </a:rPr>
+              <a:t>scipy-cookbook.readthedocs.io/items/FittingData.html</a:t>
+            </a:r>
+            <a:r>
+              <a:rPr lang="en-US" sz="1800" dirty="0" smtClean="0"/>
+              <a:t> </a:t>
+            </a:r>
+          </a:p>
+          <a:p>
+            <a:r>
+              <a:rPr lang="en-US" dirty="0" smtClean="0"/>
+              <a:t>Optimization is a </a:t>
             </a:r>
             <a:r>
               <a:rPr lang="en-US" u="sng" dirty="0" smtClean="0"/>
-              <a:t>where</a:t>
-            </a:r>
-            <a:r>
-              <a:rPr lang="en-US" dirty="0" smtClean="0"/>
-              <a:t> and then </a:t>
-            </a:r>
-            <a:r>
-              <a:rPr lang="en-US" u="sng" dirty="0" smtClean="0"/>
-              <a:t>why</a:t>
-            </a:r>
-            <a:r>
-              <a:rPr lang="en-US" dirty="0" smtClean="0"/>
-              <a:t> it is slow</a:t>
+              <a:t>very</a:t>
+            </a:r>
+            <a:r>
+              <a:rPr lang="en-US" dirty="0" smtClean="0"/>
+              <a:t> tricky subject, so be careful!</a:t>
             </a:r>
           </a:p>
           <a:p>
             <a:pPr lvl="1"/>
             <a:r>
               <a:rPr lang="en-US" dirty="0" smtClean="0"/>
-              <a:t>You could spend hours optimizing a routine that wasn’t slow to begin with!</a:t>
-            </a:r>
-            <a:endParaRPr lang="en-US" dirty="0"/>
+              <a:t>…but for common problems, this will do well</a:t>
+            </a:r>
+          </a:p>
+          <a:p>
+            <a:r>
+              <a:rPr lang="en-US" dirty="0" smtClean="0"/>
+              <a:t>Non-linear solvers callout</a:t>
+            </a:r>
           </a:p>
         </p:txBody>
       </p:sp>
     </p:spTree>
     <p:extLst>
       <p:ext uri="{BB962C8B-B14F-4D97-AF65-F5344CB8AC3E}">
-        <p14:creationId xmlns:p14="http://schemas.microsoft.com/office/powerpoint/2010/main" val="3572393508"/>
+        <p14:creationId xmlns:p14="http://schemas.microsoft.com/office/powerpoint/2010/main" val="2081694504"/>
       </p:ext>
     </p:extLst>
   </p:cSld>
   <p:clrMapOvr>
     <a:masterClrMapping/>
   </p:clrMapOvr>
+  <p:timing>
+    <p:tnLst>
+      <p:par>
+        <p:cTn id="1" dur="indefinite" restart="never" nodeType="tmRoot"/>
+      </p:par>
+    </p:tnLst>
+  </p:timing>
 </p:sld>
 </file>
 
@@ -3666,7 +4503,7 @@
           <a:p>
             <a:r>
               <a:rPr lang="en-US" dirty="0" err="1" smtClean="0"/>
-              <a:t>Numba</a:t>
+              <a:t>scipy.signal</a:t>
             </a:r>
             <a:endParaRPr lang="en-US" dirty="0"/>
           </a:p>
@@ -3684,59 +4521,71 @@
         </p:nvSpPr>
         <p:spPr/>
         <p:txBody>
-          <a:bodyPr/>
+          <a:bodyPr>
+            <a:normAutofit lnSpcReduction="10000"/>
+          </a:bodyPr>
           <a:lstStyle/>
           <a:p>
             <a:r>
               <a:rPr lang="en-US" dirty="0" smtClean="0"/>
-              <a:t>Going fast, but </a:t>
-            </a:r>
-            <a:r>
-              <a:rPr lang="en-US" u="sng" dirty="0" smtClean="0"/>
-              <a:t>not a cure-all</a:t>
+              <a:t>A variety of tools for splining and filtering of 1D/2D data</a:t>
+            </a:r>
+          </a:p>
+          <a:p>
+            <a:r>
+              <a:rPr lang="en-US" dirty="0" smtClean="0"/>
+              <a:t>Chirp generation</a:t>
             </a:r>
             <a:endParaRPr lang="en-US" dirty="0" smtClean="0"/>
           </a:p>
           <a:p>
             <a:r>
               <a:rPr lang="en-US" dirty="0" smtClean="0"/>
-              <a:t>JIT compilation</a:t>
-            </a:r>
-          </a:p>
-          <a:p>
-            <a:r>
-              <a:rPr lang="en-US" dirty="0" err="1" smtClean="0"/>
-              <a:t>Numpy</a:t>
-            </a:r>
-            <a:r>
-              <a:rPr lang="en-US" dirty="0" smtClean="0"/>
-              <a:t> support</a:t>
-            </a:r>
-            <a:endParaRPr lang="en-US" dirty="0" smtClean="0"/>
-          </a:p>
-          <a:p>
-            <a:r>
-              <a:rPr lang="en-US" dirty="0" err="1" smtClean="0"/>
-              <a:t>Vectorizing</a:t>
-            </a:r>
-            <a:r>
-              <a:rPr lang="en-US" dirty="0" smtClean="0"/>
-              <a:t> functions</a:t>
-            </a:r>
-            <a:endParaRPr lang="en-US" dirty="0"/>
+              <a:t>Low/high/bandpass filter example (see cookbook)</a:t>
+            </a:r>
+          </a:p>
+          <a:p>
+            <a:r>
+              <a:rPr lang="en-US" dirty="0" smtClean="0"/>
+              <a:t>Also of interest is </a:t>
+            </a:r>
+            <a:r>
+              <a:rPr lang="en-US" dirty="0" err="1" smtClean="0">
+                <a:solidFill>
+                  <a:schemeClr val="tx2"/>
+                </a:solidFill>
+              </a:rPr>
+              <a:t>scipy.fftpack</a:t>
+            </a:r>
+            <a:r>
+              <a:rPr lang="en-US" dirty="0" smtClean="0"/>
+              <a:t>, which has FFT / DCT / DST transform implementations.</a:t>
+            </a:r>
+            <a:endParaRPr lang="en-US" dirty="0" smtClean="0">
+              <a:solidFill>
+                <a:schemeClr val="tx2"/>
+              </a:solidFill>
+            </a:endParaRPr>
           </a:p>
         </p:txBody>
       </p:sp>
     </p:spTree>
     <p:extLst>
       <p:ext uri="{BB962C8B-B14F-4D97-AF65-F5344CB8AC3E}">
-        <p14:creationId xmlns:p14="http://schemas.microsoft.com/office/powerpoint/2010/main" val="2362128199"/>
+        <p14:creationId xmlns:p14="http://schemas.microsoft.com/office/powerpoint/2010/main" val="1060536086"/>
       </p:ext>
     </p:extLst>
   </p:cSld>
   <p:clrMapOvr>
     <a:masterClrMapping/>
   </p:clrMapOvr>
+  <p:timing>
+    <p:tnLst>
+      <p:par>
+        <p:cTn id="1" dur="indefinite" restart="never" nodeType="tmRoot"/>
+      </p:par>
+    </p:tnLst>
+  </p:timing>
 </p:sld>
 </file>
 
@@ -3774,7 +4623,7 @@
           <a:p>
             <a:r>
               <a:rPr lang="en-US" dirty="0" err="1" smtClean="0"/>
-              <a:t>Cython</a:t>
+              <a:t>scipy.stats</a:t>
             </a:r>
             <a:endParaRPr lang="en-US" dirty="0"/>
           </a:p>
@@ -3792,23 +4641,60 @@
         </p:nvSpPr>
         <p:spPr/>
         <p:txBody>
-          <a:bodyPr/>
+          <a:bodyPr>
+            <a:normAutofit/>
+          </a:bodyPr>
           <a:lstStyle/>
           <a:p>
-            <a:endParaRPr lang="en-US"/>
+            <a:r>
+              <a:rPr lang="en-US" dirty="0" smtClean="0"/>
+              <a:t>Large number of available distributions for sampling random variables</a:t>
+            </a:r>
+          </a:p>
+          <a:p>
+            <a:r>
+              <a:rPr lang="en-US" dirty="0" smtClean="0"/>
+              <a:t>Some statistical tests, methods</a:t>
+            </a:r>
+          </a:p>
+          <a:p>
+            <a:r>
+              <a:rPr lang="en-US" dirty="0">
+                <a:hlinkClick r:id="rId2"/>
+              </a:rPr>
+              <a:t>http://</a:t>
+            </a:r>
+            <a:r>
+              <a:rPr lang="en-US" dirty="0" smtClean="0">
+                <a:hlinkClick r:id="rId2"/>
+              </a:rPr>
+              <a:t>www.scipy-lectures.org/packages/statistics</a:t>
+            </a:r>
+            <a:r>
+              <a:rPr lang="en-US" dirty="0" smtClean="0"/>
+              <a:t> </a:t>
+            </a:r>
+            <a:endParaRPr lang="en-US" dirty="0" smtClean="0"/>
           </a:p>
         </p:txBody>
       </p:sp>
     </p:spTree>
     <p:extLst>
       <p:ext uri="{BB962C8B-B14F-4D97-AF65-F5344CB8AC3E}">
-        <p14:creationId xmlns:p14="http://schemas.microsoft.com/office/powerpoint/2010/main" val="1811172399"/>
+        <p14:creationId xmlns:p14="http://schemas.microsoft.com/office/powerpoint/2010/main" val="1101753542"/>
       </p:ext>
     </p:extLst>
   </p:cSld>
   <p:clrMapOvr>
     <a:masterClrMapping/>
   </p:clrMapOvr>
+  <p:timing>
+    <p:tnLst>
+      <p:par>
+        <p:cTn id="1" dur="indefinite" restart="never" nodeType="tmRoot"/>
+      </p:par>
+    </p:tnLst>
+  </p:timing>
 </p:sld>
 </file>
 
@@ -3839,28 +4725,90 @@
             <p:ph type="title"/>
           </p:nvPr>
         </p:nvSpPr>
-        <p:spPr>
-          <a:xfrm>
-            <a:off x="457200" y="2874722"/>
-            <a:ext cx="8229600" cy="803756"/>
-          </a:xfrm>
-        </p:spPr>
+        <p:spPr/>
         <p:txBody>
           <a:bodyPr/>
           <a:lstStyle/>
           <a:p>
             <a:r>
-              <a:rPr lang="en-US" dirty="0" smtClean="0"/>
-              <a:t>Thank you!</a:t>
+              <a:rPr lang="en-US" dirty="0" err="1" smtClean="0"/>
+              <a:t>SciPy</a:t>
+            </a:r>
+            <a:r>
+              <a:rPr lang="en-US" dirty="0" smtClean="0"/>
+              <a:t> library</a:t>
             </a:r>
             <a:endParaRPr lang="en-US" dirty="0"/>
+          </a:p>
+        </p:txBody>
+      </p:sp>
+      <p:sp>
+        <p:nvSpPr>
+          <p:cNvPr id="3" name="Content Placeholder 2"/>
+          <p:cNvSpPr>
+            <a:spLocks noGrp="1"/>
+          </p:cNvSpPr>
+          <p:nvPr>
+            <p:ph idx="1"/>
+          </p:nvPr>
+        </p:nvSpPr>
+        <p:spPr/>
+        <p:txBody>
+          <a:bodyPr/>
+          <a:lstStyle/>
+          <a:p>
+            <a:r>
+              <a:rPr lang="en-US" dirty="0"/>
+              <a:t>Tons of </a:t>
+            </a:r>
+            <a:r>
+              <a:rPr lang="en-US" dirty="0" smtClean="0"/>
+              <a:t>examples </a:t>
+            </a:r>
+            <a:r>
+              <a:rPr lang="en-US" dirty="0"/>
+              <a:t>in the cookbook:</a:t>
+            </a:r>
+          </a:p>
+          <a:p>
+            <a:pPr lvl="1"/>
+            <a:r>
+              <a:rPr lang="en-US" sz="2400" dirty="0">
+                <a:hlinkClick r:id="rId2"/>
+              </a:rPr>
+              <a:t>http://scipy-cookbook.readthedocs.io/</a:t>
+            </a:r>
+            <a:r>
+              <a:rPr lang="en-US" sz="2400" dirty="0"/>
+              <a:t> </a:t>
+            </a:r>
+          </a:p>
+          <a:p>
+            <a:r>
+              <a:rPr lang="en-US" dirty="0"/>
+              <a:t>Full documentation:</a:t>
+            </a:r>
+          </a:p>
+          <a:p>
+            <a:pPr lvl="1"/>
+            <a:r>
+              <a:rPr lang="en-US" sz="2400" dirty="0">
+                <a:hlinkClick r:id="rId3"/>
+              </a:rPr>
+              <a:t>http://docs.scipy.org/doc/scipy-0.18.0/reference/</a:t>
+            </a:r>
+            <a:r>
+              <a:rPr lang="en-US" sz="2400" dirty="0"/>
+              <a:t> </a:t>
+            </a:r>
+            <a:endParaRPr lang="en-US" sz="2400" dirty="0"/>
           </a:p>
         </p:txBody>
       </p:sp>
     </p:spTree>
     <p:extLst>
       <p:ext uri="{BB962C8B-B14F-4D97-AF65-F5344CB8AC3E}">
-        <p14:creationId xmlns:p14="http://schemas.microsoft.com/office/powerpoint/2010/main" val="1844849267"/>
+        <p14:creationId xmlns:p14="http://schemas.microsoft.com/office/powerpoint/2010/main" val="1157796221"/>
       </p:ext>
     </p:extLst>
   </p:cSld>
@@ -3911,7 +4859,7 @@
           <a:p>
             <a:r>
               <a:rPr lang="en-US" dirty="0" smtClean="0"/>
-              <a:t>Backup Slides</a:t>
+              <a:t>Pandas</a:t>
             </a:r>
             <a:endParaRPr lang="en-US" dirty="0"/>
           </a:p>
@@ -3932,17 +4880,24 @@
           <a:bodyPr/>
           <a:lstStyle/>
           <a:p>
-            <a:pPr marL="0" indent="0">
-              <a:buNone/>
-            </a:pPr>
-            <a:endParaRPr lang="en-US" dirty="0"/>
+            <a:r>
+              <a:rPr lang="en-US" dirty="0" smtClean="0"/>
+              <a:t>Basic structure: data frame</a:t>
+            </a:r>
+          </a:p>
+          <a:p>
+            <a:r>
+              <a:rPr lang="en-US" dirty="0" smtClean="0"/>
+              <a:t>Like R, but in Python!</a:t>
+            </a:r>
+            <a:endParaRPr lang="en-US" dirty="0" smtClean="0"/>
           </a:p>
         </p:txBody>
       </p:sp>
     </p:spTree>
     <p:extLst>
       <p:ext uri="{BB962C8B-B14F-4D97-AF65-F5344CB8AC3E}">
-        <p14:creationId xmlns:p14="http://schemas.microsoft.com/office/powerpoint/2010/main" val="1589961851"/>
+        <p14:creationId xmlns:p14="http://schemas.microsoft.com/office/powerpoint/2010/main" val="3516584271"/>
       </p:ext>
     </p:extLst>
   </p:cSld>
@@ -4067,9 +5022,44 @@
             </a:r>
             <a:r>
               <a:rPr lang="en-US" dirty="0" smtClean="0"/>
-              <a:t>, VTK</a:t>
-            </a:r>
-            <a:endParaRPr lang="en-US" dirty="0"/>
+              <a:t>, </a:t>
+            </a:r>
+            <a:r>
+              <a:rPr lang="en-US" dirty="0" smtClean="0"/>
+              <a:t>VTK</a:t>
+            </a:r>
+          </a:p>
+          <a:p>
+            <a:r>
+              <a:rPr lang="en-US" dirty="0" smtClean="0"/>
+              <a:t>We </a:t>
+            </a:r>
+            <a:r>
+              <a:rPr lang="en-US" u="sng" dirty="0" smtClean="0"/>
+              <a:t>will</a:t>
+            </a:r>
+            <a:r>
+              <a:rPr lang="en-US" dirty="0"/>
+              <a:t> </a:t>
+            </a:r>
+            <a:r>
+              <a:rPr lang="en-US" dirty="0" smtClean="0"/>
+              <a:t>discuss libraries that make computational tasks easier.</a:t>
+            </a:r>
+          </a:p>
+          <a:p>
+            <a:r>
+              <a:rPr lang="en-US" dirty="0" smtClean="0"/>
+              <a:t>There’s a </a:t>
+            </a:r>
+            <a:r>
+              <a:rPr lang="en-US" u="sng" dirty="0" smtClean="0"/>
+              <a:t>lot</a:t>
+            </a:r>
+            <a:r>
+              <a:rPr lang="en-US" dirty="0" smtClean="0"/>
+              <a:t> more to cover than we have time for, so see the accompanying notes on GitHub</a:t>
+            </a:r>
           </a:p>
         </p:txBody>
       </p:sp>
@@ -4077,6 +5067,913 @@
     <p:extLst>
       <p:ext uri="{BB962C8B-B14F-4D97-AF65-F5344CB8AC3E}">
         <p14:creationId xmlns:p14="http://schemas.microsoft.com/office/powerpoint/2010/main" val="239801139"/>
+      </p:ext>
+    </p:extLst>
+  </p:cSld>
+  <p:clrMapOvr>
+    <a:masterClrMapping/>
+  </p:clrMapOvr>
+  <p:timing>
+    <p:tnLst>
+      <p:par>
+        <p:cTn id="1" dur="indefinite" restart="never" nodeType="tmRoot">
+          <p:childTnLst>
+            <p:seq concurrent="1" nextAc="seek">
+              <p:cTn id="2" dur="indefinite" nodeType="mainSeq">
+                <p:childTnLst>
+                  <p:par>
+                    <p:cTn id="3" fill="hold">
+                      <p:stCondLst>
+                        <p:cond delay="indefinite"/>
+                      </p:stCondLst>
+                      <p:childTnLst>
+                        <p:par>
+                          <p:cTn id="4" fill="hold">
+                            <p:stCondLst>
+                              <p:cond delay="0"/>
+                            </p:stCondLst>
+                            <p:childTnLst>
+                              <p:par>
+                                <p:cTn id="5" presetID="1" presetClass="entr" presetSubtype="0" fill="hold" nodeType="clickEffect">
+                                  <p:stCondLst>
+                                    <p:cond delay="0"/>
+                                  </p:stCondLst>
+                                  <p:childTnLst>
+                                    <p:set>
+                                      <p:cBhvr>
+                                        <p:cTn id="6" dur="1" fill="hold">
+                                          <p:stCondLst>
+                                            <p:cond delay="0"/>
+                                          </p:stCondLst>
+                                        </p:cTn>
+                                        <p:tgtEl>
+                                          <p:spTgt spid="3">
+                                            <p:txEl>
+                                              <p:pRg st="2" end="2"/>
+                                            </p:txEl>
+                                          </p:spTgt>
+                                        </p:tgtEl>
+                                        <p:attrNameLst>
+                                          <p:attrName>style.visibility</p:attrName>
+                                        </p:attrNameLst>
+                                      </p:cBhvr>
+                                      <p:to>
+                                        <p:strVal val="visible"/>
+                                      </p:to>
+                                    </p:set>
+                                  </p:childTnLst>
+                                </p:cTn>
+                              </p:par>
+                            </p:childTnLst>
+                          </p:cTn>
+                        </p:par>
+                      </p:childTnLst>
+                    </p:cTn>
+                  </p:par>
+                  <p:par>
+                    <p:cTn id="7" fill="hold">
+                      <p:stCondLst>
+                        <p:cond delay="indefinite"/>
+                      </p:stCondLst>
+                      <p:childTnLst>
+                        <p:par>
+                          <p:cTn id="8" fill="hold">
+                            <p:stCondLst>
+                              <p:cond delay="0"/>
+                            </p:stCondLst>
+                            <p:childTnLst>
+                              <p:par>
+                                <p:cTn id="9" presetID="1" presetClass="entr" presetSubtype="0" fill="hold" nodeType="clickEffect">
+                                  <p:stCondLst>
+                                    <p:cond delay="0"/>
+                                  </p:stCondLst>
+                                  <p:childTnLst>
+                                    <p:set>
+                                      <p:cBhvr>
+                                        <p:cTn id="10" dur="1" fill="hold">
+                                          <p:stCondLst>
+                                            <p:cond delay="0"/>
+                                          </p:stCondLst>
+                                        </p:cTn>
+                                        <p:tgtEl>
+                                          <p:spTgt spid="3">
+                                            <p:txEl>
+                                              <p:pRg st="3" end="3"/>
+                                            </p:txEl>
+                                          </p:spTgt>
+                                        </p:tgtEl>
+                                        <p:attrNameLst>
+                                          <p:attrName>style.visibility</p:attrName>
+                                        </p:attrNameLst>
+                                      </p:cBhvr>
+                                      <p:to>
+                                        <p:strVal val="visible"/>
+                                      </p:to>
+                                    </p:set>
+                                  </p:childTnLst>
+                                </p:cTn>
+                              </p:par>
+                            </p:childTnLst>
+                          </p:cTn>
+                        </p:par>
+                      </p:childTnLst>
+                    </p:cTn>
+                  </p:par>
+                </p:childTnLst>
+              </p:cTn>
+              <p:prevCondLst>
+                <p:cond evt="onPrev" delay="0">
+                  <p:tgtEl>
+                    <p:sldTgt/>
+                  </p:tgtEl>
+                </p:cond>
+              </p:prevCondLst>
+              <p:nextCondLst>
+                <p:cond evt="onNext" delay="0">
+                  <p:tgtEl>
+                    <p:sldTgt/>
+                  </p:tgtEl>
+                </p:cond>
+              </p:nextCondLst>
+            </p:seq>
+          </p:childTnLst>
+        </p:cTn>
+      </p:par>
+    </p:tnLst>
+  </p:timing>
+</p:sld>
+</file>
+
+<file path=ppt/slides/slide20.xml><?xml version="1.0" encoding="utf-8"?>
+<p:sld xmlns:a="http://schemas.openxmlformats.org/drawingml/2006/main" xmlns:r="http://schemas.openxmlformats.org/officeDocument/2006/relationships" xmlns:p="http://schemas.openxmlformats.org/presentationml/2006/main">
+  <p:cSld>
+    <p:spTree>
+      <p:nvGrpSpPr>
+        <p:cNvPr id="1" name=""/>
+        <p:cNvGrpSpPr/>
+        <p:nvPr/>
+      </p:nvGrpSpPr>
+      <p:grpSpPr>
+        <a:xfrm>
+          <a:off x="0" y="0"/>
+          <a:ext cx="0" cy="0"/>
+          <a:chOff x="0" y="0"/>
+          <a:chExt cx="0" cy="0"/>
+        </a:xfrm>
+      </p:grpSpPr>
+      <p:sp>
+        <p:nvSpPr>
+          <p:cNvPr id="2" name="Title 1"/>
+          <p:cNvSpPr>
+            <a:spLocks noGrp="1"/>
+          </p:cNvSpPr>
+          <p:nvPr>
+            <p:ph type="title"/>
+          </p:nvPr>
+        </p:nvSpPr>
+        <p:spPr/>
+        <p:txBody>
+          <a:bodyPr/>
+          <a:lstStyle/>
+          <a:p>
+            <a:r>
+              <a:rPr lang="en-US" dirty="0" smtClean="0"/>
+              <a:t>h5py</a:t>
+            </a:r>
+            <a:endParaRPr lang="en-US" dirty="0"/>
+          </a:p>
+        </p:txBody>
+      </p:sp>
+      <p:sp>
+        <p:nvSpPr>
+          <p:cNvPr id="3" name="Content Placeholder 2"/>
+          <p:cNvSpPr>
+            <a:spLocks noGrp="1"/>
+          </p:cNvSpPr>
+          <p:nvPr>
+            <p:ph idx="1"/>
+          </p:nvPr>
+        </p:nvSpPr>
+        <p:spPr/>
+        <p:txBody>
+          <a:bodyPr/>
+          <a:lstStyle/>
+          <a:p>
+            <a:endParaRPr lang="en-US"/>
+          </a:p>
+        </p:txBody>
+      </p:sp>
+    </p:spTree>
+    <p:extLst>
+      <p:ext uri="{BB962C8B-B14F-4D97-AF65-F5344CB8AC3E}">
+        <p14:creationId xmlns:p14="http://schemas.microsoft.com/office/powerpoint/2010/main" val="2078919648"/>
+      </p:ext>
+    </p:extLst>
+  </p:cSld>
+  <p:clrMapOvr>
+    <a:masterClrMapping/>
+  </p:clrMapOvr>
+  <p:timing>
+    <p:tnLst>
+      <p:par>
+        <p:cTn id="1" dur="indefinite" restart="never" nodeType="tmRoot"/>
+      </p:par>
+    </p:tnLst>
+  </p:timing>
+</p:sld>
+</file>
+
+<file path=ppt/slides/slide21.xml><?xml version="1.0" encoding="utf-8"?>
+<p:sld xmlns:a="http://schemas.openxmlformats.org/drawingml/2006/main" xmlns:r="http://schemas.openxmlformats.org/officeDocument/2006/relationships" xmlns:p="http://schemas.openxmlformats.org/presentationml/2006/main">
+  <p:cSld>
+    <p:spTree>
+      <p:nvGrpSpPr>
+        <p:cNvPr id="1" name=""/>
+        <p:cNvGrpSpPr/>
+        <p:nvPr/>
+      </p:nvGrpSpPr>
+      <p:grpSpPr>
+        <a:xfrm>
+          <a:off x="0" y="0"/>
+          <a:ext cx="0" cy="0"/>
+          <a:chOff x="0" y="0"/>
+          <a:chExt cx="0" cy="0"/>
+        </a:xfrm>
+      </p:grpSpPr>
+      <p:sp>
+        <p:nvSpPr>
+          <p:cNvPr id="2" name="Title 1"/>
+          <p:cNvSpPr>
+            <a:spLocks noGrp="1"/>
+          </p:cNvSpPr>
+          <p:nvPr>
+            <p:ph type="title"/>
+          </p:nvPr>
+        </p:nvSpPr>
+        <p:spPr/>
+        <p:txBody>
+          <a:bodyPr/>
+          <a:lstStyle/>
+          <a:p>
+            <a:r>
+              <a:rPr lang="en-US" smtClean="0"/>
+              <a:t>Astropy</a:t>
+            </a:r>
+            <a:endParaRPr lang="en-US"/>
+          </a:p>
+        </p:txBody>
+      </p:sp>
+      <p:sp>
+        <p:nvSpPr>
+          <p:cNvPr id="3" name="Content Placeholder 2"/>
+          <p:cNvSpPr>
+            <a:spLocks noGrp="1"/>
+          </p:cNvSpPr>
+          <p:nvPr>
+            <p:ph idx="1"/>
+          </p:nvPr>
+        </p:nvSpPr>
+        <p:spPr/>
+        <p:txBody>
+          <a:bodyPr/>
+          <a:lstStyle/>
+          <a:p>
+            <a:r>
+              <a:rPr lang="en-US" dirty="0" smtClean="0"/>
+              <a:t>Leo?</a:t>
+            </a:r>
+            <a:endParaRPr lang="en-US" dirty="0"/>
+          </a:p>
+        </p:txBody>
+      </p:sp>
+    </p:spTree>
+    <p:extLst>
+      <p:ext uri="{BB962C8B-B14F-4D97-AF65-F5344CB8AC3E}">
+        <p14:creationId xmlns:p14="http://schemas.microsoft.com/office/powerpoint/2010/main" val="290858453"/>
+      </p:ext>
+    </p:extLst>
+  </p:cSld>
+  <p:clrMapOvr>
+    <a:masterClrMapping/>
+  </p:clrMapOvr>
+  <p:timing>
+    <p:tnLst>
+      <p:par>
+        <p:cTn id="1" dur="indefinite" restart="never" nodeType="tmRoot"/>
+      </p:par>
+    </p:tnLst>
+  </p:timing>
+</p:sld>
+</file>
+
+<file path=ppt/slides/slide22.xml><?xml version="1.0" encoding="utf-8"?>
+<p:sld xmlns:a="http://schemas.openxmlformats.org/drawingml/2006/main" xmlns:r="http://schemas.openxmlformats.org/officeDocument/2006/relationships" xmlns:p="http://schemas.openxmlformats.org/presentationml/2006/main">
+  <p:cSld>
+    <p:spTree>
+      <p:nvGrpSpPr>
+        <p:cNvPr id="1" name=""/>
+        <p:cNvGrpSpPr/>
+        <p:nvPr/>
+      </p:nvGrpSpPr>
+      <p:grpSpPr>
+        <a:xfrm>
+          <a:off x="0" y="0"/>
+          <a:ext cx="0" cy="0"/>
+          <a:chOff x="0" y="0"/>
+          <a:chExt cx="0" cy="0"/>
+        </a:xfrm>
+      </p:grpSpPr>
+      <p:sp>
+        <p:nvSpPr>
+          <p:cNvPr id="2" name="Title 1"/>
+          <p:cNvSpPr>
+            <a:spLocks noGrp="1"/>
+          </p:cNvSpPr>
+          <p:nvPr>
+            <p:ph type="title"/>
+          </p:nvPr>
+        </p:nvSpPr>
+        <p:spPr>
+          <a:xfrm>
+            <a:off x="457200" y="2874722"/>
+            <a:ext cx="8229600" cy="803756"/>
+          </a:xfrm>
+        </p:spPr>
+        <p:txBody>
+          <a:bodyPr/>
+          <a:lstStyle/>
+          <a:p>
+            <a:r>
+              <a:rPr lang="en-US" dirty="0" smtClean="0"/>
+              <a:t>Thank you!</a:t>
+            </a:r>
+            <a:endParaRPr lang="en-US" dirty="0"/>
+          </a:p>
+        </p:txBody>
+      </p:sp>
+    </p:spTree>
+    <p:extLst>
+      <p:ext uri="{BB962C8B-B14F-4D97-AF65-F5344CB8AC3E}">
+        <p14:creationId xmlns:p14="http://schemas.microsoft.com/office/powerpoint/2010/main" val="1844849267"/>
+      </p:ext>
+    </p:extLst>
+  </p:cSld>
+  <p:clrMapOvr>
+    <a:masterClrMapping/>
+  </p:clrMapOvr>
+  <p:timing>
+    <p:tnLst>
+      <p:par>
+        <p:cTn id="1" dur="indefinite" restart="never" nodeType="tmRoot"/>
+      </p:par>
+    </p:tnLst>
+  </p:timing>
+</p:sld>
+</file>
+
+<file path=ppt/slides/slide23.xml><?xml version="1.0" encoding="utf-8"?>
+<p:sld xmlns:a="http://schemas.openxmlformats.org/drawingml/2006/main" xmlns:r="http://schemas.openxmlformats.org/officeDocument/2006/relationships" xmlns:p="http://schemas.openxmlformats.org/presentationml/2006/main">
+  <p:cSld>
+    <p:spTree>
+      <p:nvGrpSpPr>
+        <p:cNvPr id="1" name=""/>
+        <p:cNvGrpSpPr/>
+        <p:nvPr/>
+      </p:nvGrpSpPr>
+      <p:grpSpPr>
+        <a:xfrm>
+          <a:off x="0" y="0"/>
+          <a:ext cx="0" cy="0"/>
+          <a:chOff x="0" y="0"/>
+          <a:chExt cx="0" cy="0"/>
+        </a:xfrm>
+      </p:grpSpPr>
+      <p:sp>
+        <p:nvSpPr>
+          <p:cNvPr id="2" name="Title 1"/>
+          <p:cNvSpPr>
+            <a:spLocks noGrp="1"/>
+          </p:cNvSpPr>
+          <p:nvPr>
+            <p:ph type="title"/>
+          </p:nvPr>
+        </p:nvSpPr>
+        <p:spPr/>
+        <p:txBody>
+          <a:bodyPr/>
+          <a:lstStyle/>
+          <a:p>
+            <a:r>
+              <a:rPr lang="en-US" dirty="0" smtClean="0"/>
+              <a:t>Backup Slides</a:t>
+            </a:r>
+            <a:endParaRPr lang="en-US" dirty="0"/>
+          </a:p>
+        </p:txBody>
+      </p:sp>
+      <p:sp>
+        <p:nvSpPr>
+          <p:cNvPr id="3" name="Content Placeholder 2"/>
+          <p:cNvSpPr>
+            <a:spLocks noGrp="1"/>
+          </p:cNvSpPr>
+          <p:nvPr>
+            <p:ph idx="1"/>
+          </p:nvPr>
+        </p:nvSpPr>
+        <p:spPr/>
+        <p:txBody>
+          <a:bodyPr/>
+          <a:lstStyle/>
+          <a:p>
+            <a:pPr marL="0" indent="0">
+              <a:buNone/>
+            </a:pPr>
+            <a:endParaRPr lang="en-US" dirty="0"/>
+          </a:p>
+        </p:txBody>
+      </p:sp>
+    </p:spTree>
+    <p:extLst>
+      <p:ext uri="{BB962C8B-B14F-4D97-AF65-F5344CB8AC3E}">
+        <p14:creationId xmlns:p14="http://schemas.microsoft.com/office/powerpoint/2010/main" val="1589961851"/>
+      </p:ext>
+    </p:extLst>
+  </p:cSld>
+  <p:clrMapOvr>
+    <a:masterClrMapping/>
+  </p:clrMapOvr>
+  <p:timing>
+    <p:tnLst>
+      <p:par>
+        <p:cTn id="1" dur="indefinite" restart="never" nodeType="tmRoot"/>
+      </p:par>
+    </p:tnLst>
+  </p:timing>
+</p:sld>
+</file>
+
+<file path=ppt/slides/slide24.xml><?xml version="1.0" encoding="utf-8"?>
+<p:sld xmlns:a="http://schemas.openxmlformats.org/drawingml/2006/main" xmlns:r="http://schemas.openxmlformats.org/officeDocument/2006/relationships" xmlns:p="http://schemas.openxmlformats.org/presentationml/2006/main">
+  <p:cSld>
+    <p:spTree>
+      <p:nvGrpSpPr>
+        <p:cNvPr id="1" name=""/>
+        <p:cNvGrpSpPr/>
+        <p:nvPr/>
+      </p:nvGrpSpPr>
+      <p:grpSpPr>
+        <a:xfrm>
+          <a:off x="0" y="0"/>
+          <a:ext cx="0" cy="0"/>
+          <a:chOff x="0" y="0"/>
+          <a:chExt cx="0" cy="0"/>
+        </a:xfrm>
+      </p:grpSpPr>
+      <p:sp>
+        <p:nvSpPr>
+          <p:cNvPr id="2" name="Title 1"/>
+          <p:cNvSpPr>
+            <a:spLocks noGrp="1"/>
+          </p:cNvSpPr>
+          <p:nvPr>
+            <p:ph type="title"/>
+          </p:nvPr>
+        </p:nvSpPr>
+        <p:spPr/>
+        <p:txBody>
+          <a:bodyPr/>
+          <a:lstStyle/>
+          <a:p>
+            <a:r>
+              <a:rPr lang="en-US" dirty="0" smtClean="0"/>
+              <a:t>Symbolic libraries: </a:t>
+            </a:r>
+            <a:r>
+              <a:rPr lang="en-US" dirty="0" err="1" smtClean="0"/>
+              <a:t>SymPy</a:t>
+            </a:r>
+            <a:r>
+              <a:rPr lang="en-US" dirty="0" smtClean="0"/>
+              <a:t> / Sage</a:t>
+            </a:r>
+            <a:endParaRPr lang="en-US" dirty="0"/>
+          </a:p>
+        </p:txBody>
+      </p:sp>
+      <p:sp>
+        <p:nvSpPr>
+          <p:cNvPr id="3" name="Content Placeholder 2"/>
+          <p:cNvSpPr>
+            <a:spLocks noGrp="1"/>
+          </p:cNvSpPr>
+          <p:nvPr>
+            <p:ph idx="1"/>
+          </p:nvPr>
+        </p:nvSpPr>
+        <p:spPr/>
+        <p:txBody>
+          <a:bodyPr/>
+          <a:lstStyle/>
+          <a:p>
+            <a:endParaRPr lang="en-US"/>
+          </a:p>
+        </p:txBody>
+      </p:sp>
+    </p:spTree>
+    <p:extLst>
+      <p:ext uri="{BB962C8B-B14F-4D97-AF65-F5344CB8AC3E}">
+        <p14:creationId xmlns:p14="http://schemas.microsoft.com/office/powerpoint/2010/main" val="3261099077"/>
+      </p:ext>
+    </p:extLst>
+  </p:cSld>
+  <p:clrMapOvr>
+    <a:masterClrMapping/>
+  </p:clrMapOvr>
+  <p:timing>
+    <p:tnLst>
+      <p:par>
+        <p:cTn id="1" dur="indefinite" restart="never" nodeType="tmRoot"/>
+      </p:par>
+    </p:tnLst>
+  </p:timing>
+</p:sld>
+</file>
+
+<file path=ppt/slides/slide25.xml><?xml version="1.0" encoding="utf-8"?>
+<p:sld xmlns:a="http://schemas.openxmlformats.org/drawingml/2006/main" xmlns:r="http://schemas.openxmlformats.org/officeDocument/2006/relationships" xmlns:p="http://schemas.openxmlformats.org/presentationml/2006/main">
+  <p:cSld>
+    <p:spTree>
+      <p:nvGrpSpPr>
+        <p:cNvPr id="1" name=""/>
+        <p:cNvGrpSpPr/>
+        <p:nvPr/>
+      </p:nvGrpSpPr>
+      <p:grpSpPr>
+        <a:xfrm>
+          <a:off x="0" y="0"/>
+          <a:ext cx="0" cy="0"/>
+          <a:chOff x="0" y="0"/>
+          <a:chExt cx="0" cy="0"/>
+        </a:xfrm>
+      </p:grpSpPr>
+      <p:sp>
+        <p:nvSpPr>
+          <p:cNvPr id="2" name="Title 1"/>
+          <p:cNvSpPr>
+            <a:spLocks noGrp="1"/>
+          </p:cNvSpPr>
+          <p:nvPr>
+            <p:ph type="title"/>
+          </p:nvPr>
+        </p:nvSpPr>
+        <p:spPr/>
+        <p:txBody>
+          <a:bodyPr/>
+          <a:lstStyle/>
+          <a:p>
+            <a:r>
+              <a:rPr lang="en-US" dirty="0"/>
+              <a:t>N</a:t>
+            </a:r>
+            <a:r>
+              <a:rPr lang="en-US" dirty="0" smtClean="0"/>
+              <a:t>ose</a:t>
+            </a:r>
+            <a:endParaRPr lang="en-US" dirty="0"/>
+          </a:p>
+        </p:txBody>
+      </p:sp>
+      <p:sp>
+        <p:nvSpPr>
+          <p:cNvPr id="3" name="Content Placeholder 2"/>
+          <p:cNvSpPr>
+            <a:spLocks noGrp="1"/>
+          </p:cNvSpPr>
+          <p:nvPr>
+            <p:ph idx="1"/>
+          </p:nvPr>
+        </p:nvSpPr>
+        <p:spPr/>
+        <p:txBody>
+          <a:bodyPr/>
+          <a:lstStyle/>
+          <a:p>
+            <a:endParaRPr lang="en-US"/>
+          </a:p>
+        </p:txBody>
+      </p:sp>
+    </p:spTree>
+    <p:extLst>
+      <p:ext uri="{BB962C8B-B14F-4D97-AF65-F5344CB8AC3E}">
+        <p14:creationId xmlns:p14="http://schemas.microsoft.com/office/powerpoint/2010/main" val="3993609276"/>
+      </p:ext>
+    </p:extLst>
+  </p:cSld>
+  <p:clrMapOvr>
+    <a:masterClrMapping/>
+  </p:clrMapOvr>
+  <p:timing>
+    <p:tnLst>
+      <p:par>
+        <p:cTn id="1" dur="indefinite" restart="never" nodeType="tmRoot"/>
+      </p:par>
+    </p:tnLst>
+  </p:timing>
+</p:sld>
+</file>
+
+<file path=ppt/slides/slide26.xml><?xml version="1.0" encoding="utf-8"?>
+<p:sld xmlns:a="http://schemas.openxmlformats.org/drawingml/2006/main" xmlns:r="http://schemas.openxmlformats.org/officeDocument/2006/relationships" xmlns:p="http://schemas.openxmlformats.org/presentationml/2006/main">
+  <p:cSld>
+    <p:spTree>
+      <p:nvGrpSpPr>
+        <p:cNvPr id="1" name=""/>
+        <p:cNvGrpSpPr/>
+        <p:nvPr/>
+      </p:nvGrpSpPr>
+      <p:grpSpPr>
+        <a:xfrm>
+          <a:off x="0" y="0"/>
+          <a:ext cx="0" cy="0"/>
+          <a:chOff x="0" y="0"/>
+          <a:chExt cx="0" cy="0"/>
+        </a:xfrm>
+      </p:grpSpPr>
+      <p:sp>
+        <p:nvSpPr>
+          <p:cNvPr id="2" name="Title 1"/>
+          <p:cNvSpPr>
+            <a:spLocks noGrp="1"/>
+          </p:cNvSpPr>
+          <p:nvPr>
+            <p:ph type="title"/>
+          </p:nvPr>
+        </p:nvSpPr>
+        <p:spPr/>
+        <p:txBody>
+          <a:bodyPr/>
+          <a:lstStyle/>
+          <a:p>
+            <a:r>
+              <a:rPr lang="en-US" dirty="0" smtClean="0"/>
+              <a:t>Profiling (</a:t>
+            </a:r>
+            <a:r>
+              <a:rPr lang="en-US" dirty="0" err="1" smtClean="0"/>
+              <a:t>cProfile</a:t>
+            </a:r>
+            <a:r>
+              <a:rPr lang="en-US" dirty="0" smtClean="0"/>
+              <a:t> + ???)</a:t>
+            </a:r>
+            <a:endParaRPr lang="en-US" dirty="0"/>
+          </a:p>
+        </p:txBody>
+      </p:sp>
+      <p:sp>
+        <p:nvSpPr>
+          <p:cNvPr id="3" name="Content Placeholder 2"/>
+          <p:cNvSpPr>
+            <a:spLocks noGrp="1"/>
+          </p:cNvSpPr>
+          <p:nvPr>
+            <p:ph idx="1"/>
+          </p:nvPr>
+        </p:nvSpPr>
+        <p:spPr/>
+        <p:txBody>
+          <a:bodyPr/>
+          <a:lstStyle/>
+          <a:p>
+            <a:r>
+              <a:rPr lang="en-US" dirty="0" smtClean="0"/>
+              <a:t>If code is slow, the first step to going faster is knowing </a:t>
+            </a:r>
+            <a:r>
+              <a:rPr lang="en-US" u="sng" dirty="0" smtClean="0"/>
+              <a:t>where</a:t>
+            </a:r>
+            <a:r>
+              <a:rPr lang="en-US" dirty="0" smtClean="0"/>
+              <a:t> and then </a:t>
+            </a:r>
+            <a:r>
+              <a:rPr lang="en-US" u="sng" dirty="0" smtClean="0"/>
+              <a:t>why</a:t>
+            </a:r>
+            <a:r>
+              <a:rPr lang="en-US" dirty="0" smtClean="0"/>
+              <a:t> it is slow</a:t>
+            </a:r>
+          </a:p>
+          <a:p>
+            <a:pPr lvl="1"/>
+            <a:r>
+              <a:rPr lang="en-US" dirty="0" smtClean="0"/>
+              <a:t>You could spend hours optimizing a routine that wasn’t slow to begin with!</a:t>
+            </a:r>
+            <a:endParaRPr lang="en-US" dirty="0"/>
+          </a:p>
+        </p:txBody>
+      </p:sp>
+    </p:spTree>
+    <p:extLst>
+      <p:ext uri="{BB962C8B-B14F-4D97-AF65-F5344CB8AC3E}">
+        <p14:creationId xmlns:p14="http://schemas.microsoft.com/office/powerpoint/2010/main" val="3572393508"/>
+      </p:ext>
+    </p:extLst>
+  </p:cSld>
+  <p:clrMapOvr>
+    <a:masterClrMapping/>
+  </p:clrMapOvr>
+  <p:timing>
+    <p:tnLst>
+      <p:par>
+        <p:cTn id="1" dur="indefinite" restart="never" nodeType="tmRoot"/>
+      </p:par>
+    </p:tnLst>
+  </p:timing>
+</p:sld>
+</file>
+
+<file path=ppt/slides/slide27.xml><?xml version="1.0" encoding="utf-8"?>
+<p:sld xmlns:a="http://schemas.openxmlformats.org/drawingml/2006/main" xmlns:r="http://schemas.openxmlformats.org/officeDocument/2006/relationships" xmlns:p="http://schemas.openxmlformats.org/presentationml/2006/main">
+  <p:cSld>
+    <p:spTree>
+      <p:nvGrpSpPr>
+        <p:cNvPr id="1" name=""/>
+        <p:cNvGrpSpPr/>
+        <p:nvPr/>
+      </p:nvGrpSpPr>
+      <p:grpSpPr>
+        <a:xfrm>
+          <a:off x="0" y="0"/>
+          <a:ext cx="0" cy="0"/>
+          <a:chOff x="0" y="0"/>
+          <a:chExt cx="0" cy="0"/>
+        </a:xfrm>
+      </p:grpSpPr>
+      <p:sp>
+        <p:nvSpPr>
+          <p:cNvPr id="2" name="Title 1"/>
+          <p:cNvSpPr>
+            <a:spLocks noGrp="1"/>
+          </p:cNvSpPr>
+          <p:nvPr>
+            <p:ph type="title"/>
+          </p:nvPr>
+        </p:nvSpPr>
+        <p:spPr/>
+        <p:txBody>
+          <a:bodyPr/>
+          <a:lstStyle/>
+          <a:p>
+            <a:r>
+              <a:rPr lang="en-US" dirty="0" err="1" smtClean="0"/>
+              <a:t>Numba</a:t>
+            </a:r>
+            <a:endParaRPr lang="en-US" dirty="0"/>
+          </a:p>
+        </p:txBody>
+      </p:sp>
+      <p:sp>
+        <p:nvSpPr>
+          <p:cNvPr id="3" name="Content Placeholder 2"/>
+          <p:cNvSpPr>
+            <a:spLocks noGrp="1"/>
+          </p:cNvSpPr>
+          <p:nvPr>
+            <p:ph idx="1"/>
+          </p:nvPr>
+        </p:nvSpPr>
+        <p:spPr/>
+        <p:txBody>
+          <a:bodyPr/>
+          <a:lstStyle/>
+          <a:p>
+            <a:r>
+              <a:rPr lang="en-US" dirty="0" smtClean="0"/>
+              <a:t>Going fast, but </a:t>
+            </a:r>
+            <a:r>
+              <a:rPr lang="en-US" u="sng" dirty="0" smtClean="0"/>
+              <a:t>not a cure-all</a:t>
+            </a:r>
+            <a:endParaRPr lang="en-US" dirty="0" smtClean="0"/>
+          </a:p>
+          <a:p>
+            <a:r>
+              <a:rPr lang="en-US" dirty="0" smtClean="0"/>
+              <a:t>JIT compilation</a:t>
+            </a:r>
+          </a:p>
+          <a:p>
+            <a:r>
+              <a:rPr lang="en-US" dirty="0" err="1" smtClean="0"/>
+              <a:t>Numpy</a:t>
+            </a:r>
+            <a:r>
+              <a:rPr lang="en-US" dirty="0" smtClean="0"/>
+              <a:t> support</a:t>
+            </a:r>
+          </a:p>
+          <a:p>
+            <a:r>
+              <a:rPr lang="en-US" dirty="0" err="1" smtClean="0"/>
+              <a:t>Vectorizing</a:t>
+            </a:r>
+            <a:r>
+              <a:rPr lang="en-US" dirty="0" smtClean="0"/>
+              <a:t> functions</a:t>
+            </a:r>
+            <a:endParaRPr lang="en-US" dirty="0"/>
+          </a:p>
+        </p:txBody>
+      </p:sp>
+    </p:spTree>
+    <p:extLst>
+      <p:ext uri="{BB962C8B-B14F-4D97-AF65-F5344CB8AC3E}">
+        <p14:creationId xmlns:p14="http://schemas.microsoft.com/office/powerpoint/2010/main" val="2362128199"/>
+      </p:ext>
+    </p:extLst>
+  </p:cSld>
+  <p:clrMapOvr>
+    <a:masterClrMapping/>
+  </p:clrMapOvr>
+  <p:timing>
+    <p:tnLst>
+      <p:par>
+        <p:cTn id="1" dur="indefinite" restart="never" nodeType="tmRoot"/>
+      </p:par>
+    </p:tnLst>
+  </p:timing>
+</p:sld>
+</file>
+
+<file path=ppt/slides/slide28.xml><?xml version="1.0" encoding="utf-8"?>
+<p:sld xmlns:a="http://schemas.openxmlformats.org/drawingml/2006/main" xmlns:r="http://schemas.openxmlformats.org/officeDocument/2006/relationships" xmlns:p="http://schemas.openxmlformats.org/presentationml/2006/main">
+  <p:cSld>
+    <p:spTree>
+      <p:nvGrpSpPr>
+        <p:cNvPr id="1" name=""/>
+        <p:cNvGrpSpPr/>
+        <p:nvPr/>
+      </p:nvGrpSpPr>
+      <p:grpSpPr>
+        <a:xfrm>
+          <a:off x="0" y="0"/>
+          <a:ext cx="0" cy="0"/>
+          <a:chOff x="0" y="0"/>
+          <a:chExt cx="0" cy="0"/>
+        </a:xfrm>
+      </p:grpSpPr>
+      <p:sp>
+        <p:nvSpPr>
+          <p:cNvPr id="2" name="Title 1"/>
+          <p:cNvSpPr>
+            <a:spLocks noGrp="1"/>
+          </p:cNvSpPr>
+          <p:nvPr>
+            <p:ph type="title"/>
+          </p:nvPr>
+        </p:nvSpPr>
+        <p:spPr/>
+        <p:txBody>
+          <a:bodyPr/>
+          <a:lstStyle/>
+          <a:p>
+            <a:r>
+              <a:rPr lang="en-US" dirty="0" err="1" smtClean="0"/>
+              <a:t>Cython</a:t>
+            </a:r>
+            <a:endParaRPr lang="en-US" dirty="0"/>
+          </a:p>
+        </p:txBody>
+      </p:sp>
+      <p:sp>
+        <p:nvSpPr>
+          <p:cNvPr id="3" name="Content Placeholder 2"/>
+          <p:cNvSpPr>
+            <a:spLocks noGrp="1"/>
+          </p:cNvSpPr>
+          <p:nvPr>
+            <p:ph idx="1"/>
+          </p:nvPr>
+        </p:nvSpPr>
+        <p:spPr/>
+        <p:txBody>
+          <a:bodyPr/>
+          <a:lstStyle/>
+          <a:p>
+            <a:endParaRPr lang="en-US"/>
+          </a:p>
+        </p:txBody>
+      </p:sp>
+    </p:spTree>
+    <p:extLst>
+      <p:ext uri="{BB962C8B-B14F-4D97-AF65-F5344CB8AC3E}">
+        <p14:creationId xmlns:p14="http://schemas.microsoft.com/office/powerpoint/2010/main" val="1811172399"/>
       </p:ext>
     </p:extLst>
   </p:cSld>
@@ -4156,14 +6053,54 @@
           <a:p>
             <a:pPr lvl="1"/>
             <a:r>
+              <a:rPr lang="en-US" dirty="0">
+                <a:solidFill>
+                  <a:schemeClr val="tx2"/>
+                </a:solidFill>
+              </a:rPr>
+              <a:t>random</a:t>
+            </a:r>
+            <a:r>
               <a:rPr lang="en-US" dirty="0"/>
-              <a:t>random, math, time, </a:t>
-            </a:r>
-            <a:r>
-              <a:rPr lang="en-US" dirty="0" err="1" smtClean="0"/>
+              <a:t>, </a:t>
+            </a:r>
+            <a:r>
+              <a:rPr lang="en-US" dirty="0">
+                <a:solidFill>
+                  <a:schemeClr val="tx2"/>
+                </a:solidFill>
+              </a:rPr>
+              <a:t>math</a:t>
+            </a:r>
+            <a:r>
+              <a:rPr lang="en-US" dirty="0"/>
+              <a:t>, </a:t>
+            </a:r>
+            <a:r>
+              <a:rPr lang="en-US" dirty="0">
+                <a:solidFill>
+                  <a:schemeClr val="tx2"/>
+                </a:solidFill>
+              </a:rPr>
+              <a:t>time</a:t>
+            </a:r>
+            <a:r>
+              <a:rPr lang="en-US" dirty="0"/>
+              <a:t>, </a:t>
+            </a:r>
+            <a:r>
+              <a:rPr lang="en-US" dirty="0" err="1" smtClean="0">
+                <a:solidFill>
+                  <a:schemeClr val="tx2"/>
+                </a:solidFill>
+              </a:rPr>
               <a:t>argparse</a:t>
             </a:r>
-            <a:endParaRPr lang="en-US" dirty="0" smtClean="0"/>
+            <a:endParaRPr lang="en-US" dirty="0" smtClean="0">
+              <a:solidFill>
+                <a:schemeClr val="tx2"/>
+              </a:solidFill>
+            </a:endParaRPr>
           </a:p>
           <a:p>
             <a:r>
@@ -4174,16 +6111,48 @@
           <a:p>
             <a:pPr lvl="1"/>
             <a:r>
-              <a:rPr lang="en-US" dirty="0" smtClean="0"/>
-              <a:t>csv, xml, </a:t>
-            </a:r>
-            <a:r>
-              <a:rPr lang="en-US" dirty="0" err="1" smtClean="0"/>
+              <a:rPr lang="en-US" dirty="0" smtClean="0">
+                <a:solidFill>
+                  <a:schemeClr val="tx2"/>
+                </a:solidFill>
+              </a:rPr>
+              <a:t>csv</a:t>
+            </a:r>
+            <a:r>
+              <a:rPr lang="en-US" dirty="0" smtClean="0"/>
+              <a:t>, </a:t>
+            </a:r>
+            <a:r>
+              <a:rPr lang="en-US" dirty="0" smtClean="0">
+                <a:solidFill>
+                  <a:schemeClr val="tx2"/>
+                </a:solidFill>
+              </a:rPr>
+              <a:t>xml</a:t>
+            </a:r>
+            <a:r>
+              <a:rPr lang="en-US" dirty="0" smtClean="0"/>
+              <a:t>, </a:t>
+            </a:r>
+            <a:r>
+              <a:rPr lang="en-US" dirty="0" err="1" smtClean="0">
+                <a:solidFill>
+                  <a:schemeClr val="tx2"/>
+                </a:solidFill>
+              </a:rPr>
               <a:t>json</a:t>
             </a:r>
             <a:r>
               <a:rPr lang="en-US" dirty="0" smtClean="0"/>
-              <a:t>, re, glob, sqlite3</a:t>
+              <a:t>, </a:t>
+            </a:r>
+            <a:r>
+              <a:rPr lang="en-US" dirty="0" smtClean="0">
+                <a:solidFill>
+                  <a:schemeClr val="tx2"/>
+                </a:solidFill>
+              </a:rPr>
+              <a:t>re</a:t>
             </a:r>
           </a:p>
           <a:p>
@@ -4195,7 +6164,11 @@
           <a:p>
             <a:pPr lvl="1"/>
             <a:r>
-              <a:rPr lang="en-US" dirty="0" err="1" smtClean="0"/>
+              <a:rPr lang="en-US" dirty="0" err="1" smtClean="0">
+                <a:solidFill>
+                  <a:schemeClr val="tx2"/>
+                </a:solidFill>
+              </a:rPr>
               <a:t>itertools</a:t>
             </a:r>
             <a:r>
@@ -4203,12 +6176,48 @@
               <a:t>, </a:t>
             </a:r>
             <a:r>
-              <a:rPr lang="en-US" dirty="0" err="1" smtClean="0"/>
+              <a:rPr lang="en-US" dirty="0" err="1" smtClean="0">
+                <a:solidFill>
+                  <a:schemeClr val="tx2"/>
+                </a:solidFill>
+              </a:rPr>
               <a:t>os</a:t>
             </a:r>
             <a:r>
               <a:rPr lang="en-US" dirty="0" smtClean="0"/>
-              <a:t>, sys, glob, pickle</a:t>
+              <a:t>, </a:t>
+            </a:r>
+            <a:r>
+              <a:rPr lang="en-US" dirty="0" smtClean="0">
+                <a:solidFill>
+                  <a:schemeClr val="tx2"/>
+                </a:solidFill>
+              </a:rPr>
+              <a:t>sys</a:t>
+            </a:r>
+            <a:r>
+              <a:rPr lang="en-US" dirty="0" smtClean="0"/>
+              <a:t>, </a:t>
+            </a:r>
+            <a:r>
+              <a:rPr lang="en-US" dirty="0" smtClean="0">
+                <a:solidFill>
+                  <a:schemeClr val="tx2"/>
+                </a:solidFill>
+              </a:rPr>
+              <a:t>glob</a:t>
+            </a:r>
+            <a:r>
+              <a:rPr lang="en-US" dirty="0" smtClean="0"/>
+              <a:t>, </a:t>
+            </a:r>
+            <a:r>
+              <a:rPr lang="en-US" dirty="0" smtClean="0">
+                <a:solidFill>
+                  <a:schemeClr val="tx2"/>
+                </a:solidFill>
+              </a:rPr>
+              <a:t>pickle</a:t>
             </a:r>
           </a:p>
           <a:p>
@@ -4226,6 +6235,196 @@
   <p:clrMapOvr>
     <a:masterClrMapping/>
   </p:clrMapOvr>
+  <p:timing>
+    <p:tnLst>
+      <p:par>
+        <p:cTn id="1" dur="indefinite" restart="never" nodeType="tmRoot">
+          <p:childTnLst>
+            <p:seq concurrent="1" nextAc="seek">
+              <p:cTn id="2" dur="indefinite" nodeType="mainSeq">
+                <p:childTnLst>
+                  <p:par>
+                    <p:cTn id="3" fill="hold">
+                      <p:stCondLst>
+                        <p:cond delay="indefinite"/>
+                      </p:stCondLst>
+                      <p:childTnLst>
+                        <p:par>
+                          <p:cTn id="4" fill="hold">
+                            <p:stCondLst>
+                              <p:cond delay="0"/>
+                            </p:stCondLst>
+                            <p:childTnLst>
+                              <p:par>
+                                <p:cTn id="5" presetID="1" presetClass="entr" presetSubtype="0" fill="hold" nodeType="clickEffect">
+                                  <p:stCondLst>
+                                    <p:cond delay="0"/>
+                                  </p:stCondLst>
+                                  <p:childTnLst>
+                                    <p:set>
+                                      <p:cBhvr>
+                                        <p:cTn id="6" dur="1" fill="hold">
+                                          <p:stCondLst>
+                                            <p:cond delay="0"/>
+                                          </p:stCondLst>
+                                        </p:cTn>
+                                        <p:tgtEl>
+                                          <p:spTgt spid="3">
+                                            <p:txEl>
+                                              <p:pRg st="2" end="2"/>
+                                            </p:txEl>
+                                          </p:spTgt>
+                                        </p:tgtEl>
+                                        <p:attrNameLst>
+                                          <p:attrName>style.visibility</p:attrName>
+                                        </p:attrNameLst>
+                                      </p:cBhvr>
+                                      <p:to>
+                                        <p:strVal val="visible"/>
+                                      </p:to>
+                                    </p:set>
+                                  </p:childTnLst>
+                                </p:cTn>
+                              </p:par>
+                              <p:par>
+                                <p:cTn id="7" presetID="1" presetClass="entr" presetSubtype="0" fill="hold" nodeType="withEffect">
+                                  <p:stCondLst>
+                                    <p:cond delay="0"/>
+                                  </p:stCondLst>
+                                  <p:childTnLst>
+                                    <p:set>
+                                      <p:cBhvr>
+                                        <p:cTn id="8" dur="1" fill="hold">
+                                          <p:stCondLst>
+                                            <p:cond delay="0"/>
+                                          </p:stCondLst>
+                                        </p:cTn>
+                                        <p:tgtEl>
+                                          <p:spTgt spid="3">
+                                            <p:txEl>
+                                              <p:pRg st="3" end="3"/>
+                                            </p:txEl>
+                                          </p:spTgt>
+                                        </p:tgtEl>
+                                        <p:attrNameLst>
+                                          <p:attrName>style.visibility</p:attrName>
+                                        </p:attrNameLst>
+                                      </p:cBhvr>
+                                      <p:to>
+                                        <p:strVal val="visible"/>
+                                      </p:to>
+                                    </p:set>
+                                  </p:childTnLst>
+                                </p:cTn>
+                              </p:par>
+                            </p:childTnLst>
+                          </p:cTn>
+                        </p:par>
+                      </p:childTnLst>
+                    </p:cTn>
+                  </p:par>
+                  <p:par>
+                    <p:cTn id="9" fill="hold">
+                      <p:stCondLst>
+                        <p:cond delay="indefinite"/>
+                      </p:stCondLst>
+                      <p:childTnLst>
+                        <p:par>
+                          <p:cTn id="10" fill="hold">
+                            <p:stCondLst>
+                              <p:cond delay="0"/>
+                            </p:stCondLst>
+                            <p:childTnLst>
+                              <p:par>
+                                <p:cTn id="11" presetID="1" presetClass="entr" presetSubtype="0" fill="hold" nodeType="clickEffect">
+                                  <p:stCondLst>
+                                    <p:cond delay="0"/>
+                                  </p:stCondLst>
+                                  <p:childTnLst>
+                                    <p:set>
+                                      <p:cBhvr>
+                                        <p:cTn id="12" dur="1" fill="hold">
+                                          <p:stCondLst>
+                                            <p:cond delay="0"/>
+                                          </p:stCondLst>
+                                        </p:cTn>
+                                        <p:tgtEl>
+                                          <p:spTgt spid="3">
+                                            <p:txEl>
+                                              <p:pRg st="4" end="4"/>
+                                            </p:txEl>
+                                          </p:spTgt>
+                                        </p:tgtEl>
+                                        <p:attrNameLst>
+                                          <p:attrName>style.visibility</p:attrName>
+                                        </p:attrNameLst>
+                                      </p:cBhvr>
+                                      <p:to>
+                                        <p:strVal val="visible"/>
+                                      </p:to>
+                                    </p:set>
+                                  </p:childTnLst>
+                                </p:cTn>
+                              </p:par>
+                              <p:par>
+                                <p:cTn id="13" presetID="1" presetClass="entr" presetSubtype="0" fill="hold" nodeType="withEffect">
+                                  <p:stCondLst>
+                                    <p:cond delay="0"/>
+                                  </p:stCondLst>
+                                  <p:childTnLst>
+                                    <p:set>
+                                      <p:cBhvr>
+                                        <p:cTn id="14" dur="1" fill="hold">
+                                          <p:stCondLst>
+                                            <p:cond delay="0"/>
+                                          </p:stCondLst>
+                                        </p:cTn>
+                                        <p:tgtEl>
+                                          <p:spTgt spid="3">
+                                            <p:txEl>
+                                              <p:pRg st="5" end="5"/>
+                                            </p:txEl>
+                                          </p:spTgt>
+                                        </p:tgtEl>
+                                        <p:attrNameLst>
+                                          <p:attrName>style.visibility</p:attrName>
+                                        </p:attrNameLst>
+                                      </p:cBhvr>
+                                      <p:to>
+                                        <p:strVal val="visible"/>
+                                      </p:to>
+                                    </p:set>
+                                  </p:childTnLst>
+                                </p:cTn>
+                              </p:par>
+                            </p:childTnLst>
+                          </p:cTn>
+                        </p:par>
+                      </p:childTnLst>
+                    </p:cTn>
+                  </p:par>
+                </p:childTnLst>
+              </p:cTn>
+              <p:prevCondLst>
+                <p:cond evt="onPrev" delay="0">
+                  <p:tgtEl>
+                    <p:sldTgt/>
+                  </p:tgtEl>
+                </p:cond>
+              </p:prevCondLst>
+              <p:nextCondLst>
+                <p:cond evt="onNext" delay="0">
+                  <p:tgtEl>
+                    <p:sldTgt/>
+                  </p:tgtEl>
+                </p:cond>
+              </p:nextCondLst>
+            </p:seq>
+          </p:childTnLst>
+        </p:cTn>
+      </p:par>
+    </p:tnLst>
+  </p:timing>
 </p:sld>
 </file>
 
@@ -4348,6 +6547,183 @@
   <p:clrMapOvr>
     <a:masterClrMapping/>
   </p:clrMapOvr>
+  <p:timing>
+    <p:tnLst>
+      <p:par>
+        <p:cTn id="1" dur="indefinite" restart="never" nodeType="tmRoot">
+          <p:childTnLst>
+            <p:seq concurrent="1" nextAc="seek">
+              <p:cTn id="2" dur="indefinite" nodeType="mainSeq">
+                <p:childTnLst>
+                  <p:par>
+                    <p:cTn id="3" fill="hold">
+                      <p:stCondLst>
+                        <p:cond delay="indefinite"/>
+                      </p:stCondLst>
+                      <p:childTnLst>
+                        <p:par>
+                          <p:cTn id="4" fill="hold">
+                            <p:stCondLst>
+                              <p:cond delay="0"/>
+                            </p:stCondLst>
+                            <p:childTnLst>
+                              <p:par>
+                                <p:cTn id="5" presetID="1" presetClass="entr" presetSubtype="0" fill="hold" nodeType="clickEffect">
+                                  <p:stCondLst>
+                                    <p:cond delay="0"/>
+                                  </p:stCondLst>
+                                  <p:childTnLst>
+                                    <p:set>
+                                      <p:cBhvr>
+                                        <p:cTn id="6" dur="1" fill="hold">
+                                          <p:stCondLst>
+                                            <p:cond delay="0"/>
+                                          </p:stCondLst>
+                                        </p:cTn>
+                                        <p:tgtEl>
+                                          <p:spTgt spid="3">
+                                            <p:txEl>
+                                              <p:pRg st="1" end="1"/>
+                                            </p:txEl>
+                                          </p:spTgt>
+                                        </p:tgtEl>
+                                        <p:attrNameLst>
+                                          <p:attrName>style.visibility</p:attrName>
+                                        </p:attrNameLst>
+                                      </p:cBhvr>
+                                      <p:to>
+                                        <p:strVal val="visible"/>
+                                      </p:to>
+                                    </p:set>
+                                  </p:childTnLst>
+                                </p:cTn>
+                              </p:par>
+                            </p:childTnLst>
+                          </p:cTn>
+                        </p:par>
+                      </p:childTnLst>
+                    </p:cTn>
+                  </p:par>
+                  <p:par>
+                    <p:cTn id="7" fill="hold">
+                      <p:stCondLst>
+                        <p:cond delay="indefinite"/>
+                      </p:stCondLst>
+                      <p:childTnLst>
+                        <p:par>
+                          <p:cTn id="8" fill="hold">
+                            <p:stCondLst>
+                              <p:cond delay="0"/>
+                            </p:stCondLst>
+                            <p:childTnLst>
+                              <p:par>
+                                <p:cTn id="9" presetID="1" presetClass="entr" presetSubtype="0" fill="hold" nodeType="clickEffect">
+                                  <p:stCondLst>
+                                    <p:cond delay="0"/>
+                                  </p:stCondLst>
+                                  <p:childTnLst>
+                                    <p:set>
+                                      <p:cBhvr>
+                                        <p:cTn id="10" dur="1" fill="hold">
+                                          <p:stCondLst>
+                                            <p:cond delay="0"/>
+                                          </p:stCondLst>
+                                        </p:cTn>
+                                        <p:tgtEl>
+                                          <p:spTgt spid="3">
+                                            <p:txEl>
+                                              <p:pRg st="2" end="2"/>
+                                            </p:txEl>
+                                          </p:spTgt>
+                                        </p:tgtEl>
+                                        <p:attrNameLst>
+                                          <p:attrName>style.visibility</p:attrName>
+                                        </p:attrNameLst>
+                                      </p:cBhvr>
+                                      <p:to>
+                                        <p:strVal val="visible"/>
+                                      </p:to>
+                                    </p:set>
+                                  </p:childTnLst>
+                                </p:cTn>
+                              </p:par>
+                            </p:childTnLst>
+                          </p:cTn>
+                        </p:par>
+                      </p:childTnLst>
+                    </p:cTn>
+                  </p:par>
+                  <p:par>
+                    <p:cTn id="11" fill="hold">
+                      <p:stCondLst>
+                        <p:cond delay="indefinite"/>
+                      </p:stCondLst>
+                      <p:childTnLst>
+                        <p:par>
+                          <p:cTn id="12" fill="hold">
+                            <p:stCondLst>
+                              <p:cond delay="0"/>
+                            </p:stCondLst>
+                            <p:childTnLst>
+                              <p:par>
+                                <p:cTn id="13" presetID="1" presetClass="entr" presetSubtype="0" fill="hold" nodeType="clickEffect">
+                                  <p:stCondLst>
+                                    <p:cond delay="0"/>
+                                  </p:stCondLst>
+                                  <p:childTnLst>
+                                    <p:set>
+                                      <p:cBhvr>
+                                        <p:cTn id="14" dur="1" fill="hold">
+                                          <p:stCondLst>
+                                            <p:cond delay="0"/>
+                                          </p:stCondLst>
+                                        </p:cTn>
+                                        <p:tgtEl>
+                                          <p:spTgt spid="3">
+                                            <p:txEl>
+                                              <p:pRg st="3" end="3"/>
+                                            </p:txEl>
+                                          </p:spTgt>
+                                        </p:tgtEl>
+                                        <p:attrNameLst>
+                                          <p:attrName>style.visibility</p:attrName>
+                                        </p:attrNameLst>
+                                      </p:cBhvr>
+                                      <p:to>
+                                        <p:strVal val="visible"/>
+                                      </p:to>
+                                    </p:set>
+                                  </p:childTnLst>
+                                </p:cTn>
+                              </p:par>
+                            </p:childTnLst>
+                          </p:cTn>
+                        </p:par>
+                      </p:childTnLst>
+                    </p:cTn>
+                  </p:par>
+                </p:childTnLst>
+              </p:cTn>
+              <p:prevCondLst>
+                <p:cond evt="onPrev" delay="0">
+                  <p:tgtEl>
+                    <p:sldTgt/>
+                  </p:tgtEl>
+                </p:cond>
+              </p:prevCondLst>
+              <p:nextCondLst>
+                <p:cond evt="onNext" delay="0">
+                  <p:tgtEl>
+                    <p:sldTgt/>
+                  </p:tgtEl>
+                </p:cond>
+              </p:nextCondLst>
+            </p:seq>
+          </p:childTnLst>
+        </p:cTn>
+      </p:par>
+    </p:tnLst>
+  </p:timing>
 </p:sld>
 </file>
 
@@ -4485,6 +6861,13 @@
   <p:clrMapOvr>
     <a:masterClrMapping/>
   </p:clrMapOvr>
+  <p:timing>
+    <p:tnLst>
+      <p:par>
+        <p:cTn id="1" dur="indefinite" restart="never" nodeType="tmRoot"/>
+      </p:par>
+    </p:tnLst>
+  </p:timing>
 </p:sld>
 </file>
 
@@ -4522,11 +6905,19 @@
           <a:p>
             <a:r>
               <a:rPr lang="en-US" dirty="0" err="1" smtClean="0"/>
-              <a:t>SciPy</a:t>
-            </a:r>
-            <a:r>
-              <a:rPr lang="en-US" dirty="0" smtClean="0"/>
-              <a:t> library</a:t>
+              <a:t>IPython</a:t>
+            </a:r>
+            <a:r>
+              <a:rPr lang="en-US" dirty="0" smtClean="0"/>
+              <a:t>/</a:t>
+            </a:r>
+            <a:r>
+              <a:rPr lang="en-US" dirty="0" err="1" smtClean="0"/>
+              <a:t>Jupyter</a:t>
+            </a:r>
+            <a:r>
+              <a:rPr lang="en-US" dirty="0" smtClean="0"/>
+              <a:t> (again)</a:t>
             </a:r>
             <a:endParaRPr lang="en-US" dirty="0"/>
           </a:p>
@@ -4547,30 +6938,11 @@
           <a:bodyPr/>
           <a:lstStyle/>
           <a:p>
-            <a:r>
-              <a:rPr lang="en-US" dirty="0"/>
-              <a:t>Scientific constants</a:t>
-            </a:r>
-          </a:p>
-          <a:p>
-            <a:r>
-              <a:rPr lang="en-US" dirty="0"/>
-              <a:t>Optimization routines</a:t>
-            </a:r>
-          </a:p>
-          <a:p>
-            <a:r>
-              <a:rPr lang="en-US" dirty="0" smtClean="0"/>
-              <a:t>Tons of cool examples in the cookbook:</a:t>
-            </a:r>
-          </a:p>
-          <a:p>
-            <a:pPr lvl="1"/>
             <a:r>
               <a:rPr lang="en-US" dirty="0">
                 <a:hlinkClick r:id="rId2"/>
               </a:rPr>
-              <a:t>http://scipy-cookbook.readthedocs.io</a:t>
+              <a:t>http://try.jupyter.org</a:t>
             </a:r>
             <a:r>
               <a:rPr lang="en-US" dirty="0" smtClean="0">
@@ -4587,40 +6959,39 @@
           <a:p>
             <a:r>
               <a:rPr lang="en-US" dirty="0" smtClean="0"/>
-              <a:t>Full documentation:</a:t>
-            </a:r>
-          </a:p>
-          <a:p>
-            <a:pPr lvl="1"/>
-            <a:r>
-              <a:rPr lang="en-US" dirty="0" smtClean="0">
-                <a:hlinkClick r:id="rId3"/>
-              </a:rPr>
-              <a:t>http</a:t>
-            </a:r>
-            <a:r>
-              <a:rPr lang="en-US" dirty="0">
-                <a:hlinkClick r:id="rId3"/>
-              </a:rPr>
-              <a:t>://docs.scipy.org/doc/scipy-0.18.0/reference/</a:t>
-            </a:r>
-            <a:r>
-              <a:rPr lang="en-US" dirty="0"/>
-              <a:t> </a:t>
-            </a:r>
+              <a:t>Notebook </a:t>
+            </a:r>
+            <a:r>
+              <a:rPr lang="en-US" dirty="0" smtClean="0"/>
+              <a:t>interface</a:t>
+            </a:r>
+          </a:p>
+          <a:p>
+            <a:r>
+              <a:rPr lang="en-US" dirty="0" smtClean="0"/>
+              <a:t>Terminal-in-a-cell trick</a:t>
+            </a:r>
+            <a:endParaRPr lang="en-US" dirty="0"/>
           </a:p>
         </p:txBody>
       </p:sp>
     </p:spTree>
     <p:extLst>
       <p:ext uri="{BB962C8B-B14F-4D97-AF65-F5344CB8AC3E}">
-        <p14:creationId xmlns:p14="http://schemas.microsoft.com/office/powerpoint/2010/main" val="3649248177"/>
+        <p14:creationId xmlns:p14="http://schemas.microsoft.com/office/powerpoint/2010/main" val="3581265688"/>
       </p:ext>
     </p:extLst>
   </p:cSld>
   <p:clrMapOvr>
     <a:masterClrMapping/>
   </p:clrMapOvr>
+  <p:timing>
+    <p:tnLst>
+      <p:par>
+        <p:cTn id="1" dur="indefinite" restart="never" nodeType="tmRoot"/>
+      </p:par>
+    </p:tnLst>
+  </p:timing>
 </p:sld>
 </file>
 
@@ -4658,63 +7029,282 @@
           <a:p>
             <a:r>
               <a:rPr lang="en-US" dirty="0" err="1" smtClean="0"/>
-              <a:t>IPython</a:t>
-            </a:r>
-            <a:r>
-              <a:rPr lang="en-US" dirty="0" smtClean="0"/>
-              <a:t>/</a:t>
+              <a:t>Numpy</a:t>
+            </a:r>
+            <a:endParaRPr lang="en-US" dirty="0"/>
+          </a:p>
+        </p:txBody>
+      </p:sp>
+      <p:sp>
+        <p:nvSpPr>
+          <p:cNvPr id="3" name="Content Placeholder 2"/>
+          <p:cNvSpPr>
+            <a:spLocks noGrp="1"/>
+          </p:cNvSpPr>
+          <p:nvPr>
+            <p:ph idx="1"/>
+          </p:nvPr>
+        </p:nvSpPr>
+        <p:spPr/>
+        <p:txBody>
+          <a:bodyPr>
+            <a:normAutofit/>
+          </a:bodyPr>
+          <a:lstStyle/>
+          <a:p>
+            <a:r>
+              <a:rPr lang="en-US" dirty="0" smtClean="0"/>
+              <a:t>N-D arrays are the basic type in </a:t>
             </a:r>
             <a:r>
               <a:rPr lang="en-US" dirty="0" err="1" smtClean="0"/>
-              <a:t>Jupyter</a:t>
-            </a:r>
-            <a:r>
-              <a:rPr lang="en-US" dirty="0" smtClean="0"/>
-              <a:t> (again)</a:t>
-            </a:r>
-            <a:endParaRPr lang="en-US" dirty="0"/>
-          </a:p>
-        </p:txBody>
-      </p:sp>
-      <p:sp>
-        <p:nvSpPr>
-          <p:cNvPr id="3" name="Content Placeholder 2"/>
-          <p:cNvSpPr>
-            <a:spLocks noGrp="1"/>
-          </p:cNvSpPr>
-          <p:nvPr>
-            <p:ph idx="1"/>
-          </p:nvPr>
-        </p:nvSpPr>
-        <p:spPr/>
-        <p:txBody>
-          <a:bodyPr/>
-          <a:lstStyle/>
-          <a:p>
-            <a:r>
-              <a:rPr lang="en-US" dirty="0" smtClean="0"/>
-              <a:t>Notebook interface</a:t>
-            </a:r>
-          </a:p>
-          <a:p>
-            <a:r>
-              <a:rPr lang="en-US" dirty="0" smtClean="0"/>
-              <a:t>Terminal-in-a-cell trick</a:t>
-            </a:r>
-            <a:endParaRPr lang="en-US" dirty="0"/>
+              <a:t>numpy</a:t>
+            </a:r>
+            <a:endParaRPr lang="en-US" dirty="0" smtClean="0"/>
+          </a:p>
+          <a:p>
+            <a:pPr lvl="1"/>
+            <a:r>
+              <a:rPr lang="en-US" dirty="0" smtClean="0"/>
+              <a:t>A little bit like MATLAB vectors</a:t>
+            </a:r>
+          </a:p>
+          <a:p>
+            <a:pPr lvl="1"/>
+            <a:r>
+              <a:rPr lang="en-US" dirty="0" smtClean="0"/>
+              <a:t>Every array has a </a:t>
+            </a:r>
+            <a:r>
+              <a:rPr lang="en-US" u="sng" dirty="0" smtClean="0"/>
+              <a:t>static</a:t>
+            </a:r>
+            <a:r>
+              <a:rPr lang="en-US" i="1" dirty="0" smtClean="0"/>
+              <a:t> </a:t>
+            </a:r>
+            <a:r>
+              <a:rPr lang="en-US" dirty="0" smtClean="0"/>
+              <a:t>datatype, so it can map to fast-executing code elsewhere.</a:t>
+            </a:r>
+          </a:p>
+          <a:p>
+            <a:pPr marL="457200" lvl="1" indent="0">
+              <a:buNone/>
+            </a:pPr>
+            <a:endParaRPr lang="en-US" dirty="0" smtClean="0"/>
+          </a:p>
+          <a:p>
+            <a:r>
+              <a:rPr lang="en-US" dirty="0" smtClean="0"/>
+              <a:t>Often, a “different” version of an array (e.g. a slice) is actually a </a:t>
+            </a:r>
+            <a:r>
+              <a:rPr lang="en-US" u="sng" dirty="0" smtClean="0"/>
+              <a:t>view</a:t>
+            </a:r>
+            <a:r>
+              <a:rPr lang="en-US" dirty="0" smtClean="0"/>
+              <a:t> of the </a:t>
+            </a:r>
+            <a:r>
+              <a:rPr lang="en-US" u="sng" dirty="0" smtClean="0"/>
+              <a:t>same data</a:t>
+            </a:r>
+            <a:r>
+              <a:rPr lang="en-US" dirty="0" smtClean="0"/>
+              <a:t>.</a:t>
+            </a:r>
           </a:p>
         </p:txBody>
       </p:sp>
     </p:spTree>
     <p:extLst>
       <p:ext uri="{BB962C8B-B14F-4D97-AF65-F5344CB8AC3E}">
-        <p14:creationId xmlns:p14="http://schemas.microsoft.com/office/powerpoint/2010/main" val="3581265688"/>
+        <p14:creationId xmlns:p14="http://schemas.microsoft.com/office/powerpoint/2010/main" val="1609948284"/>
       </p:ext>
     </p:extLst>
   </p:cSld>
   <p:clrMapOvr>
     <a:masterClrMapping/>
   </p:clrMapOvr>
+  <p:timing>
+    <p:tnLst>
+      <p:par>
+        <p:cTn id="1" dur="indefinite" restart="never" nodeType="tmRoot">
+          <p:childTnLst>
+            <p:seq concurrent="1" nextAc="seek">
+              <p:cTn id="2" dur="indefinite" nodeType="mainSeq">
+                <p:childTnLst>
+                  <p:par>
+                    <p:cTn id="3" fill="hold">
+                      <p:stCondLst>
+                        <p:cond delay="indefinite"/>
+                      </p:stCondLst>
+                      <p:childTnLst>
+                        <p:par>
+                          <p:cTn id="4" fill="hold">
+                            <p:stCondLst>
+                              <p:cond delay="0"/>
+                            </p:stCondLst>
+                            <p:childTnLst>
+                              <p:par>
+                                <p:cTn id="5" presetID="1" presetClass="entr" presetSubtype="0" fill="hold" nodeType="clickEffect">
+                                  <p:stCondLst>
+                                    <p:cond delay="0"/>
+                                  </p:stCondLst>
+                                  <p:childTnLst>
+                                    <p:set>
+                                      <p:cBhvr>
+                                        <p:cTn id="6" dur="1" fill="hold">
+                                          <p:stCondLst>
+                                            <p:cond delay="0"/>
+                                          </p:stCondLst>
+                                        </p:cTn>
+                                        <p:tgtEl>
+                                          <p:spTgt spid="3">
+                                            <p:txEl>
+                                              <p:pRg st="1" end="1"/>
+                                            </p:txEl>
+                                          </p:spTgt>
+                                        </p:tgtEl>
+                                        <p:attrNameLst>
+                                          <p:attrName>style.visibility</p:attrName>
+                                        </p:attrNameLst>
+                                      </p:cBhvr>
+                                      <p:to>
+                                        <p:strVal val="visible"/>
+                                      </p:to>
+                                    </p:set>
+                                  </p:childTnLst>
+                                </p:cTn>
+                              </p:par>
+                            </p:childTnLst>
+                          </p:cTn>
+                        </p:par>
+                      </p:childTnLst>
+                    </p:cTn>
+                  </p:par>
+                  <p:par>
+                    <p:cTn id="7" fill="hold">
+                      <p:stCondLst>
+                        <p:cond delay="indefinite"/>
+                      </p:stCondLst>
+                      <p:childTnLst>
+                        <p:par>
+                          <p:cTn id="8" fill="hold">
+                            <p:stCondLst>
+                              <p:cond delay="0"/>
+                            </p:stCondLst>
+                            <p:childTnLst>
+                              <p:par>
+                                <p:cTn id="9" presetID="1" presetClass="entr" presetSubtype="0" fill="hold" nodeType="clickEffect">
+                                  <p:stCondLst>
+                                    <p:cond delay="0"/>
+                                  </p:stCondLst>
+                                  <p:childTnLst>
+                                    <p:set>
+                                      <p:cBhvr>
+                                        <p:cTn id="10" dur="1" fill="hold">
+                                          <p:stCondLst>
+                                            <p:cond delay="0"/>
+                                          </p:stCondLst>
+                                        </p:cTn>
+                                        <p:tgtEl>
+                                          <p:spTgt spid="3">
+                                            <p:txEl>
+                                              <p:pRg st="2" end="2"/>
+                                            </p:txEl>
+                                          </p:spTgt>
+                                        </p:tgtEl>
+                                        <p:attrNameLst>
+                                          <p:attrName>style.visibility</p:attrName>
+                                        </p:attrNameLst>
+                                      </p:cBhvr>
+                                      <p:to>
+                                        <p:strVal val="visible"/>
+                                      </p:to>
+                                    </p:set>
+                                  </p:childTnLst>
+                                </p:cTn>
+                              </p:par>
+                            </p:childTnLst>
+                          </p:cTn>
+                        </p:par>
+                      </p:childTnLst>
+                    </p:cTn>
+                  </p:par>
+                  <p:par>
+                    <p:cTn id="11" fill="hold">
+                      <p:stCondLst>
+                        <p:cond delay="indefinite"/>
+                      </p:stCondLst>
+                      <p:childTnLst>
+                        <p:par>
+                          <p:cTn id="12" fill="hold">
+                            <p:stCondLst>
+                              <p:cond delay="0"/>
+                            </p:stCondLst>
+                            <p:childTnLst>
+                              <p:par>
+                                <p:cTn id="13" presetID="1" presetClass="entr" presetSubtype="0" fill="hold" nodeType="clickEffect">
+                                  <p:stCondLst>
+                                    <p:cond delay="0"/>
+                                  </p:stCondLst>
+                                  <p:childTnLst>
+                                    <p:set>
+                                      <p:cBhvr>
+                                        <p:cTn id="14" dur="1" fill="hold">
+                                          <p:stCondLst>
+                                            <p:cond delay="0"/>
+                                          </p:stCondLst>
+                                        </p:cTn>
+                                        <p:tgtEl>
+                                          <p:spTgt spid="3">
+                                            <p:txEl>
+                                              <p:pRg st="4" end="4"/>
+                                            </p:txEl>
+                                          </p:spTgt>
+                                        </p:tgtEl>
+                                        <p:attrNameLst>
+                                          <p:attrName>style.visibility</p:attrName>
+                                        </p:attrNameLst>
+                                      </p:cBhvr>
+                                      <p:to>
+                                        <p:strVal val="visible"/>
+                                      </p:to>
+                                    </p:set>
+                                  </p:childTnLst>
+                                </p:cTn>
+                              </p:par>
+                            </p:childTnLst>
+                          </p:cTn>
+                        </p:par>
+                      </p:childTnLst>
+                    </p:cTn>
+                  </p:par>
+                </p:childTnLst>
+              </p:cTn>
+              <p:prevCondLst>
+                <p:cond evt="onPrev" delay="0">
+                  <p:tgtEl>
+                    <p:sldTgt/>
+                  </p:tgtEl>
+                </p:cond>
+              </p:prevCondLst>
+              <p:nextCondLst>
+                <p:cond evt="onNext" delay="0">
+                  <p:tgtEl>
+                    <p:sldTgt/>
+                  </p:tgtEl>
+                </p:cond>
+              </p:nextCondLst>
+            </p:seq>
+          </p:childTnLst>
+        </p:cTn>
+      </p:par>
+    </p:tnLst>
+  </p:timing>
 </p:sld>
 </file>
 
@@ -4770,24 +7360,66 @@
         </p:nvSpPr>
         <p:spPr/>
         <p:txBody>
-          <a:bodyPr/>
+          <a:bodyPr>
+            <a:normAutofit/>
+          </a:bodyPr>
           <a:lstStyle/>
           <a:p>
             <a:r>
               <a:rPr lang="en-US" dirty="0" smtClean="0"/>
-              <a:t>Arrays as atomic units</a:t>
-            </a:r>
-          </a:p>
-          <a:p>
-            <a:r>
-              <a:rPr lang="en-US" dirty="0" smtClean="0"/>
-              <a:t>Broadcasting</a:t>
-            </a:r>
-          </a:p>
-          <a:p>
-            <a:r>
-              <a:rPr lang="en-US" dirty="0" smtClean="0"/>
-              <a:t>Reshaping</a:t>
+              <a:t>Crash-course notebook intro to </a:t>
+            </a:r>
+            <a:r>
+              <a:rPr lang="en-US" dirty="0" err="1" smtClean="0"/>
+              <a:t>numpy</a:t>
+            </a:r>
+            <a:r>
+              <a:rPr lang="en-US" dirty="0" smtClean="0"/>
+              <a:t>: </a:t>
+            </a:r>
+            <a:r>
+              <a:rPr lang="en-US" dirty="0" smtClean="0">
+                <a:hlinkClick r:id="rId2"/>
+              </a:rPr>
+              <a:t>https</a:t>
+            </a:r>
+            <a:r>
+              <a:rPr lang="en-US" dirty="0">
+                <a:hlinkClick r:id="rId2"/>
+              </a:rPr>
+              <a:t>://</a:t>
+            </a:r>
+            <a:r>
+              <a:rPr lang="en-US" dirty="0" smtClean="0">
+                <a:hlinkClick r:id="rId2"/>
+              </a:rPr>
+              <a:t>git.io/vi4sE</a:t>
+            </a:r>
+            <a:r>
+              <a:rPr lang="en-US" dirty="0" smtClean="0"/>
+              <a:t> </a:t>
+            </a:r>
+          </a:p>
+          <a:p>
+            <a:r>
+              <a:rPr lang="en-US" dirty="0" smtClean="0"/>
+              <a:t>Lots more info </a:t>
+            </a:r>
+            <a:r>
+              <a:rPr lang="en-US" dirty="0"/>
+              <a:t>in </a:t>
+            </a:r>
+            <a:r>
+              <a:rPr lang="en-US" dirty="0">
+                <a:hlinkClick r:id="rId3"/>
+              </a:rPr>
+              <a:t>official </a:t>
+            </a:r>
+            <a:r>
+              <a:rPr lang="en-US" dirty="0" smtClean="0">
+                <a:hlinkClick r:id="rId3"/>
+              </a:rPr>
+              <a:t>docs</a:t>
             </a:r>
             <a:endParaRPr lang="en-US" dirty="0"/>
           </a:p>
@@ -4796,13 +7428,123 @@
     </p:spTree>
     <p:extLst>
       <p:ext uri="{BB962C8B-B14F-4D97-AF65-F5344CB8AC3E}">
-        <p14:creationId xmlns:p14="http://schemas.microsoft.com/office/powerpoint/2010/main" val="1609948284"/>
+        <p14:creationId xmlns:p14="http://schemas.microsoft.com/office/powerpoint/2010/main" val="3632303623"/>
       </p:ext>
     </p:extLst>
   </p:cSld>
   <p:clrMapOvr>
     <a:masterClrMapping/>
   </p:clrMapOvr>
+  <p:timing>
+    <p:tnLst>
+      <p:par>
+        <p:cTn id="1" dur="indefinite" restart="never" nodeType="tmRoot">
+          <p:childTnLst>
+            <p:seq concurrent="1" nextAc="seek">
+              <p:cTn id="2" dur="indefinite" nodeType="mainSeq">
+                <p:childTnLst>
+                  <p:par>
+                    <p:cTn id="3" fill="hold">
+                      <p:stCondLst>
+                        <p:cond delay="indefinite"/>
+                      </p:stCondLst>
+                      <p:childTnLst>
+                        <p:par>
+                          <p:cTn id="4" fill="hold">
+                            <p:stCondLst>
+                              <p:cond delay="0"/>
+                            </p:stCondLst>
+                            <p:childTnLst>
+                              <p:par>
+                                <p:cTn id="5" presetID="1" presetClass="entr" presetSubtype="0" fill="hold" nodeType="clickEffect">
+                                  <p:stCondLst>
+                                    <p:cond delay="0"/>
+                                  </p:stCondLst>
+                                  <p:childTnLst>
+                                    <p:set>
+                                      <p:cBhvr>
+                                        <p:cTn id="6" dur="1" fill="hold">
+                                          <p:stCondLst>
+                                            <p:cond delay="0"/>
+                                          </p:stCondLst>
+                                        </p:cTn>
+                                        <p:tgtEl>
+                                          <p:spTgt spid="3">
+                                            <p:txEl>
+                                              <p:pRg st="0" end="0"/>
+                                            </p:txEl>
+                                          </p:spTgt>
+                                        </p:tgtEl>
+                                        <p:attrNameLst>
+                                          <p:attrName>style.visibility</p:attrName>
+                                        </p:attrNameLst>
+                                      </p:cBhvr>
+                                      <p:to>
+                                        <p:strVal val="visible"/>
+                                      </p:to>
+                                    </p:set>
+                                  </p:childTnLst>
+                                </p:cTn>
+                              </p:par>
+                              <p:par>
+                                <p:cTn id="7" presetID="1" presetClass="entr" presetSubtype="0" fill="hold" nodeType="withEffect">
+                                  <p:stCondLst>
+                                    <p:cond delay="0"/>
+                                  </p:stCondLst>
+                                  <p:childTnLst>
+                                    <p:set>
+                                      <p:cBhvr>
+                                        <p:cTn id="8" dur="1" fill="hold">
+                                          <p:stCondLst>
+                                            <p:cond delay="0"/>
+                                          </p:stCondLst>
+                                        </p:cTn>
+                                        <p:tgtEl>
+                                          <p:spTgt spid="3">
+                                            <p:txEl>
+                                              <p:pRg st="1" end="1"/>
+                                            </p:txEl>
+                                          </p:spTgt>
+                                        </p:tgtEl>
+                                        <p:attrNameLst>
+                                          <p:attrName>style.visibility</p:attrName>
+                                        </p:attrNameLst>
+                                      </p:cBhvr>
+                                      <p:to>
+                                        <p:strVal val="visible"/>
+                                      </p:to>
+                                    </p:set>
+                                  </p:childTnLst>
+                                </p:cTn>
+                              </p:par>
+                            </p:childTnLst>
+                          </p:cTn>
+                        </p:par>
+                      </p:childTnLst>
+                    </p:cTn>
+                  </p:par>
+                </p:childTnLst>
+              </p:cTn>
+              <p:prevCondLst>
+                <p:cond evt="onPrev" delay="0">
+                  <p:tgtEl>
+                    <p:sldTgt/>
+                  </p:tgtEl>
+                </p:cond>
+              </p:prevCondLst>
+              <p:nextCondLst>
+                <p:cond evt="onNext" delay="0">
+                  <p:tgtEl>
+                    <p:sldTgt/>
+                  </p:tgtEl>
+                </p:cond>
+              </p:nextCondLst>
+            </p:seq>
+          </p:childTnLst>
+        </p:cTn>
+      </p:par>
+    </p:tnLst>
+  </p:timing>
 </p:sld>
 </file>
 
@@ -4840,7 +7582,15 @@
           <a:p>
             <a:r>
               <a:rPr lang="en-US" dirty="0" smtClean="0"/>
-              <a:t>Pandas</a:t>
+              <a:t>Misc. </a:t>
+            </a:r>
+            <a:r>
+              <a:rPr lang="en-US" dirty="0" err="1" smtClean="0"/>
+              <a:t>Numpy</a:t>
+            </a:r>
+            <a:r>
+              <a:rPr lang="en-US" dirty="0" smtClean="0"/>
+              <a:t> tips</a:t>
             </a:r>
             <a:endParaRPr lang="en-US" dirty="0"/>
           </a:p>
@@ -4861,20 +7611,263 @@
           <a:bodyPr/>
           <a:lstStyle/>
           <a:p>
-            <a:endParaRPr lang="en-US" dirty="0" smtClean="0"/>
+            <a:r>
+              <a:rPr lang="en-US" dirty="0" err="1" smtClean="0">
+                <a:solidFill>
+                  <a:schemeClr val="tx2"/>
+                </a:solidFill>
+              </a:rPr>
+              <a:t>ndarray.shape</a:t>
+            </a:r>
+            <a:r>
+              <a:rPr lang="en-US" dirty="0"/>
+              <a:t> </a:t>
+            </a:r>
+            <a:r>
+              <a:rPr lang="en-US" dirty="0" smtClean="0"/>
+              <a:t>- one-stop shop for info on what an array looks like</a:t>
+            </a:r>
+          </a:p>
+          <a:p>
+            <a:r>
+              <a:rPr lang="en-US" dirty="0" smtClean="0"/>
+              <a:t>Arithmetic operations </a:t>
+            </a:r>
+            <a:r>
+              <a:rPr lang="en-US" u="sng" dirty="0" smtClean="0"/>
+              <a:t>default to elementwise</a:t>
+            </a:r>
+            <a:r>
+              <a:rPr lang="en-US" dirty="0" smtClean="0"/>
+              <a:t>.  I.e. </a:t>
+            </a:r>
+            <a:r>
+              <a:rPr lang="en-US" dirty="0" smtClean="0">
+                <a:solidFill>
+                  <a:schemeClr val="tx2"/>
+                </a:solidFill>
+              </a:rPr>
+              <a:t>A*B</a:t>
+            </a:r>
+            <a:r>
+              <a:rPr lang="en-US" dirty="0" smtClean="0"/>
+              <a:t> does not mean inner product!  Use </a:t>
+            </a:r>
+            <a:r>
+              <a:rPr lang="en-US" dirty="0" smtClean="0">
+                <a:solidFill>
+                  <a:schemeClr val="tx2"/>
+                </a:solidFill>
+              </a:rPr>
+              <a:t>numpy.dot()</a:t>
+            </a:r>
+            <a:r>
+              <a:rPr lang="en-US" dirty="0" smtClean="0"/>
+              <a:t> instead.</a:t>
+            </a:r>
+          </a:p>
+          <a:p>
+            <a:r>
+              <a:rPr lang="en-US" dirty="0" smtClean="0"/>
+              <a:t>Useful functions: </a:t>
+            </a:r>
+            <a:r>
+              <a:rPr lang="en-US" dirty="0" err="1" smtClean="0">
+                <a:solidFill>
+                  <a:schemeClr val="tx2"/>
+                </a:solidFill>
+              </a:rPr>
+              <a:t>arange</a:t>
+            </a:r>
+            <a:r>
+              <a:rPr lang="en-US" dirty="0" smtClean="0"/>
+              <a:t>, </a:t>
+            </a:r>
+            <a:r>
+              <a:rPr lang="en-US" dirty="0" err="1" smtClean="0">
+                <a:solidFill>
+                  <a:schemeClr val="tx2"/>
+                </a:solidFill>
+              </a:rPr>
+              <a:t>linspace</a:t>
+            </a:r>
+            <a:r>
+              <a:rPr lang="en-US" dirty="0" smtClean="0"/>
+              <a:t>, </a:t>
+            </a:r>
+            <a:r>
+              <a:rPr lang="en-US" dirty="0" smtClean="0">
+                <a:solidFill>
+                  <a:schemeClr val="tx2"/>
+                </a:solidFill>
+              </a:rPr>
+              <a:t>eye</a:t>
+            </a:r>
+            <a:r>
+              <a:rPr lang="en-US" dirty="0" smtClean="0"/>
+              <a:t>, </a:t>
+            </a:r>
+            <a:r>
+              <a:rPr lang="en-US" dirty="0" smtClean="0">
+                <a:solidFill>
+                  <a:schemeClr val="tx2"/>
+                </a:solidFill>
+              </a:rPr>
+              <a:t>ones</a:t>
+            </a:r>
+            <a:r>
+              <a:rPr lang="en-US" dirty="0" smtClean="0"/>
+              <a:t>, </a:t>
+            </a:r>
+            <a:r>
+              <a:rPr lang="en-US" dirty="0" smtClean="0">
+                <a:solidFill>
+                  <a:schemeClr val="tx2"/>
+                </a:solidFill>
+              </a:rPr>
+              <a:t>zeros</a:t>
+            </a:r>
           </a:p>
         </p:txBody>
       </p:sp>
     </p:spTree>
     <p:extLst>
       <p:ext uri="{BB962C8B-B14F-4D97-AF65-F5344CB8AC3E}">
-        <p14:creationId xmlns:p14="http://schemas.microsoft.com/office/powerpoint/2010/main" val="3516584271"/>
+        <p14:creationId xmlns:p14="http://schemas.microsoft.com/office/powerpoint/2010/main" val="716624712"/>
       </p:ext>
     </p:extLst>
   </p:cSld>
   <p:clrMapOvr>
     <a:masterClrMapping/>
   </p:clrMapOvr>
+  <p:timing>
+    <p:tnLst>
+      <p:par>
+        <p:cTn id="1" dur="indefinite" restart="never" nodeType="tmRoot">
+          <p:childTnLst>
+            <p:seq concurrent="1" nextAc="seek">
+              <p:cTn id="2" dur="indefinite" nodeType="mainSeq">
+                <p:childTnLst>
+                  <p:par>
+                    <p:cTn id="3" fill="hold">
+                      <p:stCondLst>
+                        <p:cond delay="indefinite"/>
+                      </p:stCondLst>
+                      <p:childTnLst>
+                        <p:par>
+                          <p:cTn id="4" fill="hold">
+                            <p:stCondLst>
+                              <p:cond delay="0"/>
+                            </p:stCondLst>
+                            <p:childTnLst>
+                              <p:par>
+                                <p:cTn id="5" presetID="1" presetClass="entr" presetSubtype="0" fill="hold" nodeType="clickEffect">
+                                  <p:stCondLst>
+                                    <p:cond delay="0"/>
+                                  </p:stCondLst>
+                                  <p:childTnLst>
+                                    <p:set>
+                                      <p:cBhvr>
+                                        <p:cTn id="6" dur="1" fill="hold">
+                                          <p:stCondLst>
+                                            <p:cond delay="0"/>
+                                          </p:stCondLst>
+                                        </p:cTn>
+                                        <p:tgtEl>
+                                          <p:spTgt spid="3">
+                                            <p:txEl>
+                                              <p:pRg st="1" end="1"/>
+                                            </p:txEl>
+                                          </p:spTgt>
+                                        </p:tgtEl>
+                                        <p:attrNameLst>
+                                          <p:attrName>style.visibility</p:attrName>
+                                        </p:attrNameLst>
+                                      </p:cBhvr>
+                                      <p:to>
+                                        <p:strVal val="visible"/>
+                                      </p:to>
+                                    </p:set>
+                                  </p:childTnLst>
+                                </p:cTn>
+                              </p:par>
+                            </p:childTnLst>
+                          </p:cTn>
+                        </p:par>
+                      </p:childTnLst>
+                    </p:cTn>
+                  </p:par>
+                  <p:par>
+                    <p:cTn id="7" fill="hold">
+                      <p:stCondLst>
+                        <p:cond delay="indefinite"/>
+                      </p:stCondLst>
+                      <p:childTnLst>
+                        <p:par>
+                          <p:cTn id="8" fill="hold">
+                            <p:stCondLst>
+                              <p:cond delay="0"/>
+                            </p:stCondLst>
+                            <p:childTnLst>
+                              <p:par>
+                                <p:cTn id="9" presetID="1" presetClass="entr" presetSubtype="0" fill="hold" nodeType="clickEffect">
+                                  <p:stCondLst>
+                                    <p:cond delay="0"/>
+                                  </p:stCondLst>
+                                  <p:childTnLst>
+                                    <p:set>
+                                      <p:cBhvr>
+                                        <p:cTn id="10" dur="1" fill="hold">
+                                          <p:stCondLst>
+                                            <p:cond delay="0"/>
+                                          </p:stCondLst>
+                                        </p:cTn>
+                                        <p:tgtEl>
+                                          <p:spTgt spid="3">
+                                            <p:txEl>
+                                              <p:pRg st="2" end="2"/>
+                                            </p:txEl>
+                                          </p:spTgt>
+                                        </p:tgtEl>
+                                        <p:attrNameLst>
+                                          <p:attrName>style.visibility</p:attrName>
+                                        </p:attrNameLst>
+                                      </p:cBhvr>
+                                      <p:to>
+                                        <p:strVal val="visible"/>
+                                      </p:to>
+                                    </p:set>
+                                  </p:childTnLst>
+                                </p:cTn>
+                              </p:par>
+                            </p:childTnLst>
+                          </p:cTn>
+                        </p:par>
+                      </p:childTnLst>
+                    </p:cTn>
+                  </p:par>
+                </p:childTnLst>
+              </p:cTn>
+              <p:prevCondLst>
+                <p:cond evt="onPrev" delay="0">
+                  <p:tgtEl>
+                    <p:sldTgt/>
+                  </p:tgtEl>
+                </p:cond>
+              </p:prevCondLst>
+              <p:nextCondLst>
+                <p:cond evt="onNext" delay="0">
+                  <p:tgtEl>
+                    <p:sldTgt/>
+                  </p:tgtEl>
+                </p:cond>
+              </p:nextCondLst>
+            </p:seq>
+          </p:childTnLst>
+        </p:cTn>
+      </p:par>
+    </p:tnLst>
+  </p:timing>
 </p:sld>
 </file>
 

</xml_diff>

<commit_message>
Fleshed out astropy overview and added xkcd comic
</commit_message>
<xml_diff>
--- a/2016/computing_workgroup/python_modules/python_scientific_modules.pptx
+++ b/2016/computing_workgroup/python_modules/python_scientific_modules.pptx
@@ -5,37 +5,39 @@
     <p:sldMasterId id="2147483648" r:id="rId1"/>
   </p:sldMasterIdLst>
   <p:notesMasterIdLst>
-    <p:notesMasterId r:id="rId30"/>
+    <p:notesMasterId r:id="rId32"/>
   </p:notesMasterIdLst>
   <p:sldIdLst>
     <p:sldId id="256" r:id="rId2"/>
-    <p:sldId id="352" r:id="rId3"/>
-    <p:sldId id="367" r:id="rId4"/>
-    <p:sldId id="354" r:id="rId5"/>
-    <p:sldId id="360" r:id="rId6"/>
-    <p:sldId id="359" r:id="rId7"/>
-    <p:sldId id="353" r:id="rId8"/>
-    <p:sldId id="370" r:id="rId9"/>
-    <p:sldId id="368" r:id="rId10"/>
-    <p:sldId id="381" r:id="rId11"/>
-    <p:sldId id="369" r:id="rId12"/>
-    <p:sldId id="361" r:id="rId13"/>
-    <p:sldId id="373" r:id="rId14"/>
-    <p:sldId id="375" r:id="rId15"/>
-    <p:sldId id="378" r:id="rId16"/>
-    <p:sldId id="379" r:id="rId17"/>
-    <p:sldId id="380" r:id="rId18"/>
-    <p:sldId id="371" r:id="rId19"/>
-    <p:sldId id="358" r:id="rId20"/>
-    <p:sldId id="365" r:id="rId21"/>
+    <p:sldId id="382" r:id="rId3"/>
+    <p:sldId id="352" r:id="rId4"/>
+    <p:sldId id="367" r:id="rId5"/>
+    <p:sldId id="354" r:id="rId6"/>
+    <p:sldId id="360" r:id="rId7"/>
+    <p:sldId id="359" r:id="rId8"/>
+    <p:sldId id="353" r:id="rId9"/>
+    <p:sldId id="370" r:id="rId10"/>
+    <p:sldId id="368" r:id="rId11"/>
+    <p:sldId id="381" r:id="rId12"/>
+    <p:sldId id="369" r:id="rId13"/>
+    <p:sldId id="361" r:id="rId14"/>
+    <p:sldId id="373" r:id="rId15"/>
+    <p:sldId id="375" r:id="rId16"/>
+    <p:sldId id="378" r:id="rId17"/>
+    <p:sldId id="379" r:id="rId18"/>
+    <p:sldId id="380" r:id="rId19"/>
+    <p:sldId id="371" r:id="rId20"/>
+    <p:sldId id="358" r:id="rId21"/>
     <p:sldId id="355" r:id="rId22"/>
-    <p:sldId id="339" r:id="rId23"/>
-    <p:sldId id="340" r:id="rId24"/>
-    <p:sldId id="357" r:id="rId25"/>
-    <p:sldId id="362" r:id="rId26"/>
-    <p:sldId id="364" r:id="rId27"/>
-    <p:sldId id="356" r:id="rId28"/>
-    <p:sldId id="366" r:id="rId29"/>
+    <p:sldId id="383" r:id="rId23"/>
+    <p:sldId id="339" r:id="rId24"/>
+    <p:sldId id="340" r:id="rId25"/>
+    <p:sldId id="365" r:id="rId26"/>
+    <p:sldId id="357" r:id="rId27"/>
+    <p:sldId id="362" r:id="rId28"/>
+    <p:sldId id="364" r:id="rId29"/>
+    <p:sldId id="356" r:id="rId30"/>
+    <p:sldId id="366" r:id="rId31"/>
   </p:sldIdLst>
   <p:sldSz cx="9144000" cy="6858000" type="screen4x3"/>
   <p:notesSz cx="6858000" cy="9144000"/>
@@ -235,7 +237,7 @@
           <a:p>
             <a:fld id="{6096A192-89F2-44C6-B07F-1B83CE44D511}" type="datetimeFigureOut">
               <a:rPr lang="en-US" smtClean="0"/>
-              <a:t>9/8/2016</a:t>
+              <a:t>9/12/2016</a:t>
             </a:fld>
             <a:endParaRPr lang="en-US"/>
           </a:p>
@@ -796,7 +798,7 @@
           <a:p>
             <a:fld id="{7181039F-CB0C-E14D-A7EF-3BACE2CEF4EA}" type="datetimeFigureOut">
               <a:rPr lang="en-US" smtClean="0"/>
-              <a:t>9/8/2016</a:t>
+              <a:t>9/12/2016</a:t>
             </a:fld>
             <a:endParaRPr lang="en-US"/>
           </a:p>
@@ -1056,7 +1058,7 @@
           <a:p>
             <a:fld id="{7181039F-CB0C-E14D-A7EF-3BACE2CEF4EA}" type="datetimeFigureOut">
               <a:rPr lang="en-US" smtClean="0"/>
-              <a:t>9/8/2016</a:t>
+              <a:t>9/12/2016</a:t>
             </a:fld>
             <a:endParaRPr lang="en-US"/>
           </a:p>
@@ -1321,7 +1323,7 @@
           <a:p>
             <a:fld id="{7181039F-CB0C-E14D-A7EF-3BACE2CEF4EA}" type="datetimeFigureOut">
               <a:rPr lang="en-US" smtClean="0"/>
-              <a:t>9/8/2016</a:t>
+              <a:t>9/12/2016</a:t>
             </a:fld>
             <a:endParaRPr lang="en-US"/>
           </a:p>
@@ -1484,7 +1486,7 @@
           <a:p>
             <a:fld id="{7181039F-CB0C-E14D-A7EF-3BACE2CEF4EA}" type="datetimeFigureOut">
               <a:rPr lang="en-US" smtClean="0"/>
-              <a:t>9/8/2016</a:t>
+              <a:t>9/12/2016</a:t>
             </a:fld>
             <a:endParaRPr lang="en-US"/>
           </a:p>
@@ -1761,7 +1763,7 @@
           <a:p>
             <a:fld id="{7181039F-CB0C-E14D-A7EF-3BACE2CEF4EA}" type="datetimeFigureOut">
               <a:rPr lang="en-US" smtClean="0"/>
-              <a:t>9/8/2016</a:t>
+              <a:t>9/12/2016</a:t>
             </a:fld>
             <a:endParaRPr lang="en-US"/>
           </a:p>
@@ -2020,7 +2022,7 @@
           <a:p>
             <a:fld id="{7181039F-CB0C-E14D-A7EF-3BACE2CEF4EA}" type="datetimeFigureOut">
               <a:rPr lang="en-US" smtClean="0"/>
-              <a:t>9/8/2016</a:t>
+              <a:t>9/12/2016</a:t>
             </a:fld>
             <a:endParaRPr lang="en-US"/>
           </a:p>
@@ -2233,7 +2235,7 @@
           <a:p>
             <a:fld id="{7181039F-CB0C-E14D-A7EF-3BACE2CEF4EA}" type="datetimeFigureOut">
               <a:rPr lang="en-US" smtClean="0"/>
-              <a:t>9/8/2016</a:t>
+              <a:t>9/12/2016</a:t>
             </a:fld>
             <a:endParaRPr lang="en-US"/>
           </a:p>
@@ -2785,7 +2787,7 @@
         </p:spPr>
         <p:txBody>
           <a:bodyPr vert="horz" lIns="91440" tIns="45720" rIns="91440" bIns="45720" rtlCol="0">
-            <a:normAutofit fontScale="92500"/>
+            <a:normAutofit fontScale="85000" lnSpcReduction="10000"/>
           </a:bodyPr>
           <a:lstStyle>
             <a:lvl1pPr marL="0" indent="0" algn="r" defTabSz="457200" rtl="0" eaLnBrk="1" latinLnBrk="0" hangingPunct="1">
@@ -2947,7 +2949,7 @@
                 <a:latin typeface="Miriam" panose="020B0502050101010101" pitchFamily="34" charset="-79"/>
                 <a:cs typeface="Miriam" panose="020B0502050101010101" pitchFamily="34" charset="-79"/>
               </a:rPr>
-              <a:t>September 8, 2016</a:t>
+              <a:t>September 12, 2016</a:t>
             </a:fld>
             <a:endParaRPr lang="en-US" sz="1600" dirty="0" smtClean="0">
               <a:latin typeface="Miriam" panose="020B0502050101010101" pitchFamily="34" charset="-79"/>
@@ -3226,6 +3228,329 @@
           <a:lstStyle/>
           <a:p>
             <a:r>
+              <a:rPr lang="en-US" dirty="0" err="1" smtClean="0">
+                <a:solidFill>
+                  <a:schemeClr val="tx2"/>
+                </a:solidFill>
+              </a:rPr>
+              <a:t>ndarray.shape</a:t>
+            </a:r>
+            <a:r>
+              <a:rPr lang="en-US" dirty="0"/>
+              <a:t> </a:t>
+            </a:r>
+            <a:r>
+              <a:rPr lang="en-US" dirty="0" smtClean="0"/>
+              <a:t>- one-stop shop for info on what an array looks like</a:t>
+            </a:r>
+          </a:p>
+          <a:p>
+            <a:r>
+              <a:rPr lang="en-US" dirty="0" smtClean="0"/>
+              <a:t>Arithmetic operations </a:t>
+            </a:r>
+            <a:r>
+              <a:rPr lang="en-US" u="sng" dirty="0" smtClean="0"/>
+              <a:t>default to elementwise</a:t>
+            </a:r>
+            <a:r>
+              <a:rPr lang="en-US" dirty="0" smtClean="0"/>
+              <a:t>.  I.e. </a:t>
+            </a:r>
+            <a:r>
+              <a:rPr lang="en-US" dirty="0" smtClean="0">
+                <a:solidFill>
+                  <a:schemeClr val="tx2"/>
+                </a:solidFill>
+              </a:rPr>
+              <a:t>A*B</a:t>
+            </a:r>
+            <a:r>
+              <a:rPr lang="en-US" dirty="0" smtClean="0"/>
+              <a:t> does not mean inner product!  Use </a:t>
+            </a:r>
+            <a:r>
+              <a:rPr lang="en-US" dirty="0" smtClean="0">
+                <a:solidFill>
+                  <a:schemeClr val="tx2"/>
+                </a:solidFill>
+              </a:rPr>
+              <a:t>numpy.dot()</a:t>
+            </a:r>
+            <a:r>
+              <a:rPr lang="en-US" dirty="0" smtClean="0"/>
+              <a:t> instead.</a:t>
+            </a:r>
+          </a:p>
+          <a:p>
+            <a:r>
+              <a:rPr lang="en-US" dirty="0" smtClean="0"/>
+              <a:t>Useful functions: </a:t>
+            </a:r>
+            <a:r>
+              <a:rPr lang="en-US" dirty="0" err="1" smtClean="0">
+                <a:solidFill>
+                  <a:schemeClr val="tx2"/>
+                </a:solidFill>
+              </a:rPr>
+              <a:t>arange</a:t>
+            </a:r>
+            <a:r>
+              <a:rPr lang="en-US" dirty="0" smtClean="0"/>
+              <a:t>, </a:t>
+            </a:r>
+            <a:r>
+              <a:rPr lang="en-US" dirty="0" err="1" smtClean="0">
+                <a:solidFill>
+                  <a:schemeClr val="tx2"/>
+                </a:solidFill>
+              </a:rPr>
+              <a:t>linspace</a:t>
+            </a:r>
+            <a:r>
+              <a:rPr lang="en-US" dirty="0" smtClean="0"/>
+              <a:t>, </a:t>
+            </a:r>
+            <a:r>
+              <a:rPr lang="en-US" dirty="0" smtClean="0">
+                <a:solidFill>
+                  <a:schemeClr val="tx2"/>
+                </a:solidFill>
+              </a:rPr>
+              <a:t>eye</a:t>
+            </a:r>
+            <a:r>
+              <a:rPr lang="en-US" dirty="0" smtClean="0"/>
+              <a:t>, </a:t>
+            </a:r>
+            <a:r>
+              <a:rPr lang="en-US" dirty="0" smtClean="0">
+                <a:solidFill>
+                  <a:schemeClr val="tx2"/>
+                </a:solidFill>
+              </a:rPr>
+              <a:t>ones</a:t>
+            </a:r>
+            <a:r>
+              <a:rPr lang="en-US" dirty="0" smtClean="0"/>
+              <a:t>, </a:t>
+            </a:r>
+            <a:r>
+              <a:rPr lang="en-US" dirty="0" smtClean="0">
+                <a:solidFill>
+                  <a:schemeClr val="tx2"/>
+                </a:solidFill>
+              </a:rPr>
+              <a:t>zeros</a:t>
+            </a:r>
+          </a:p>
+        </p:txBody>
+      </p:sp>
+    </p:spTree>
+    <p:extLst>
+      <p:ext uri="{BB962C8B-B14F-4D97-AF65-F5344CB8AC3E}">
+        <p14:creationId xmlns:p14="http://schemas.microsoft.com/office/powerpoint/2010/main" val="716624712"/>
+      </p:ext>
+    </p:extLst>
+  </p:cSld>
+  <p:clrMapOvr>
+    <a:masterClrMapping/>
+  </p:clrMapOvr>
+  <p:timing>
+    <p:tnLst>
+      <p:par>
+        <p:cTn id="1" dur="indefinite" restart="never" nodeType="tmRoot">
+          <p:childTnLst>
+            <p:seq concurrent="1" nextAc="seek">
+              <p:cTn id="2" dur="indefinite" nodeType="mainSeq">
+                <p:childTnLst>
+                  <p:par>
+                    <p:cTn id="3" fill="hold">
+                      <p:stCondLst>
+                        <p:cond delay="indefinite"/>
+                      </p:stCondLst>
+                      <p:childTnLst>
+                        <p:par>
+                          <p:cTn id="4" fill="hold">
+                            <p:stCondLst>
+                              <p:cond delay="0"/>
+                            </p:stCondLst>
+                            <p:childTnLst>
+                              <p:par>
+                                <p:cTn id="5" presetID="1" presetClass="entr" presetSubtype="0" fill="hold" nodeType="clickEffect">
+                                  <p:stCondLst>
+                                    <p:cond delay="0"/>
+                                  </p:stCondLst>
+                                  <p:childTnLst>
+                                    <p:set>
+                                      <p:cBhvr>
+                                        <p:cTn id="6" dur="1" fill="hold">
+                                          <p:stCondLst>
+                                            <p:cond delay="0"/>
+                                          </p:stCondLst>
+                                        </p:cTn>
+                                        <p:tgtEl>
+                                          <p:spTgt spid="3">
+                                            <p:txEl>
+                                              <p:pRg st="1" end="1"/>
+                                            </p:txEl>
+                                          </p:spTgt>
+                                        </p:tgtEl>
+                                        <p:attrNameLst>
+                                          <p:attrName>style.visibility</p:attrName>
+                                        </p:attrNameLst>
+                                      </p:cBhvr>
+                                      <p:to>
+                                        <p:strVal val="visible"/>
+                                      </p:to>
+                                    </p:set>
+                                  </p:childTnLst>
+                                </p:cTn>
+                              </p:par>
+                            </p:childTnLst>
+                          </p:cTn>
+                        </p:par>
+                      </p:childTnLst>
+                    </p:cTn>
+                  </p:par>
+                  <p:par>
+                    <p:cTn id="7" fill="hold">
+                      <p:stCondLst>
+                        <p:cond delay="indefinite"/>
+                      </p:stCondLst>
+                      <p:childTnLst>
+                        <p:par>
+                          <p:cTn id="8" fill="hold">
+                            <p:stCondLst>
+                              <p:cond delay="0"/>
+                            </p:stCondLst>
+                            <p:childTnLst>
+                              <p:par>
+                                <p:cTn id="9" presetID="1" presetClass="entr" presetSubtype="0" fill="hold" nodeType="clickEffect">
+                                  <p:stCondLst>
+                                    <p:cond delay="0"/>
+                                  </p:stCondLst>
+                                  <p:childTnLst>
+                                    <p:set>
+                                      <p:cBhvr>
+                                        <p:cTn id="10" dur="1" fill="hold">
+                                          <p:stCondLst>
+                                            <p:cond delay="0"/>
+                                          </p:stCondLst>
+                                        </p:cTn>
+                                        <p:tgtEl>
+                                          <p:spTgt spid="3">
+                                            <p:txEl>
+                                              <p:pRg st="2" end="2"/>
+                                            </p:txEl>
+                                          </p:spTgt>
+                                        </p:tgtEl>
+                                        <p:attrNameLst>
+                                          <p:attrName>style.visibility</p:attrName>
+                                        </p:attrNameLst>
+                                      </p:cBhvr>
+                                      <p:to>
+                                        <p:strVal val="visible"/>
+                                      </p:to>
+                                    </p:set>
+                                  </p:childTnLst>
+                                </p:cTn>
+                              </p:par>
+                            </p:childTnLst>
+                          </p:cTn>
+                        </p:par>
+                      </p:childTnLst>
+                    </p:cTn>
+                  </p:par>
+                </p:childTnLst>
+              </p:cTn>
+              <p:prevCondLst>
+                <p:cond evt="onPrev" delay="0">
+                  <p:tgtEl>
+                    <p:sldTgt/>
+                  </p:tgtEl>
+                </p:cond>
+              </p:prevCondLst>
+              <p:nextCondLst>
+                <p:cond evt="onNext" delay="0">
+                  <p:tgtEl>
+                    <p:sldTgt/>
+                  </p:tgtEl>
+                </p:cond>
+              </p:nextCondLst>
+            </p:seq>
+          </p:childTnLst>
+        </p:cTn>
+      </p:par>
+    </p:tnLst>
+  </p:timing>
+</p:sld>
+</file>
+
+<file path=ppt/slides/slide11.xml><?xml version="1.0" encoding="utf-8"?>
+<p:sld xmlns:a="http://schemas.openxmlformats.org/drawingml/2006/main" xmlns:r="http://schemas.openxmlformats.org/officeDocument/2006/relationships" xmlns:p="http://schemas.openxmlformats.org/presentationml/2006/main">
+  <p:cSld>
+    <p:spTree>
+      <p:nvGrpSpPr>
+        <p:cNvPr id="1" name=""/>
+        <p:cNvGrpSpPr/>
+        <p:nvPr/>
+      </p:nvGrpSpPr>
+      <p:grpSpPr>
+        <a:xfrm>
+          <a:off x="0" y="0"/>
+          <a:ext cx="0" cy="0"/>
+          <a:chOff x="0" y="0"/>
+          <a:chExt cx="0" cy="0"/>
+        </a:xfrm>
+      </p:grpSpPr>
+      <p:sp>
+        <p:nvSpPr>
+          <p:cNvPr id="2" name="Title 1"/>
+          <p:cNvSpPr>
+            <a:spLocks noGrp="1"/>
+          </p:cNvSpPr>
+          <p:nvPr>
+            <p:ph type="title"/>
+          </p:nvPr>
+        </p:nvSpPr>
+        <p:spPr/>
+        <p:txBody>
+          <a:bodyPr/>
+          <a:lstStyle/>
+          <a:p>
+            <a:r>
+              <a:rPr lang="en-US" dirty="0" smtClean="0"/>
+              <a:t>Misc. </a:t>
+            </a:r>
+            <a:r>
+              <a:rPr lang="en-US" dirty="0" err="1" smtClean="0"/>
+              <a:t>Numpy</a:t>
+            </a:r>
+            <a:r>
+              <a:rPr lang="en-US" dirty="0" smtClean="0"/>
+              <a:t> tips</a:t>
+            </a:r>
+            <a:endParaRPr lang="en-US" dirty="0"/>
+          </a:p>
+        </p:txBody>
+      </p:sp>
+      <p:sp>
+        <p:nvSpPr>
+          <p:cNvPr id="3" name="Content Placeholder 2"/>
+          <p:cNvSpPr>
+            <a:spLocks noGrp="1"/>
+          </p:cNvSpPr>
+          <p:nvPr>
+            <p:ph idx="1"/>
+          </p:nvPr>
+        </p:nvSpPr>
+        <p:spPr/>
+        <p:txBody>
+          <a:bodyPr/>
+          <a:lstStyle/>
+          <a:p>
+            <a:r>
               <a:rPr lang="en-US" dirty="0" smtClean="0"/>
               <a:t>Division by zero, </a:t>
             </a:r>
@@ -3282,7 +3607,7 @@
 </p:sld>
 </file>
 
-<file path=ppt/slides/slide11.xml><?xml version="1.0" encoding="utf-8"?>
+<file path=ppt/slides/slide12.xml><?xml version="1.0" encoding="utf-8"?>
 <p:sld xmlns:a="http://schemas.openxmlformats.org/drawingml/2006/main" xmlns:r="http://schemas.openxmlformats.org/officeDocument/2006/relationships" xmlns:p="http://schemas.openxmlformats.org/presentationml/2006/main">
   <p:cSld>
     <p:spTree>
@@ -3589,7 +3914,7 @@
 </p:sld>
 </file>
 
-<file path=ppt/slides/slide12.xml><?xml version="1.0" encoding="utf-8"?>
+<file path=ppt/slides/slide13.xml><?xml version="1.0" encoding="utf-8"?>
 <p:sld xmlns:a="http://schemas.openxmlformats.org/drawingml/2006/main" xmlns:r="http://schemas.openxmlformats.org/officeDocument/2006/relationships" xmlns:p="http://schemas.openxmlformats.org/presentationml/2006/main">
   <p:cSld>
     <p:spTree>
@@ -3694,7 +4019,6 @@
               <a:rPr lang="en-US" dirty="0" smtClean="0"/>
               <a:t>.”</a:t>
             </a:r>
-            <a:endParaRPr lang="en-US" dirty="0" smtClean="0"/>
           </a:p>
           <a:p>
             <a:endParaRPr lang="en-US" dirty="0" smtClean="0"/>
@@ -3721,7 +4045,7 @@
 </p:sld>
 </file>
 
-<file path=ppt/slides/slide13.xml><?xml version="1.0" encoding="utf-8"?>
+<file path=ppt/slides/slide14.xml><?xml version="1.0" encoding="utf-8"?>
 <p:sld xmlns:a="http://schemas.openxmlformats.org/drawingml/2006/main" xmlns:r="http://schemas.openxmlformats.org/officeDocument/2006/relationships" xmlns:p="http://schemas.openxmlformats.org/presentationml/2006/main">
   <p:cSld>
     <p:spTree>
@@ -3805,7 +4129,6 @@
               <a:rPr lang="en-US" dirty="0" smtClean="0"/>
               <a:t>These are the ones we’ll talk about.</a:t>
             </a:r>
-            <a:endParaRPr lang="en-US" dirty="0" smtClean="0"/>
           </a:p>
         </p:txBody>
       </p:sp>
@@ -4228,107 +4551,6 @@
 </p:sld>
 </file>
 
-<file path=ppt/slides/slide14.xml><?xml version="1.0" encoding="utf-8"?>
-<p:sld xmlns:a="http://schemas.openxmlformats.org/drawingml/2006/main" xmlns:r="http://schemas.openxmlformats.org/officeDocument/2006/relationships" xmlns:p="http://schemas.openxmlformats.org/presentationml/2006/main">
-  <p:cSld>
-    <p:spTree>
-      <p:nvGrpSpPr>
-        <p:cNvPr id="1" name=""/>
-        <p:cNvGrpSpPr/>
-        <p:nvPr/>
-      </p:nvGrpSpPr>
-      <p:grpSpPr>
-        <a:xfrm>
-          <a:off x="0" y="0"/>
-          <a:ext cx="0" cy="0"/>
-          <a:chOff x="0" y="0"/>
-          <a:chExt cx="0" cy="0"/>
-        </a:xfrm>
-      </p:grpSpPr>
-      <p:sp>
-        <p:nvSpPr>
-          <p:cNvPr id="2" name="Title 1"/>
-          <p:cNvSpPr>
-            <a:spLocks noGrp="1"/>
-          </p:cNvSpPr>
-          <p:nvPr>
-            <p:ph type="title"/>
-          </p:nvPr>
-        </p:nvSpPr>
-        <p:spPr/>
-        <p:txBody>
-          <a:bodyPr/>
-          <a:lstStyle/>
-          <a:p>
-            <a:r>
-              <a:rPr lang="en-US" dirty="0" err="1" smtClean="0"/>
-              <a:t>scipy.integrate</a:t>
-            </a:r>
-            <a:endParaRPr lang="en-US" dirty="0"/>
-          </a:p>
-        </p:txBody>
-      </p:sp>
-      <p:sp>
-        <p:nvSpPr>
-          <p:cNvPr id="3" name="Content Placeholder 2"/>
-          <p:cNvSpPr>
-            <a:spLocks noGrp="1"/>
-          </p:cNvSpPr>
-          <p:nvPr>
-            <p:ph idx="1"/>
-          </p:nvPr>
-        </p:nvSpPr>
-        <p:spPr/>
-        <p:txBody>
-          <a:bodyPr>
-            <a:normAutofit/>
-          </a:bodyPr>
-          <a:lstStyle/>
-          <a:p>
-            <a:r>
-              <a:rPr lang="en-US" dirty="0" smtClean="0"/>
-              <a:t>Simple example of integration</a:t>
-            </a:r>
-          </a:p>
-          <a:p>
-            <a:r>
-              <a:rPr lang="en-US" dirty="0" smtClean="0"/>
-              <a:t>Brief discussion of options</a:t>
-            </a:r>
-          </a:p>
-          <a:p>
-            <a:r>
-              <a:rPr lang="en-US" dirty="0" smtClean="0"/>
-              <a:t>Special callout of </a:t>
-            </a:r>
-            <a:r>
-              <a:rPr lang="en-US" dirty="0" err="1" smtClean="0"/>
-              <a:t>odeint</a:t>
-            </a:r>
-            <a:endParaRPr lang="en-US" dirty="0" smtClean="0"/>
-          </a:p>
-        </p:txBody>
-      </p:sp>
-    </p:spTree>
-    <p:extLst>
-      <p:ext uri="{BB962C8B-B14F-4D97-AF65-F5344CB8AC3E}">
-        <p14:creationId xmlns:p14="http://schemas.microsoft.com/office/powerpoint/2010/main" val="2908805790"/>
-      </p:ext>
-    </p:extLst>
-  </p:cSld>
-  <p:clrMapOvr>
-    <a:masterClrMapping/>
-  </p:clrMapOvr>
-  <p:timing>
-    <p:tnLst>
-      <p:par>
-        <p:cTn id="1" dur="indefinite" restart="never" nodeType="tmRoot"/>
-      </p:par>
-    </p:tnLst>
-  </p:timing>
-</p:sld>
-</file>
-
 <file path=ppt/slides/slide15.xml><?xml version="1.0" encoding="utf-8"?>
 <p:sld xmlns:a="http://schemas.openxmlformats.org/drawingml/2006/main" xmlns:r="http://schemas.openxmlformats.org/officeDocument/2006/relationships" xmlns:p="http://schemas.openxmlformats.org/presentationml/2006/main">
   <p:cSld>
@@ -4363,7 +4585,7 @@
           <a:p>
             <a:r>
               <a:rPr lang="en-US" dirty="0" err="1" smtClean="0"/>
-              <a:t>scipy.optimize</a:t>
+              <a:t>scipy.integrate</a:t>
             </a:r>
             <a:endParaRPr lang="en-US" dirty="0"/>
           </a:p>
@@ -4388,71 +4610,32 @@
           <a:p>
             <a:r>
               <a:rPr lang="en-US" dirty="0" smtClean="0"/>
-              <a:t>Multiple minimization algorithms</a:t>
-            </a:r>
-          </a:p>
-          <a:p>
-            <a:r>
-              <a:rPr lang="en-US" dirty="0" smtClean="0"/>
-              <a:t>Fitting example </a:t>
-            </a:r>
-            <a:r>
-              <a:rPr lang="en-US" dirty="0"/>
-              <a:t>from cookbook:</a:t>
-            </a:r>
-            <a:br>
-              <a:rPr lang="en-US" dirty="0"/>
-            </a:br>
-            <a:r>
-              <a:rPr lang="en-US" sz="1800" dirty="0">
-                <a:hlinkClick r:id="rId2"/>
-              </a:rPr>
-              <a:t>http://</a:t>
-            </a:r>
-            <a:r>
-              <a:rPr lang="en-US" sz="1800" dirty="0" smtClean="0">
-                <a:hlinkClick r:id="rId2"/>
-              </a:rPr>
-              <a:t>scipy-cookbook.readthedocs.io/items/FittingData.html</a:t>
-            </a:r>
-            <a:r>
-              <a:rPr lang="en-US" sz="1800" dirty="0" smtClean="0"/>
-              <a:t> </a:t>
-            </a:r>
-          </a:p>
-          <a:p>
-            <a:r>
-              <a:rPr lang="en-US" dirty="0" smtClean="0"/>
-              <a:t>Optimization is a </a:t>
-            </a:r>
-            <a:r>
-              <a:rPr lang="en-US" u="sng" dirty="0" smtClean="0"/>
-              <a:t>very</a:t>
-            </a:r>
-            <a:r>
-              <a:rPr lang="en-US" dirty="0" smtClean="0"/>
-              <a:t> tricky subject, so be careful!</a:t>
-            </a:r>
-          </a:p>
-          <a:p>
-            <a:pPr lvl="1"/>
-            <a:r>
-              <a:rPr lang="en-US" dirty="0" smtClean="0"/>
-              <a:t>…but for common problems, this will do well</a:t>
-            </a:r>
-          </a:p>
-          <a:p>
-            <a:r>
-              <a:rPr lang="en-US" dirty="0" smtClean="0"/>
-              <a:t>Non-linear solvers callout</a:t>
-            </a:r>
+              <a:t>Simple example of integration</a:t>
+            </a:r>
+          </a:p>
+          <a:p>
+            <a:r>
+              <a:rPr lang="en-US" dirty="0" smtClean="0"/>
+              <a:t>Brief discussion of options</a:t>
+            </a:r>
+          </a:p>
+          <a:p>
+            <a:r>
+              <a:rPr lang="en-US" dirty="0" smtClean="0"/>
+              <a:t>Special callout of </a:t>
+            </a:r>
+            <a:r>
+              <a:rPr lang="en-US" dirty="0" err="1" smtClean="0"/>
+              <a:t>odeint</a:t>
+            </a:r>
+            <a:endParaRPr lang="en-US" dirty="0" smtClean="0"/>
           </a:p>
         </p:txBody>
       </p:sp>
     </p:spTree>
     <p:extLst>
       <p:ext uri="{BB962C8B-B14F-4D97-AF65-F5344CB8AC3E}">
-        <p14:creationId xmlns:p14="http://schemas.microsoft.com/office/powerpoint/2010/main" val="2081694504"/>
+        <p14:creationId xmlns:p14="http://schemas.microsoft.com/office/powerpoint/2010/main" val="2908805790"/>
       </p:ext>
     </p:extLst>
   </p:cSld>
@@ -4503,7 +4686,7 @@
           <a:p>
             <a:r>
               <a:rPr lang="en-US" dirty="0" err="1" smtClean="0"/>
-              <a:t>scipy.signal</a:t>
+              <a:t>scipy.optimize</a:t>
             </a:r>
             <a:endParaRPr lang="en-US" dirty="0"/>
           </a:p>
@@ -4522,57 +4705,77 @@
         <p:spPr/>
         <p:txBody>
           <a:bodyPr>
-            <a:normAutofit lnSpcReduction="10000"/>
+            <a:normAutofit/>
           </a:bodyPr>
           <a:lstStyle/>
           <a:p>
             <a:r>
               <a:rPr lang="en-US" dirty="0" smtClean="0"/>
-              <a:t>A variety of tools for splining and filtering of 1D/2D data</a:t>
-            </a:r>
-          </a:p>
-          <a:p>
-            <a:r>
-              <a:rPr lang="en-US" dirty="0" smtClean="0"/>
-              <a:t>Chirp generation</a:t>
-            </a:r>
-            <a:endParaRPr lang="en-US" dirty="0" smtClean="0"/>
-          </a:p>
-          <a:p>
-            <a:r>
-              <a:rPr lang="en-US" dirty="0" smtClean="0"/>
-              <a:t>Low/high/bandpass filter example (see cookbook)</a:t>
-            </a:r>
-          </a:p>
-          <a:p>
-            <a:r>
-              <a:rPr lang="en-US" dirty="0" smtClean="0"/>
-              <a:t>Also of interest is </a:t>
-            </a:r>
-            <a:r>
-              <a:rPr lang="en-US" dirty="0" err="1" smtClean="0">
-                <a:solidFill>
-                  <a:schemeClr val="tx2"/>
-                </a:solidFill>
+              <a:t>Multiple minimization algorithms</a:t>
+            </a:r>
+          </a:p>
+          <a:p>
+            <a:r>
+              <a:rPr lang="en-US" dirty="0" smtClean="0"/>
+              <a:t>Fitting example </a:t>
+            </a:r>
+            <a:r>
+              <a:rPr lang="en-US" dirty="0"/>
+              <a:t>from cookbook:</a:t>
+            </a:r>
+            <a:br>
+              <a:rPr lang="en-US" dirty="0"/>
+            </a:br>
+            <a:r>
+              <a:rPr lang="en-US" sz="1800" dirty="0">
+                <a:hlinkClick r:id="rId2"/>
               </a:rPr>
-              <a:t>scipy.fftpack</a:t>
-            </a:r>
-            <a:r>
-              <a:rPr lang="en-US" dirty="0" smtClean="0"/>
-              <a:t>, which has FFT / DCT / DST transform implementations.</a:t>
-            </a:r>
-            <a:endParaRPr lang="en-US" dirty="0" smtClean="0">
-              <a:solidFill>
-                <a:schemeClr val="tx2"/>
-              </a:solidFill>
-            </a:endParaRPr>
+              <a:t>http://</a:t>
+            </a:r>
+            <a:r>
+              <a:rPr lang="en-US" sz="1800" dirty="0" smtClean="0">
+                <a:hlinkClick r:id="rId2"/>
+              </a:rPr>
+              <a:t>scipy-cookbook.readthedocs.io/items/FittingData.html</a:t>
+            </a:r>
+            <a:r>
+              <a:rPr lang="en-US" sz="1800" dirty="0" smtClean="0"/>
+              <a:t> </a:t>
+            </a:r>
+          </a:p>
+          <a:p>
+            <a:r>
+              <a:rPr lang="en-US" dirty="0" smtClean="0"/>
+              <a:t>Optimization is a </a:t>
+            </a:r>
+            <a:r>
+              <a:rPr lang="en-US" u="sng" dirty="0" smtClean="0"/>
+              <a:t>very</a:t>
+            </a:r>
+            <a:r>
+              <a:rPr lang="en-US" dirty="0" smtClean="0"/>
+              <a:t> tricky subject, so be careful!</a:t>
+            </a:r>
+          </a:p>
+          <a:p>
+            <a:pPr lvl="1"/>
+            <a:r>
+              <a:rPr lang="en-US" dirty="0" smtClean="0"/>
+              <a:t>…but for common problems, this will do well</a:t>
+            </a:r>
+          </a:p>
+          <a:p>
+            <a:r>
+              <a:rPr lang="en-US" dirty="0" smtClean="0"/>
+              <a:t>Non-linear solvers callout</a:t>
+            </a:r>
           </a:p>
         </p:txBody>
       </p:sp>
     </p:spTree>
     <p:extLst>
       <p:ext uri="{BB962C8B-B14F-4D97-AF65-F5344CB8AC3E}">
-        <p14:creationId xmlns:p14="http://schemas.microsoft.com/office/powerpoint/2010/main" val="1060536086"/>
+        <p14:creationId xmlns:p14="http://schemas.microsoft.com/office/powerpoint/2010/main" val="2081694504"/>
       </p:ext>
     </p:extLst>
   </p:cSld>
@@ -4623,7 +4826,7 @@
           <a:p>
             <a:r>
               <a:rPr lang="en-US" dirty="0" err="1" smtClean="0"/>
-              <a:t>scipy.stats</a:t>
+              <a:t>scipy.signal</a:t>
             </a:r>
             <a:endParaRPr lang="en-US" dirty="0"/>
           </a:p>
@@ -4642,46 +4845,56 @@
         <p:spPr/>
         <p:txBody>
           <a:bodyPr>
-            <a:normAutofit/>
+            <a:normAutofit lnSpcReduction="10000"/>
           </a:bodyPr>
           <a:lstStyle/>
           <a:p>
             <a:r>
               <a:rPr lang="en-US" dirty="0" smtClean="0"/>
-              <a:t>Large number of available distributions for sampling random variables</a:t>
-            </a:r>
-          </a:p>
-          <a:p>
-            <a:r>
-              <a:rPr lang="en-US" dirty="0" smtClean="0"/>
-              <a:t>Some statistical tests, methods</a:t>
-            </a:r>
-          </a:p>
-          <a:p>
-            <a:r>
-              <a:rPr lang="en-US" dirty="0">
-                <a:hlinkClick r:id="rId2"/>
+              <a:t>A variety of tools for splining and filtering of 1D/2D data</a:t>
+            </a:r>
+          </a:p>
+          <a:p>
+            <a:r>
+              <a:rPr lang="en-US" dirty="0" smtClean="0"/>
+              <a:t>Chirp generation</a:t>
+            </a:r>
+          </a:p>
+          <a:p>
+            <a:r>
+              <a:rPr lang="en-US" dirty="0" smtClean="0"/>
+              <a:t>Low/high/bandpass filter example (see cookbook)</a:t>
+            </a:r>
+          </a:p>
+          <a:p>
+            <a:r>
+              <a:rPr lang="en-US" dirty="0" smtClean="0"/>
+              <a:t>Also of interest is </a:t>
+            </a:r>
+            <a:r>
+              <a:rPr lang="en-US" dirty="0" err="1" smtClean="0">
+                <a:solidFill>
+                  <a:schemeClr val="tx2"/>
+                </a:solidFill>
               </a:rPr>
-              <a:t>http://</a:t>
-            </a:r>
-            <a:r>
-              <a:rPr lang="en-US" dirty="0" smtClean="0">
-                <a:hlinkClick r:id="rId2"/>
-              </a:rPr>
-              <a:t>www.scipy-lectures.org/packages/statistics</a:t>
-            </a:r>
-            <a:r>
-              <a:rPr lang="en-US" dirty="0" smtClean="0"/>
-              <a:t> </a:t>
-            </a:r>
-            <a:endParaRPr lang="en-US" dirty="0" smtClean="0"/>
+              <a:t>scipy.fftpack</a:t>
+            </a:r>
+            <a:r>
+              <a:rPr lang="en-US" dirty="0" smtClean="0"/>
+              <a:t>, which has FFT / DCT / DST transform implementations.</a:t>
+            </a:r>
+            <a:endParaRPr lang="en-US" dirty="0" smtClean="0">
+              <a:solidFill>
+                <a:schemeClr val="tx2"/>
+              </a:solidFill>
+            </a:endParaRPr>
           </a:p>
         </p:txBody>
       </p:sp>
     </p:spTree>
     <p:extLst>
       <p:ext uri="{BB962C8B-B14F-4D97-AF65-F5344CB8AC3E}">
-        <p14:creationId xmlns:p14="http://schemas.microsoft.com/office/powerpoint/2010/main" val="1101753542"/>
+        <p14:creationId xmlns:p14="http://schemas.microsoft.com/office/powerpoint/2010/main" val="1060536086"/>
       </p:ext>
     </p:extLst>
   </p:cSld>
@@ -4732,11 +4945,7 @@
           <a:p>
             <a:r>
               <a:rPr lang="en-US" dirty="0" err="1" smtClean="0"/>
-              <a:t>SciPy</a:t>
-            </a:r>
-            <a:r>
-              <a:rPr lang="en-US" dirty="0" smtClean="0"/>
-              <a:t> library</a:t>
+              <a:t>scipy.stats</a:t>
             </a:r>
             <a:endParaRPr lang="en-US" dirty="0"/>
           </a:p>
@@ -4754,61 +4963,46 @@
         </p:nvSpPr>
         <p:spPr/>
         <p:txBody>
-          <a:bodyPr/>
+          <a:bodyPr>
+            <a:normAutofit/>
+          </a:bodyPr>
           <a:lstStyle/>
           <a:p>
             <a:r>
-              <a:rPr lang="en-US" dirty="0"/>
-              <a:t>Tons of </a:t>
-            </a:r>
-            <a:r>
-              <a:rPr lang="en-US" dirty="0" smtClean="0"/>
-              <a:t>examples </a:t>
-            </a:r>
-            <a:r>
-              <a:rPr lang="en-US" dirty="0"/>
-              <a:t>in the cookbook:</a:t>
-            </a:r>
-          </a:p>
-          <a:p>
-            <a:pPr lvl="1"/>
-            <a:r>
-              <a:rPr lang="en-US" sz="2400" dirty="0">
+              <a:rPr lang="en-US" dirty="0" smtClean="0"/>
+              <a:t>Large number of available distributions for sampling random variables</a:t>
+            </a:r>
+          </a:p>
+          <a:p>
+            <a:r>
+              <a:rPr lang="en-US" dirty="0" smtClean="0"/>
+              <a:t>Some statistical tests, methods</a:t>
+            </a:r>
+          </a:p>
+          <a:p>
+            <a:r>
+              <a:rPr lang="en-US" dirty="0">
                 <a:hlinkClick r:id="rId2"/>
               </a:rPr>
-              <a:t>http://scipy-cookbook.readthedocs.io/</a:t>
-            </a:r>
-            <a:r>
-              <a:rPr lang="en-US" sz="2400" dirty="0"/>
+              <a:t>http://</a:t>
+            </a:r>
+            <a:r>
+              <a:rPr lang="en-US" dirty="0" smtClean="0">
+                <a:hlinkClick r:id="rId2"/>
+              </a:rPr>
+              <a:t>www.scipy-lectures.org/packages/statistics</a:t>
+            </a:r>
+            <a:r>
+              <a:rPr lang="en-US" dirty="0" smtClean="0"/>
               <a:t> </a:t>
             </a:r>
-          </a:p>
-          <a:p>
-            <a:r>
-              <a:rPr lang="en-US" dirty="0"/>
-              <a:t>Full documentation:</a:t>
-            </a:r>
-          </a:p>
-          <a:p>
-            <a:pPr lvl="1"/>
-            <a:r>
-              <a:rPr lang="en-US" sz="2400" dirty="0">
-                <a:hlinkClick r:id="rId3"/>
-              </a:rPr>
-              <a:t>http://docs.scipy.org/doc/scipy-0.18.0/reference/</a:t>
-            </a:r>
-            <a:r>
-              <a:rPr lang="en-US" sz="2400" dirty="0"/>
-              <a:t> </a:t>
-            </a:r>
-            <a:endParaRPr lang="en-US" sz="2400" dirty="0"/>
           </a:p>
         </p:txBody>
       </p:sp>
     </p:spTree>
     <p:extLst>
       <p:ext uri="{BB962C8B-B14F-4D97-AF65-F5344CB8AC3E}">
-        <p14:creationId xmlns:p14="http://schemas.microsoft.com/office/powerpoint/2010/main" val="1157796221"/>
+        <p14:creationId xmlns:p14="http://schemas.microsoft.com/office/powerpoint/2010/main" val="1101753542"/>
       </p:ext>
     </p:extLst>
   </p:cSld>
@@ -4858,8 +5052,12 @@
           <a:lstStyle/>
           <a:p>
             <a:r>
-              <a:rPr lang="en-US" dirty="0" smtClean="0"/>
-              <a:t>Pandas</a:t>
+              <a:rPr lang="en-US" dirty="0" err="1" smtClean="0"/>
+              <a:t>SciPy</a:t>
+            </a:r>
+            <a:r>
+              <a:rPr lang="en-US" dirty="0" smtClean="0"/>
+              <a:t> library</a:t>
             </a:r>
             <a:endParaRPr lang="en-US" dirty="0"/>
           </a:p>
@@ -4881,23 +5079,56 @@
           <a:lstStyle/>
           <a:p>
             <a:r>
-              <a:rPr lang="en-US" dirty="0" smtClean="0"/>
-              <a:t>Basic structure: data frame</a:t>
-            </a:r>
-          </a:p>
-          <a:p>
-            <a:r>
-              <a:rPr lang="en-US" dirty="0" smtClean="0"/>
-              <a:t>Like R, but in Python!</a:t>
-            </a:r>
-            <a:endParaRPr lang="en-US" dirty="0" smtClean="0"/>
+              <a:rPr lang="en-US" dirty="0"/>
+              <a:t>Tons of </a:t>
+            </a:r>
+            <a:r>
+              <a:rPr lang="en-US" dirty="0" smtClean="0"/>
+              <a:t>examples </a:t>
+            </a:r>
+            <a:r>
+              <a:rPr lang="en-US" dirty="0"/>
+              <a:t>in the cookbook:</a:t>
+            </a:r>
+          </a:p>
+          <a:p>
+            <a:pPr lvl="1"/>
+            <a:r>
+              <a:rPr lang="en-US" sz="2400" dirty="0">
+                <a:hlinkClick r:id="rId2"/>
+              </a:rPr>
+              <a:t>http://scipy-cookbook.readthedocs.io/</a:t>
+            </a:r>
+            <a:r>
+              <a:rPr lang="en-US" sz="2400" dirty="0"/>
+              <a:t> </a:t>
+            </a:r>
+          </a:p>
+          <a:p>
+            <a:r>
+              <a:rPr lang="en-US" dirty="0"/>
+              <a:t>Full documentation:</a:t>
+            </a:r>
+          </a:p>
+          <a:p>
+            <a:pPr lvl="1"/>
+            <a:r>
+              <a:rPr lang="en-US" sz="2400" dirty="0">
+                <a:hlinkClick r:id="rId3"/>
+              </a:rPr>
+              <a:t>http://docs.scipy.org/doc/scipy-0.18.0/reference/</a:t>
+            </a:r>
+            <a:r>
+              <a:rPr lang="en-US" sz="2400" dirty="0"/>
+              <a:t> </a:t>
+            </a:r>
           </a:p>
         </p:txBody>
       </p:sp>
     </p:spTree>
     <p:extLst>
       <p:ext uri="{BB962C8B-B14F-4D97-AF65-F5344CB8AC3E}">
-        <p14:creationId xmlns:p14="http://schemas.microsoft.com/office/powerpoint/2010/main" val="3516584271"/>
+        <p14:creationId xmlns:p14="http://schemas.microsoft.com/office/powerpoint/2010/main" val="1157796221"/>
       </p:ext>
     </p:extLst>
   </p:cSld>
@@ -4931,9 +5162,80 @@
           <a:chExt cx="0" cy="0"/>
         </a:xfrm>
       </p:grpSpPr>
-      <p:sp>
-        <p:nvSpPr>
-          <p:cNvPr id="2" name="Title 1"/>
+      <p:pic>
+        <p:nvPicPr>
+          <p:cNvPr id="1026" name="Picture 2" descr="Python"/>
+          <p:cNvPicPr>
+            <a:picLocks noChangeAspect="1" noChangeArrowheads="1"/>
+          </p:cNvPicPr>
+          <p:nvPr/>
+        </p:nvPicPr>
+        <p:blipFill>
+          <a:blip r:embed="rId2">
+            <a:extLst>
+              <a:ext uri="{28A0092B-C50C-407E-A947-70E740481C1C}">
+                <a14:useLocalDpi xmlns:a14="http://schemas.microsoft.com/office/drawing/2010/main" val="0"/>
+              </a:ext>
+            </a:extLst>
+          </a:blip>
+          <a:srcRect/>
+          <a:stretch>
+            <a:fillRect/>
+          </a:stretch>
+        </p:blipFill>
+        <p:spPr bwMode="auto">
+          <a:xfrm>
+            <a:off x="2639784" y="1852933"/>
+            <a:ext cx="3864431" cy="4386653"/>
+          </a:xfrm>
+          <a:prstGeom prst="rect">
+            <a:avLst/>
+          </a:prstGeom>
+          <a:noFill/>
+          <a:extLst>
+            <a:ext uri="{909E8E84-426E-40DD-AFC4-6F175D3DCCD1}">
+              <a14:hiddenFill xmlns:a14="http://schemas.microsoft.com/office/drawing/2010/main">
+                <a:solidFill>
+                  <a:srgbClr val="FFFFFF"/>
+                </a:solidFill>
+              </a14:hiddenFill>
+            </a:ext>
+          </a:extLst>
+        </p:spPr>
+      </p:pic>
+      <p:sp>
+        <p:nvSpPr>
+          <p:cNvPr id="4" name="TextBox 3"/>
+          <p:cNvSpPr txBox="1"/>
+          <p:nvPr/>
+        </p:nvSpPr>
+        <p:spPr>
+          <a:xfrm>
+            <a:off x="2675466" y="6363670"/>
+            <a:ext cx="3793066" cy="276999"/>
+          </a:xfrm>
+          <a:prstGeom prst="rect">
+            <a:avLst/>
+          </a:prstGeom>
+          <a:noFill/>
+        </p:spPr>
+        <p:txBody>
+          <a:bodyPr wrap="square" rtlCol="0">
+            <a:spAutoFit/>
+          </a:bodyPr>
+          <a:lstStyle/>
+          <a:p>
+            <a:r>
+              <a:rPr lang="en-US" sz="1200" dirty="0" smtClean="0"/>
+              <a:t>Image from http://xkcd.com/353 under CC BY-NC 2.5</a:t>
+            </a:r>
+            <a:endParaRPr lang="en-US" sz="1200" dirty="0"/>
+          </a:p>
+        </p:txBody>
+      </p:sp>
+      <p:sp>
+        <p:nvSpPr>
+          <p:cNvPr id="7" name="Title 1"/>
           <p:cNvSpPr>
             <a:spLocks noGrp="1"/>
           </p:cNvSpPr>
@@ -4941,27 +5243,69 @@
             <p:ph type="title"/>
           </p:nvPr>
         </p:nvSpPr>
-        <p:spPr/>
+        <p:spPr>
+          <a:xfrm>
+            <a:off x="457200" y="1049177"/>
+            <a:ext cx="8229600" cy="803756"/>
+          </a:xfrm>
+        </p:spPr>
         <p:txBody>
           <a:bodyPr/>
           <a:lstStyle/>
           <a:p>
             <a:r>
               <a:rPr lang="en-US" dirty="0" smtClean="0"/>
-              <a:t>Scope of this talk</a:t>
+              <a:t>The power of Python modules</a:t>
             </a:r>
             <a:endParaRPr lang="en-US" dirty="0"/>
           </a:p>
         </p:txBody>
       </p:sp>
-      <p:sp>
-        <p:nvSpPr>
-          <p:cNvPr id="3" name="Content Placeholder 2"/>
-          <p:cNvSpPr>
-            <a:spLocks noGrp="1"/>
-          </p:cNvSpPr>
-          <p:nvPr>
-            <p:ph idx="1"/>
+    </p:spTree>
+    <p:extLst>
+      <p:ext uri="{BB962C8B-B14F-4D97-AF65-F5344CB8AC3E}">
+        <p14:creationId xmlns:p14="http://schemas.microsoft.com/office/powerpoint/2010/main" val="836836301"/>
+      </p:ext>
+    </p:extLst>
+  </p:cSld>
+  <p:clrMapOvr>
+    <a:masterClrMapping/>
+  </p:clrMapOvr>
+  <p:timing>
+    <p:tnLst>
+      <p:par>
+        <p:cTn id="1" dur="indefinite" restart="never" nodeType="tmRoot"/>
+      </p:par>
+    </p:tnLst>
+  </p:timing>
+</p:sld>
+</file>
+
+<file path=ppt/slides/slide20.xml><?xml version="1.0" encoding="utf-8"?>
+<p:sld xmlns:a="http://schemas.openxmlformats.org/drawingml/2006/main" xmlns:r="http://schemas.openxmlformats.org/officeDocument/2006/relationships" xmlns:p="http://schemas.openxmlformats.org/presentationml/2006/main">
+  <p:cSld>
+    <p:spTree>
+      <p:nvGrpSpPr>
+        <p:cNvPr id="1" name=""/>
+        <p:cNvGrpSpPr/>
+        <p:nvPr/>
+      </p:nvGrpSpPr>
+      <p:grpSpPr>
+        <a:xfrm>
+          <a:off x="0" y="0"/>
+          <a:ext cx="0" cy="0"/>
+          <a:chOff x="0" y="0"/>
+          <a:chExt cx="0" cy="0"/>
+        </a:xfrm>
+      </p:grpSpPr>
+      <p:sp>
+        <p:nvSpPr>
+          <p:cNvPr id="2" name="Title 1"/>
+          <p:cNvSpPr>
+            <a:spLocks noGrp="1"/>
+          </p:cNvSpPr>
+          <p:nvPr>
+            <p:ph type="title"/>
           </p:nvPr>
         </p:nvSpPr>
         <p:spPr/>
@@ -4971,6 +5315,1989 @@
           <a:p>
             <a:r>
               <a:rPr lang="en-US" dirty="0" smtClean="0"/>
+              <a:t>Pandas</a:t>
+            </a:r>
+            <a:endParaRPr lang="en-US" dirty="0"/>
+          </a:p>
+        </p:txBody>
+      </p:sp>
+      <p:sp>
+        <p:nvSpPr>
+          <p:cNvPr id="3" name="Content Placeholder 2"/>
+          <p:cNvSpPr>
+            <a:spLocks noGrp="1"/>
+          </p:cNvSpPr>
+          <p:nvPr>
+            <p:ph idx="1"/>
+          </p:nvPr>
+        </p:nvSpPr>
+        <p:spPr/>
+        <p:txBody>
+          <a:bodyPr/>
+          <a:lstStyle/>
+          <a:p>
+            <a:r>
+              <a:rPr lang="en-US" dirty="0" smtClean="0"/>
+              <a:t>Basic structure: data frame</a:t>
+            </a:r>
+          </a:p>
+          <a:p>
+            <a:r>
+              <a:rPr lang="en-US" dirty="0" smtClean="0"/>
+              <a:t>Like R, but in Python!</a:t>
+            </a:r>
+          </a:p>
+        </p:txBody>
+      </p:sp>
+    </p:spTree>
+    <p:extLst>
+      <p:ext uri="{BB962C8B-B14F-4D97-AF65-F5344CB8AC3E}">
+        <p14:creationId xmlns:p14="http://schemas.microsoft.com/office/powerpoint/2010/main" val="3516584271"/>
+      </p:ext>
+    </p:extLst>
+  </p:cSld>
+  <p:clrMapOvr>
+    <a:masterClrMapping/>
+  </p:clrMapOvr>
+  <p:timing>
+    <p:tnLst>
+      <p:par>
+        <p:cTn id="1" dur="indefinite" restart="never" nodeType="tmRoot"/>
+      </p:par>
+    </p:tnLst>
+  </p:timing>
+</p:sld>
+</file>
+
+<file path=ppt/slides/slide21.xml><?xml version="1.0" encoding="utf-8"?>
+<p:sld xmlns:a="http://schemas.openxmlformats.org/drawingml/2006/main" xmlns:r="http://schemas.openxmlformats.org/officeDocument/2006/relationships" xmlns:p="http://schemas.openxmlformats.org/presentationml/2006/main">
+  <p:cSld>
+    <p:spTree>
+      <p:nvGrpSpPr>
+        <p:cNvPr id="1" name=""/>
+        <p:cNvGrpSpPr/>
+        <p:nvPr/>
+      </p:nvGrpSpPr>
+      <p:grpSpPr>
+        <a:xfrm>
+          <a:off x="0" y="0"/>
+          <a:ext cx="0" cy="0"/>
+          <a:chOff x="0" y="0"/>
+          <a:chExt cx="0" cy="0"/>
+        </a:xfrm>
+      </p:grpSpPr>
+      <p:sp>
+        <p:nvSpPr>
+          <p:cNvPr id="2" name="Title 1"/>
+          <p:cNvSpPr>
+            <a:spLocks noGrp="1"/>
+          </p:cNvSpPr>
+          <p:nvPr>
+            <p:ph type="title"/>
+          </p:nvPr>
+        </p:nvSpPr>
+        <p:spPr/>
+        <p:txBody>
+          <a:bodyPr/>
+          <a:lstStyle/>
+          <a:p>
+            <a:r>
+              <a:rPr lang="en-US" dirty="0" err="1" smtClean="0"/>
+              <a:t>Astropy</a:t>
+            </a:r>
+            <a:endParaRPr lang="en-US" dirty="0"/>
+          </a:p>
+        </p:txBody>
+      </p:sp>
+      <p:sp>
+        <p:nvSpPr>
+          <p:cNvPr id="3" name="Content Placeholder 2"/>
+          <p:cNvSpPr>
+            <a:spLocks noGrp="1"/>
+          </p:cNvSpPr>
+          <p:nvPr>
+            <p:ph idx="1"/>
+          </p:nvPr>
+        </p:nvSpPr>
+        <p:spPr/>
+        <p:txBody>
+          <a:bodyPr/>
+          <a:lstStyle/>
+          <a:p>
+            <a:r>
+              <a:rPr lang="en-US" dirty="0" err="1" smtClean="0"/>
+              <a:t>Astropy</a:t>
+            </a:r>
+            <a:r>
+              <a:rPr lang="en-US" dirty="0" smtClean="0"/>
+              <a:t> consists of a core package with common functionality:</a:t>
+            </a:r>
+          </a:p>
+          <a:p>
+            <a:pPr lvl="1"/>
+            <a:r>
+              <a:rPr lang="en-US" dirty="0" smtClean="0">
+                <a:solidFill>
+                  <a:schemeClr val="tx2"/>
+                </a:solidFill>
+              </a:rPr>
+              <a:t>units</a:t>
+            </a:r>
+            <a:r>
+              <a:rPr lang="en-US" dirty="0">
+                <a:solidFill>
+                  <a:schemeClr val="tx2"/>
+                </a:solidFill>
+              </a:rPr>
+              <a:t> </a:t>
+            </a:r>
+            <a:r>
+              <a:rPr lang="en-US" dirty="0" smtClean="0"/>
+              <a:t>and </a:t>
+            </a:r>
+            <a:r>
+              <a:rPr lang="en-US" dirty="0" smtClean="0">
+                <a:solidFill>
+                  <a:schemeClr val="tx2"/>
+                </a:solidFill>
+              </a:rPr>
+              <a:t>constants</a:t>
+            </a:r>
+            <a:endParaRPr lang="en-US" dirty="0" smtClean="0"/>
+          </a:p>
+          <a:p>
+            <a:pPr lvl="1"/>
+            <a:r>
+              <a:rPr lang="en-US" dirty="0" smtClean="0"/>
+              <a:t>Juggling coordinate systems with multiple frames, units, etc.  Seems to be mostly done with </a:t>
+            </a:r>
+            <a:r>
+              <a:rPr lang="en-US" dirty="0" err="1" smtClean="0">
+                <a:solidFill>
+                  <a:schemeClr val="tx2"/>
+                </a:solidFill>
+              </a:rPr>
+              <a:t>SkyCoord</a:t>
+            </a:r>
+            <a:endParaRPr lang="en-US" dirty="0" smtClean="0">
+              <a:solidFill>
+                <a:schemeClr val="tx2"/>
+              </a:solidFill>
+            </a:endParaRPr>
+          </a:p>
+          <a:p>
+            <a:pPr lvl="1"/>
+            <a:r>
+              <a:rPr lang="en-US" dirty="0" smtClean="0"/>
+              <a:t>Working with FITS files (</a:t>
+            </a:r>
+            <a:r>
+              <a:rPr lang="en-US" dirty="0" err="1" smtClean="0">
+                <a:solidFill>
+                  <a:schemeClr val="tx2"/>
+                </a:solidFill>
+              </a:rPr>
+              <a:t>astropy.io.fits</a:t>
+            </a:r>
+            <a:r>
+              <a:rPr lang="en-US" dirty="0" smtClean="0"/>
+              <a:t>)</a:t>
+            </a:r>
+          </a:p>
+          <a:p>
+            <a:pPr lvl="1"/>
+            <a:r>
+              <a:rPr lang="en-US" dirty="0" smtClean="0"/>
+              <a:t>Fitting/modeling routines (looks WIP)</a:t>
+            </a:r>
+          </a:p>
+        </p:txBody>
+      </p:sp>
+      <p:grpSp>
+        <p:nvGrpSpPr>
+          <p:cNvPr id="12" name="Group 11"/>
+          <p:cNvGrpSpPr/>
+          <p:nvPr/>
+        </p:nvGrpSpPr>
+        <p:grpSpPr>
+          <a:xfrm>
+            <a:off x="6333067" y="0"/>
+            <a:ext cx="2810933" cy="1083567"/>
+            <a:chOff x="5596466" y="194733"/>
+            <a:chExt cx="2810933" cy="1083567"/>
+          </a:xfrm>
+        </p:grpSpPr>
+        <p:sp>
+          <p:nvSpPr>
+            <p:cNvPr id="10" name="Rectangle 9"/>
+            <p:cNvSpPr/>
+            <p:nvPr/>
+          </p:nvSpPr>
+          <p:spPr>
+            <a:xfrm>
+              <a:off x="5596466" y="194733"/>
+              <a:ext cx="2810933" cy="1083567"/>
+            </a:xfrm>
+            <a:prstGeom prst="rect">
+              <a:avLst/>
+            </a:prstGeom>
+            <a:solidFill>
+              <a:schemeClr val="tx1"/>
+            </a:solidFill>
+          </p:spPr>
+          <p:style>
+            <a:lnRef idx="1">
+              <a:schemeClr val="dk1"/>
+            </a:lnRef>
+            <a:fillRef idx="3">
+              <a:schemeClr val="dk1"/>
+            </a:fillRef>
+            <a:effectRef idx="2">
+              <a:schemeClr val="dk1"/>
+            </a:effectRef>
+            <a:fontRef idx="minor">
+              <a:schemeClr val="lt1"/>
+            </a:fontRef>
+          </p:style>
+          <p:txBody>
+            <a:bodyPr rtlCol="0" anchor="ctr"/>
+            <a:lstStyle/>
+            <a:p>
+              <a:pPr algn="ctr"/>
+              <a:endParaRPr lang="en-US"/>
+            </a:p>
+          </p:txBody>
+        </p:sp>
+        <p:sp>
+          <p:nvSpPr>
+            <p:cNvPr id="4" name="Isosceles Triangle 3"/>
+            <p:cNvSpPr/>
+            <p:nvPr/>
+          </p:nvSpPr>
+          <p:spPr>
+            <a:xfrm>
+              <a:off x="5731933" y="313267"/>
+              <a:ext cx="942848" cy="812800"/>
+            </a:xfrm>
+            <a:prstGeom prst="triangle">
+              <a:avLst/>
+            </a:prstGeom>
+            <a:solidFill>
+              <a:schemeClr val="accent6"/>
+            </a:solidFill>
+            <a:ln w="38100">
+              <a:solidFill>
+                <a:schemeClr val="tx1"/>
+              </a:solidFill>
+            </a:ln>
+            <a:effectLst/>
+          </p:spPr>
+          <p:style>
+            <a:lnRef idx="1">
+              <a:schemeClr val="accent6"/>
+            </a:lnRef>
+            <a:fillRef idx="3">
+              <a:schemeClr val="accent6"/>
+            </a:fillRef>
+            <a:effectRef idx="2">
+              <a:schemeClr val="accent6"/>
+            </a:effectRef>
+            <a:fontRef idx="minor">
+              <a:schemeClr val="lt1"/>
+            </a:fontRef>
+          </p:style>
+          <p:txBody>
+            <a:bodyPr rtlCol="0" anchor="ctr"/>
+            <a:lstStyle/>
+            <a:p>
+              <a:pPr algn="ctr"/>
+              <a:endParaRPr lang="en-US" dirty="0"/>
+            </a:p>
+          </p:txBody>
+        </p:sp>
+        <p:sp>
+          <p:nvSpPr>
+            <p:cNvPr id="6" name="TextBox 5"/>
+            <p:cNvSpPr txBox="1"/>
+            <p:nvPr/>
+          </p:nvSpPr>
+          <p:spPr>
+            <a:xfrm>
+              <a:off x="5932423" y="262637"/>
+              <a:ext cx="541867" cy="1015663"/>
+            </a:xfrm>
+            <a:prstGeom prst="rect">
+              <a:avLst/>
+            </a:prstGeom>
+            <a:noFill/>
+          </p:spPr>
+          <p:txBody>
+            <a:bodyPr wrap="square" rtlCol="0">
+              <a:spAutoFit/>
+            </a:bodyPr>
+            <a:lstStyle/>
+            <a:p>
+              <a:pPr algn="ctr"/>
+              <a:r>
+                <a:rPr lang="en-US" sz="6000" dirty="0" smtClean="0">
+                  <a:ln>
+                    <a:solidFill>
+                      <a:schemeClr val="tx1"/>
+                    </a:solidFill>
+                  </a:ln>
+                  <a:solidFill>
+                    <a:schemeClr val="bg1"/>
+                  </a:solidFill>
+                </a:rPr>
+                <a:t>!</a:t>
+              </a:r>
+              <a:endParaRPr lang="en-US" sz="6000" dirty="0">
+                <a:ln>
+                  <a:solidFill>
+                    <a:schemeClr val="tx1"/>
+                  </a:solidFill>
+                </a:ln>
+                <a:solidFill>
+                  <a:schemeClr val="bg1"/>
+                </a:solidFill>
+              </a:endParaRPr>
+            </a:p>
+          </p:txBody>
+        </p:sp>
+        <p:sp>
+          <p:nvSpPr>
+            <p:cNvPr id="7" name="TextBox 6"/>
+            <p:cNvSpPr txBox="1"/>
+            <p:nvPr/>
+          </p:nvSpPr>
+          <p:spPr>
+            <a:xfrm>
+              <a:off x="6608149" y="322478"/>
+              <a:ext cx="1714584" cy="830997"/>
+            </a:xfrm>
+            <a:prstGeom prst="rect">
+              <a:avLst/>
+            </a:prstGeom>
+            <a:noFill/>
+          </p:spPr>
+          <p:txBody>
+            <a:bodyPr wrap="square" rtlCol="0">
+              <a:spAutoFit/>
+            </a:bodyPr>
+            <a:lstStyle/>
+            <a:p>
+              <a:pPr algn="ctr"/>
+              <a:r>
+                <a:rPr lang="en-US" sz="1600" b="1" dirty="0" smtClean="0">
+                  <a:solidFill>
+                    <a:schemeClr val="bg1"/>
+                  </a:solidFill>
+                </a:rPr>
+                <a:t>I’M NOT AN ASTRONOMER</a:t>
+              </a:r>
+            </a:p>
+            <a:p>
+              <a:pPr algn="ctr"/>
+              <a:r>
+                <a:rPr lang="en-US" altLang="ja-JP" sz="1600" b="1" dirty="0">
+                  <a:solidFill>
+                    <a:schemeClr val="bg1"/>
+                  </a:solidFill>
+                </a:rPr>
+                <a:t>¯\_(</a:t>
+              </a:r>
+              <a:r>
+                <a:rPr lang="ja-JP" altLang="en-US" sz="1600" b="1" dirty="0">
+                  <a:solidFill>
+                    <a:schemeClr val="bg1"/>
+                  </a:solidFill>
+                </a:rPr>
+                <a:t>ツ</a:t>
+              </a:r>
+              <a:r>
+                <a:rPr lang="en-US" altLang="ja-JP" sz="1600" b="1" dirty="0" smtClean="0">
+                  <a:solidFill>
+                    <a:schemeClr val="bg1"/>
+                  </a:solidFill>
+                </a:rPr>
+                <a:t>)_/¯</a:t>
+              </a:r>
+              <a:endParaRPr lang="en-US" sz="1600" b="1" dirty="0">
+                <a:solidFill>
+                  <a:schemeClr val="bg1"/>
+                </a:solidFill>
+              </a:endParaRPr>
+            </a:p>
+          </p:txBody>
+        </p:sp>
+      </p:grpSp>
+    </p:spTree>
+    <p:extLst>
+      <p:ext uri="{BB962C8B-B14F-4D97-AF65-F5344CB8AC3E}">
+        <p14:creationId xmlns:p14="http://schemas.microsoft.com/office/powerpoint/2010/main" val="290858453"/>
+      </p:ext>
+    </p:extLst>
+  </p:cSld>
+  <p:clrMapOvr>
+    <a:masterClrMapping/>
+  </p:clrMapOvr>
+  <p:timing>
+    <p:tnLst>
+      <p:par>
+        <p:cTn id="1" dur="indefinite" restart="never" nodeType="tmRoot">
+          <p:childTnLst>
+            <p:seq concurrent="1" nextAc="seek">
+              <p:cTn id="2" dur="indefinite" nodeType="mainSeq">
+                <p:childTnLst>
+                  <p:par>
+                    <p:cTn id="3" fill="hold">
+                      <p:stCondLst>
+                        <p:cond delay="indefinite"/>
+                      </p:stCondLst>
+                      <p:childTnLst>
+                        <p:par>
+                          <p:cTn id="4" fill="hold">
+                            <p:stCondLst>
+                              <p:cond delay="0"/>
+                            </p:stCondLst>
+                            <p:childTnLst>
+                              <p:par>
+                                <p:cTn id="5" presetID="1" presetClass="entr" presetSubtype="0" fill="hold" nodeType="clickEffect">
+                                  <p:stCondLst>
+                                    <p:cond delay="0"/>
+                                  </p:stCondLst>
+                                  <p:childTnLst>
+                                    <p:set>
+                                      <p:cBhvr>
+                                        <p:cTn id="6" dur="1" fill="hold">
+                                          <p:stCondLst>
+                                            <p:cond delay="0"/>
+                                          </p:stCondLst>
+                                        </p:cTn>
+                                        <p:tgtEl>
+                                          <p:spTgt spid="3">
+                                            <p:txEl>
+                                              <p:pRg st="1" end="1"/>
+                                            </p:txEl>
+                                          </p:spTgt>
+                                        </p:tgtEl>
+                                        <p:attrNameLst>
+                                          <p:attrName>style.visibility</p:attrName>
+                                        </p:attrNameLst>
+                                      </p:cBhvr>
+                                      <p:to>
+                                        <p:strVal val="visible"/>
+                                      </p:to>
+                                    </p:set>
+                                  </p:childTnLst>
+                                </p:cTn>
+                              </p:par>
+                            </p:childTnLst>
+                          </p:cTn>
+                        </p:par>
+                      </p:childTnLst>
+                    </p:cTn>
+                  </p:par>
+                  <p:par>
+                    <p:cTn id="7" fill="hold">
+                      <p:stCondLst>
+                        <p:cond delay="indefinite"/>
+                      </p:stCondLst>
+                      <p:childTnLst>
+                        <p:par>
+                          <p:cTn id="8" fill="hold">
+                            <p:stCondLst>
+                              <p:cond delay="0"/>
+                            </p:stCondLst>
+                            <p:childTnLst>
+                              <p:par>
+                                <p:cTn id="9" presetID="1" presetClass="entr" presetSubtype="0" fill="hold" nodeType="clickEffect">
+                                  <p:stCondLst>
+                                    <p:cond delay="0"/>
+                                  </p:stCondLst>
+                                  <p:childTnLst>
+                                    <p:set>
+                                      <p:cBhvr>
+                                        <p:cTn id="10" dur="1" fill="hold">
+                                          <p:stCondLst>
+                                            <p:cond delay="0"/>
+                                          </p:stCondLst>
+                                        </p:cTn>
+                                        <p:tgtEl>
+                                          <p:spTgt spid="3">
+                                            <p:txEl>
+                                              <p:pRg st="2" end="2"/>
+                                            </p:txEl>
+                                          </p:spTgt>
+                                        </p:tgtEl>
+                                        <p:attrNameLst>
+                                          <p:attrName>style.visibility</p:attrName>
+                                        </p:attrNameLst>
+                                      </p:cBhvr>
+                                      <p:to>
+                                        <p:strVal val="visible"/>
+                                      </p:to>
+                                    </p:set>
+                                  </p:childTnLst>
+                                </p:cTn>
+                              </p:par>
+                            </p:childTnLst>
+                          </p:cTn>
+                        </p:par>
+                      </p:childTnLst>
+                    </p:cTn>
+                  </p:par>
+                  <p:par>
+                    <p:cTn id="11" fill="hold">
+                      <p:stCondLst>
+                        <p:cond delay="indefinite"/>
+                      </p:stCondLst>
+                      <p:childTnLst>
+                        <p:par>
+                          <p:cTn id="12" fill="hold">
+                            <p:stCondLst>
+                              <p:cond delay="0"/>
+                            </p:stCondLst>
+                            <p:childTnLst>
+                              <p:par>
+                                <p:cTn id="13" presetID="1" presetClass="entr" presetSubtype="0" fill="hold" nodeType="clickEffect">
+                                  <p:stCondLst>
+                                    <p:cond delay="0"/>
+                                  </p:stCondLst>
+                                  <p:childTnLst>
+                                    <p:set>
+                                      <p:cBhvr>
+                                        <p:cTn id="14" dur="1" fill="hold">
+                                          <p:stCondLst>
+                                            <p:cond delay="0"/>
+                                          </p:stCondLst>
+                                        </p:cTn>
+                                        <p:tgtEl>
+                                          <p:spTgt spid="3">
+                                            <p:txEl>
+                                              <p:pRg st="3" end="3"/>
+                                            </p:txEl>
+                                          </p:spTgt>
+                                        </p:tgtEl>
+                                        <p:attrNameLst>
+                                          <p:attrName>style.visibility</p:attrName>
+                                        </p:attrNameLst>
+                                      </p:cBhvr>
+                                      <p:to>
+                                        <p:strVal val="visible"/>
+                                      </p:to>
+                                    </p:set>
+                                  </p:childTnLst>
+                                </p:cTn>
+                              </p:par>
+                            </p:childTnLst>
+                          </p:cTn>
+                        </p:par>
+                      </p:childTnLst>
+                    </p:cTn>
+                  </p:par>
+                  <p:par>
+                    <p:cTn id="15" fill="hold">
+                      <p:stCondLst>
+                        <p:cond delay="indefinite"/>
+                      </p:stCondLst>
+                      <p:childTnLst>
+                        <p:par>
+                          <p:cTn id="16" fill="hold">
+                            <p:stCondLst>
+                              <p:cond delay="0"/>
+                            </p:stCondLst>
+                            <p:childTnLst>
+                              <p:par>
+                                <p:cTn id="17" presetID="1" presetClass="entr" presetSubtype="0" fill="hold" nodeType="clickEffect">
+                                  <p:stCondLst>
+                                    <p:cond delay="0"/>
+                                  </p:stCondLst>
+                                  <p:childTnLst>
+                                    <p:set>
+                                      <p:cBhvr>
+                                        <p:cTn id="18" dur="1" fill="hold">
+                                          <p:stCondLst>
+                                            <p:cond delay="0"/>
+                                          </p:stCondLst>
+                                        </p:cTn>
+                                        <p:tgtEl>
+                                          <p:spTgt spid="3">
+                                            <p:txEl>
+                                              <p:pRg st="4" end="4"/>
+                                            </p:txEl>
+                                          </p:spTgt>
+                                        </p:tgtEl>
+                                        <p:attrNameLst>
+                                          <p:attrName>style.visibility</p:attrName>
+                                        </p:attrNameLst>
+                                      </p:cBhvr>
+                                      <p:to>
+                                        <p:strVal val="visible"/>
+                                      </p:to>
+                                    </p:set>
+                                  </p:childTnLst>
+                                </p:cTn>
+                              </p:par>
+                            </p:childTnLst>
+                          </p:cTn>
+                        </p:par>
+                      </p:childTnLst>
+                    </p:cTn>
+                  </p:par>
+                </p:childTnLst>
+              </p:cTn>
+              <p:prevCondLst>
+                <p:cond evt="onPrev" delay="0">
+                  <p:tgtEl>
+                    <p:sldTgt/>
+                  </p:tgtEl>
+                </p:cond>
+              </p:prevCondLst>
+              <p:nextCondLst>
+                <p:cond evt="onNext" delay="0">
+                  <p:tgtEl>
+                    <p:sldTgt/>
+                  </p:tgtEl>
+                </p:cond>
+              </p:nextCondLst>
+            </p:seq>
+          </p:childTnLst>
+        </p:cTn>
+      </p:par>
+    </p:tnLst>
+  </p:timing>
+</p:sld>
+</file>
+
+<file path=ppt/slides/slide22.xml><?xml version="1.0" encoding="utf-8"?>
+<p:sld xmlns:a="http://schemas.openxmlformats.org/drawingml/2006/main" xmlns:r="http://schemas.openxmlformats.org/officeDocument/2006/relationships" xmlns:p="http://schemas.openxmlformats.org/presentationml/2006/main">
+  <p:cSld>
+    <p:spTree>
+      <p:nvGrpSpPr>
+        <p:cNvPr id="1" name=""/>
+        <p:cNvGrpSpPr/>
+        <p:nvPr/>
+      </p:nvGrpSpPr>
+      <p:grpSpPr>
+        <a:xfrm>
+          <a:off x="0" y="0"/>
+          <a:ext cx="0" cy="0"/>
+          <a:chOff x="0" y="0"/>
+          <a:chExt cx="0" cy="0"/>
+        </a:xfrm>
+      </p:grpSpPr>
+      <p:sp>
+        <p:nvSpPr>
+          <p:cNvPr id="2" name="Title 1"/>
+          <p:cNvSpPr>
+            <a:spLocks noGrp="1"/>
+          </p:cNvSpPr>
+          <p:nvPr>
+            <p:ph type="title"/>
+          </p:nvPr>
+        </p:nvSpPr>
+        <p:spPr/>
+        <p:txBody>
+          <a:bodyPr/>
+          <a:lstStyle/>
+          <a:p>
+            <a:r>
+              <a:rPr lang="en-US" smtClean="0"/>
+              <a:t>Astropy</a:t>
+            </a:r>
+            <a:endParaRPr lang="en-US"/>
+          </a:p>
+        </p:txBody>
+      </p:sp>
+      <p:sp>
+        <p:nvSpPr>
+          <p:cNvPr id="3" name="Content Placeholder 2"/>
+          <p:cNvSpPr>
+            <a:spLocks noGrp="1"/>
+          </p:cNvSpPr>
+          <p:nvPr>
+            <p:ph idx="1"/>
+          </p:nvPr>
+        </p:nvSpPr>
+        <p:spPr/>
+        <p:txBody>
+          <a:bodyPr>
+            <a:normAutofit/>
+          </a:bodyPr>
+          <a:lstStyle/>
+          <a:p>
+            <a:r>
+              <a:rPr lang="en-US" dirty="0" smtClean="0"/>
+              <a:t>There are also “affiliated” packages that provide additional functionality:</a:t>
+            </a:r>
+          </a:p>
+          <a:p>
+            <a:pPr lvl="1"/>
+            <a:r>
+              <a:rPr lang="en-US" dirty="0" err="1" smtClean="0">
+                <a:solidFill>
+                  <a:schemeClr val="tx2"/>
+                </a:solidFill>
+              </a:rPr>
+              <a:t>astroquery</a:t>
+            </a:r>
+            <a:r>
+              <a:rPr lang="en-US" dirty="0" smtClean="0"/>
+              <a:t>: convenience library for accessing online databases, e.g. </a:t>
+            </a:r>
+            <a:r>
+              <a:rPr lang="en-US" dirty="0" err="1" smtClean="0"/>
+              <a:t>Simbad</a:t>
+            </a:r>
+            <a:r>
+              <a:rPr lang="en-US" dirty="0" smtClean="0"/>
+              <a:t>, SDSS,…</a:t>
+            </a:r>
+          </a:p>
+          <a:p>
+            <a:pPr lvl="1"/>
+            <a:r>
+              <a:rPr lang="en-US" dirty="0" err="1" smtClean="0">
+                <a:solidFill>
+                  <a:schemeClr val="tx2"/>
+                </a:solidFill>
+              </a:rPr>
+              <a:t>ccdproc</a:t>
+            </a:r>
+            <a:r>
+              <a:rPr lang="en-US" dirty="0" smtClean="0"/>
+              <a:t>: for reducing raw CCD data</a:t>
+            </a:r>
+          </a:p>
+          <a:p>
+            <a:pPr lvl="1"/>
+            <a:r>
+              <a:rPr lang="en-US" dirty="0" err="1" smtClean="0">
+                <a:solidFill>
+                  <a:schemeClr val="tx2"/>
+                </a:solidFill>
+              </a:rPr>
+              <a:t>spectral_cube</a:t>
+            </a:r>
+            <a:endParaRPr lang="en-US" dirty="0">
+              <a:solidFill>
+                <a:schemeClr val="tx2"/>
+              </a:solidFill>
+            </a:endParaRPr>
+          </a:p>
+          <a:p>
+            <a:pPr lvl="1"/>
+            <a:r>
+              <a:rPr lang="en-US" dirty="0" err="1" smtClean="0">
+                <a:solidFill>
+                  <a:schemeClr val="tx2"/>
+                </a:solidFill>
+              </a:rPr>
+              <a:t>halotools</a:t>
+            </a:r>
+            <a:r>
+              <a:rPr lang="en-US" dirty="0" smtClean="0"/>
+              <a:t>: tools for study/simulation of halos</a:t>
+            </a:r>
+          </a:p>
+          <a:p>
+            <a:pPr lvl="1"/>
+            <a:r>
+              <a:rPr lang="en-US" dirty="0" smtClean="0"/>
+              <a:t>…</a:t>
+            </a:r>
+            <a:endParaRPr lang="en-US" dirty="0" smtClean="0"/>
+          </a:p>
+        </p:txBody>
+      </p:sp>
+      <p:grpSp>
+        <p:nvGrpSpPr>
+          <p:cNvPr id="9" name="Group 8"/>
+          <p:cNvGrpSpPr/>
+          <p:nvPr/>
+        </p:nvGrpSpPr>
+        <p:grpSpPr>
+          <a:xfrm>
+            <a:off x="6333067" y="0"/>
+            <a:ext cx="2810933" cy="1083567"/>
+            <a:chOff x="5596466" y="194733"/>
+            <a:chExt cx="2810933" cy="1083567"/>
+          </a:xfrm>
+        </p:grpSpPr>
+        <p:sp>
+          <p:nvSpPr>
+            <p:cNvPr id="10" name="Rectangle 9"/>
+            <p:cNvSpPr/>
+            <p:nvPr/>
+          </p:nvSpPr>
+          <p:spPr>
+            <a:xfrm>
+              <a:off x="5596466" y="194733"/>
+              <a:ext cx="2810933" cy="1083567"/>
+            </a:xfrm>
+            <a:prstGeom prst="rect">
+              <a:avLst/>
+            </a:prstGeom>
+            <a:solidFill>
+              <a:schemeClr val="tx1"/>
+            </a:solidFill>
+          </p:spPr>
+          <p:style>
+            <a:lnRef idx="1">
+              <a:schemeClr val="dk1"/>
+            </a:lnRef>
+            <a:fillRef idx="3">
+              <a:schemeClr val="dk1"/>
+            </a:fillRef>
+            <a:effectRef idx="2">
+              <a:schemeClr val="dk1"/>
+            </a:effectRef>
+            <a:fontRef idx="minor">
+              <a:schemeClr val="lt1"/>
+            </a:fontRef>
+          </p:style>
+          <p:txBody>
+            <a:bodyPr rtlCol="0" anchor="ctr"/>
+            <a:lstStyle/>
+            <a:p>
+              <a:pPr algn="ctr"/>
+              <a:endParaRPr lang="en-US"/>
+            </a:p>
+          </p:txBody>
+        </p:sp>
+        <p:sp>
+          <p:nvSpPr>
+            <p:cNvPr id="11" name="Isosceles Triangle 10"/>
+            <p:cNvSpPr/>
+            <p:nvPr/>
+          </p:nvSpPr>
+          <p:spPr>
+            <a:xfrm>
+              <a:off x="5731933" y="313267"/>
+              <a:ext cx="942848" cy="812800"/>
+            </a:xfrm>
+            <a:prstGeom prst="triangle">
+              <a:avLst/>
+            </a:prstGeom>
+            <a:solidFill>
+              <a:schemeClr val="accent6"/>
+            </a:solidFill>
+            <a:ln w="38100">
+              <a:solidFill>
+                <a:schemeClr val="tx1"/>
+              </a:solidFill>
+            </a:ln>
+            <a:effectLst/>
+          </p:spPr>
+          <p:style>
+            <a:lnRef idx="1">
+              <a:schemeClr val="accent6"/>
+            </a:lnRef>
+            <a:fillRef idx="3">
+              <a:schemeClr val="accent6"/>
+            </a:fillRef>
+            <a:effectRef idx="2">
+              <a:schemeClr val="accent6"/>
+            </a:effectRef>
+            <a:fontRef idx="minor">
+              <a:schemeClr val="lt1"/>
+            </a:fontRef>
+          </p:style>
+          <p:txBody>
+            <a:bodyPr rtlCol="0" anchor="ctr"/>
+            <a:lstStyle/>
+            <a:p>
+              <a:pPr algn="ctr"/>
+              <a:endParaRPr lang="en-US" dirty="0"/>
+            </a:p>
+          </p:txBody>
+        </p:sp>
+        <p:sp>
+          <p:nvSpPr>
+            <p:cNvPr id="12" name="TextBox 11"/>
+            <p:cNvSpPr txBox="1"/>
+            <p:nvPr/>
+          </p:nvSpPr>
+          <p:spPr>
+            <a:xfrm>
+              <a:off x="5932423" y="262637"/>
+              <a:ext cx="541867" cy="1015663"/>
+            </a:xfrm>
+            <a:prstGeom prst="rect">
+              <a:avLst/>
+            </a:prstGeom>
+            <a:noFill/>
+          </p:spPr>
+          <p:txBody>
+            <a:bodyPr wrap="square" rtlCol="0">
+              <a:spAutoFit/>
+            </a:bodyPr>
+            <a:lstStyle/>
+            <a:p>
+              <a:pPr algn="ctr"/>
+              <a:r>
+                <a:rPr lang="en-US" sz="6000" dirty="0" smtClean="0">
+                  <a:ln>
+                    <a:solidFill>
+                      <a:schemeClr val="tx1"/>
+                    </a:solidFill>
+                  </a:ln>
+                  <a:solidFill>
+                    <a:schemeClr val="bg1"/>
+                  </a:solidFill>
+                </a:rPr>
+                <a:t>!</a:t>
+              </a:r>
+              <a:endParaRPr lang="en-US" sz="6000" dirty="0">
+                <a:ln>
+                  <a:solidFill>
+                    <a:schemeClr val="tx1"/>
+                  </a:solidFill>
+                </a:ln>
+                <a:solidFill>
+                  <a:schemeClr val="bg1"/>
+                </a:solidFill>
+              </a:endParaRPr>
+            </a:p>
+          </p:txBody>
+        </p:sp>
+        <p:sp>
+          <p:nvSpPr>
+            <p:cNvPr id="13" name="TextBox 12"/>
+            <p:cNvSpPr txBox="1"/>
+            <p:nvPr/>
+          </p:nvSpPr>
+          <p:spPr>
+            <a:xfrm>
+              <a:off x="6608149" y="322478"/>
+              <a:ext cx="1714584" cy="830997"/>
+            </a:xfrm>
+            <a:prstGeom prst="rect">
+              <a:avLst/>
+            </a:prstGeom>
+            <a:noFill/>
+          </p:spPr>
+          <p:txBody>
+            <a:bodyPr wrap="square" rtlCol="0">
+              <a:spAutoFit/>
+            </a:bodyPr>
+            <a:lstStyle/>
+            <a:p>
+              <a:pPr algn="ctr"/>
+              <a:r>
+                <a:rPr lang="en-US" sz="1600" b="1" dirty="0" smtClean="0">
+                  <a:solidFill>
+                    <a:schemeClr val="bg1"/>
+                  </a:solidFill>
+                </a:rPr>
+                <a:t>I’M NOT AN ASTRONOMER</a:t>
+              </a:r>
+            </a:p>
+            <a:p>
+              <a:pPr algn="ctr"/>
+              <a:r>
+                <a:rPr lang="en-US" altLang="ja-JP" sz="1600" b="1" dirty="0">
+                  <a:solidFill>
+                    <a:schemeClr val="bg1"/>
+                  </a:solidFill>
+                </a:rPr>
+                <a:t>¯\_(</a:t>
+              </a:r>
+              <a:r>
+                <a:rPr lang="ja-JP" altLang="en-US" sz="1600" b="1" dirty="0">
+                  <a:solidFill>
+                    <a:schemeClr val="bg1"/>
+                  </a:solidFill>
+                </a:rPr>
+                <a:t>ツ</a:t>
+              </a:r>
+              <a:r>
+                <a:rPr lang="en-US" altLang="ja-JP" sz="1600" b="1" dirty="0" smtClean="0">
+                  <a:solidFill>
+                    <a:schemeClr val="bg1"/>
+                  </a:solidFill>
+                </a:rPr>
+                <a:t>)_/¯</a:t>
+              </a:r>
+              <a:endParaRPr lang="en-US" sz="1600" b="1" dirty="0">
+                <a:solidFill>
+                  <a:schemeClr val="bg1"/>
+                </a:solidFill>
+              </a:endParaRPr>
+            </a:p>
+          </p:txBody>
+        </p:sp>
+      </p:grpSp>
+    </p:spTree>
+    <p:extLst>
+      <p:ext uri="{BB962C8B-B14F-4D97-AF65-F5344CB8AC3E}">
+        <p14:creationId xmlns:p14="http://schemas.microsoft.com/office/powerpoint/2010/main" val="2028254652"/>
+      </p:ext>
+    </p:extLst>
+  </p:cSld>
+  <p:clrMapOvr>
+    <a:masterClrMapping/>
+  </p:clrMapOvr>
+  <p:timing>
+    <p:tnLst>
+      <p:par>
+        <p:cTn id="1" dur="indefinite" restart="never" nodeType="tmRoot">
+          <p:childTnLst>
+            <p:seq concurrent="1" nextAc="seek">
+              <p:cTn id="2" dur="indefinite" nodeType="mainSeq">
+                <p:childTnLst>
+                  <p:par>
+                    <p:cTn id="3" fill="hold">
+                      <p:stCondLst>
+                        <p:cond delay="indefinite"/>
+                      </p:stCondLst>
+                      <p:childTnLst>
+                        <p:par>
+                          <p:cTn id="4" fill="hold">
+                            <p:stCondLst>
+                              <p:cond delay="0"/>
+                            </p:stCondLst>
+                            <p:childTnLst>
+                              <p:par>
+                                <p:cTn id="5" presetID="1" presetClass="entr" presetSubtype="0" fill="hold" nodeType="clickEffect">
+                                  <p:stCondLst>
+                                    <p:cond delay="0"/>
+                                  </p:stCondLst>
+                                  <p:childTnLst>
+                                    <p:set>
+                                      <p:cBhvr>
+                                        <p:cTn id="6" dur="1" fill="hold">
+                                          <p:stCondLst>
+                                            <p:cond delay="0"/>
+                                          </p:stCondLst>
+                                        </p:cTn>
+                                        <p:tgtEl>
+                                          <p:spTgt spid="3">
+                                            <p:txEl>
+                                              <p:pRg st="1" end="1"/>
+                                            </p:txEl>
+                                          </p:spTgt>
+                                        </p:tgtEl>
+                                        <p:attrNameLst>
+                                          <p:attrName>style.visibility</p:attrName>
+                                        </p:attrNameLst>
+                                      </p:cBhvr>
+                                      <p:to>
+                                        <p:strVal val="visible"/>
+                                      </p:to>
+                                    </p:set>
+                                  </p:childTnLst>
+                                </p:cTn>
+                              </p:par>
+                            </p:childTnLst>
+                          </p:cTn>
+                        </p:par>
+                      </p:childTnLst>
+                    </p:cTn>
+                  </p:par>
+                  <p:par>
+                    <p:cTn id="7" fill="hold">
+                      <p:stCondLst>
+                        <p:cond delay="indefinite"/>
+                      </p:stCondLst>
+                      <p:childTnLst>
+                        <p:par>
+                          <p:cTn id="8" fill="hold">
+                            <p:stCondLst>
+                              <p:cond delay="0"/>
+                            </p:stCondLst>
+                            <p:childTnLst>
+                              <p:par>
+                                <p:cTn id="9" presetID="1" presetClass="entr" presetSubtype="0" fill="hold" nodeType="clickEffect">
+                                  <p:stCondLst>
+                                    <p:cond delay="0"/>
+                                  </p:stCondLst>
+                                  <p:childTnLst>
+                                    <p:set>
+                                      <p:cBhvr>
+                                        <p:cTn id="10" dur="1" fill="hold">
+                                          <p:stCondLst>
+                                            <p:cond delay="0"/>
+                                          </p:stCondLst>
+                                        </p:cTn>
+                                        <p:tgtEl>
+                                          <p:spTgt spid="3">
+                                            <p:txEl>
+                                              <p:pRg st="2" end="2"/>
+                                            </p:txEl>
+                                          </p:spTgt>
+                                        </p:tgtEl>
+                                        <p:attrNameLst>
+                                          <p:attrName>style.visibility</p:attrName>
+                                        </p:attrNameLst>
+                                      </p:cBhvr>
+                                      <p:to>
+                                        <p:strVal val="visible"/>
+                                      </p:to>
+                                    </p:set>
+                                  </p:childTnLst>
+                                </p:cTn>
+                              </p:par>
+                            </p:childTnLst>
+                          </p:cTn>
+                        </p:par>
+                      </p:childTnLst>
+                    </p:cTn>
+                  </p:par>
+                  <p:par>
+                    <p:cTn id="11" fill="hold">
+                      <p:stCondLst>
+                        <p:cond delay="indefinite"/>
+                      </p:stCondLst>
+                      <p:childTnLst>
+                        <p:par>
+                          <p:cTn id="12" fill="hold">
+                            <p:stCondLst>
+                              <p:cond delay="0"/>
+                            </p:stCondLst>
+                            <p:childTnLst>
+                              <p:par>
+                                <p:cTn id="13" presetID="1" presetClass="entr" presetSubtype="0" fill="hold" nodeType="clickEffect">
+                                  <p:stCondLst>
+                                    <p:cond delay="0"/>
+                                  </p:stCondLst>
+                                  <p:childTnLst>
+                                    <p:set>
+                                      <p:cBhvr>
+                                        <p:cTn id="14" dur="1" fill="hold">
+                                          <p:stCondLst>
+                                            <p:cond delay="0"/>
+                                          </p:stCondLst>
+                                        </p:cTn>
+                                        <p:tgtEl>
+                                          <p:spTgt spid="3">
+                                            <p:txEl>
+                                              <p:pRg st="3" end="3"/>
+                                            </p:txEl>
+                                          </p:spTgt>
+                                        </p:tgtEl>
+                                        <p:attrNameLst>
+                                          <p:attrName>style.visibility</p:attrName>
+                                        </p:attrNameLst>
+                                      </p:cBhvr>
+                                      <p:to>
+                                        <p:strVal val="visible"/>
+                                      </p:to>
+                                    </p:set>
+                                  </p:childTnLst>
+                                </p:cTn>
+                              </p:par>
+                            </p:childTnLst>
+                          </p:cTn>
+                        </p:par>
+                      </p:childTnLst>
+                    </p:cTn>
+                  </p:par>
+                  <p:par>
+                    <p:cTn id="15" fill="hold">
+                      <p:stCondLst>
+                        <p:cond delay="indefinite"/>
+                      </p:stCondLst>
+                      <p:childTnLst>
+                        <p:par>
+                          <p:cTn id="16" fill="hold">
+                            <p:stCondLst>
+                              <p:cond delay="0"/>
+                            </p:stCondLst>
+                            <p:childTnLst>
+                              <p:par>
+                                <p:cTn id="17" presetID="1" presetClass="entr" presetSubtype="0" fill="hold" nodeType="clickEffect">
+                                  <p:stCondLst>
+                                    <p:cond delay="0"/>
+                                  </p:stCondLst>
+                                  <p:childTnLst>
+                                    <p:set>
+                                      <p:cBhvr>
+                                        <p:cTn id="18" dur="1" fill="hold">
+                                          <p:stCondLst>
+                                            <p:cond delay="0"/>
+                                          </p:stCondLst>
+                                        </p:cTn>
+                                        <p:tgtEl>
+                                          <p:spTgt spid="3">
+                                            <p:txEl>
+                                              <p:pRg st="4" end="4"/>
+                                            </p:txEl>
+                                          </p:spTgt>
+                                        </p:tgtEl>
+                                        <p:attrNameLst>
+                                          <p:attrName>style.visibility</p:attrName>
+                                        </p:attrNameLst>
+                                      </p:cBhvr>
+                                      <p:to>
+                                        <p:strVal val="visible"/>
+                                      </p:to>
+                                    </p:set>
+                                  </p:childTnLst>
+                                </p:cTn>
+                              </p:par>
+                            </p:childTnLst>
+                          </p:cTn>
+                        </p:par>
+                      </p:childTnLst>
+                    </p:cTn>
+                  </p:par>
+                  <p:par>
+                    <p:cTn id="19" fill="hold">
+                      <p:stCondLst>
+                        <p:cond delay="indefinite"/>
+                      </p:stCondLst>
+                      <p:childTnLst>
+                        <p:par>
+                          <p:cTn id="20" fill="hold">
+                            <p:stCondLst>
+                              <p:cond delay="0"/>
+                            </p:stCondLst>
+                            <p:childTnLst>
+                              <p:par>
+                                <p:cTn id="21" presetID="1" presetClass="entr" presetSubtype="0" fill="hold" nodeType="clickEffect">
+                                  <p:stCondLst>
+                                    <p:cond delay="0"/>
+                                  </p:stCondLst>
+                                  <p:childTnLst>
+                                    <p:set>
+                                      <p:cBhvr>
+                                        <p:cTn id="22" dur="1" fill="hold">
+                                          <p:stCondLst>
+                                            <p:cond delay="0"/>
+                                          </p:stCondLst>
+                                        </p:cTn>
+                                        <p:tgtEl>
+                                          <p:spTgt spid="3">
+                                            <p:txEl>
+                                              <p:pRg st="5" end="5"/>
+                                            </p:txEl>
+                                          </p:spTgt>
+                                        </p:tgtEl>
+                                        <p:attrNameLst>
+                                          <p:attrName>style.visibility</p:attrName>
+                                        </p:attrNameLst>
+                                      </p:cBhvr>
+                                      <p:to>
+                                        <p:strVal val="visible"/>
+                                      </p:to>
+                                    </p:set>
+                                  </p:childTnLst>
+                                </p:cTn>
+                              </p:par>
+                            </p:childTnLst>
+                          </p:cTn>
+                        </p:par>
+                      </p:childTnLst>
+                    </p:cTn>
+                  </p:par>
+                </p:childTnLst>
+              </p:cTn>
+              <p:prevCondLst>
+                <p:cond evt="onPrev" delay="0">
+                  <p:tgtEl>
+                    <p:sldTgt/>
+                  </p:tgtEl>
+                </p:cond>
+              </p:prevCondLst>
+              <p:nextCondLst>
+                <p:cond evt="onNext" delay="0">
+                  <p:tgtEl>
+                    <p:sldTgt/>
+                  </p:tgtEl>
+                </p:cond>
+              </p:nextCondLst>
+            </p:seq>
+          </p:childTnLst>
+        </p:cTn>
+      </p:par>
+    </p:tnLst>
+  </p:timing>
+</p:sld>
+</file>
+
+<file path=ppt/slides/slide23.xml><?xml version="1.0" encoding="utf-8"?>
+<p:sld xmlns:a="http://schemas.openxmlformats.org/drawingml/2006/main" xmlns:r="http://schemas.openxmlformats.org/officeDocument/2006/relationships" xmlns:p="http://schemas.openxmlformats.org/presentationml/2006/main">
+  <p:cSld>
+    <p:spTree>
+      <p:nvGrpSpPr>
+        <p:cNvPr id="1" name=""/>
+        <p:cNvGrpSpPr/>
+        <p:nvPr/>
+      </p:nvGrpSpPr>
+      <p:grpSpPr>
+        <a:xfrm>
+          <a:off x="0" y="0"/>
+          <a:ext cx="0" cy="0"/>
+          <a:chOff x="0" y="0"/>
+          <a:chExt cx="0" cy="0"/>
+        </a:xfrm>
+      </p:grpSpPr>
+      <p:sp>
+        <p:nvSpPr>
+          <p:cNvPr id="2" name="Title 1"/>
+          <p:cNvSpPr>
+            <a:spLocks noGrp="1"/>
+          </p:cNvSpPr>
+          <p:nvPr>
+            <p:ph type="title"/>
+          </p:nvPr>
+        </p:nvSpPr>
+        <p:spPr>
+          <a:xfrm>
+            <a:off x="457200" y="2874722"/>
+            <a:ext cx="8229600" cy="803756"/>
+          </a:xfrm>
+        </p:spPr>
+        <p:txBody>
+          <a:bodyPr/>
+          <a:lstStyle/>
+          <a:p>
+            <a:r>
+              <a:rPr lang="en-US" dirty="0" smtClean="0"/>
+              <a:t>Thank you!</a:t>
+            </a:r>
+            <a:endParaRPr lang="en-US" dirty="0"/>
+          </a:p>
+        </p:txBody>
+      </p:sp>
+    </p:spTree>
+    <p:extLst>
+      <p:ext uri="{BB962C8B-B14F-4D97-AF65-F5344CB8AC3E}">
+        <p14:creationId xmlns:p14="http://schemas.microsoft.com/office/powerpoint/2010/main" val="1844849267"/>
+      </p:ext>
+    </p:extLst>
+  </p:cSld>
+  <p:clrMapOvr>
+    <a:masterClrMapping/>
+  </p:clrMapOvr>
+  <p:timing>
+    <p:tnLst>
+      <p:par>
+        <p:cTn id="1" dur="indefinite" restart="never" nodeType="tmRoot"/>
+      </p:par>
+    </p:tnLst>
+  </p:timing>
+</p:sld>
+</file>
+
+<file path=ppt/slides/slide24.xml><?xml version="1.0" encoding="utf-8"?>
+<p:sld xmlns:a="http://schemas.openxmlformats.org/drawingml/2006/main" xmlns:r="http://schemas.openxmlformats.org/officeDocument/2006/relationships" xmlns:p="http://schemas.openxmlformats.org/presentationml/2006/main">
+  <p:cSld>
+    <p:spTree>
+      <p:nvGrpSpPr>
+        <p:cNvPr id="1" name=""/>
+        <p:cNvGrpSpPr/>
+        <p:nvPr/>
+      </p:nvGrpSpPr>
+      <p:grpSpPr>
+        <a:xfrm>
+          <a:off x="0" y="0"/>
+          <a:ext cx="0" cy="0"/>
+          <a:chOff x="0" y="0"/>
+          <a:chExt cx="0" cy="0"/>
+        </a:xfrm>
+      </p:grpSpPr>
+      <p:sp>
+        <p:nvSpPr>
+          <p:cNvPr id="2" name="Title 1"/>
+          <p:cNvSpPr>
+            <a:spLocks noGrp="1"/>
+          </p:cNvSpPr>
+          <p:nvPr>
+            <p:ph type="title"/>
+          </p:nvPr>
+        </p:nvSpPr>
+        <p:spPr/>
+        <p:txBody>
+          <a:bodyPr/>
+          <a:lstStyle/>
+          <a:p>
+            <a:r>
+              <a:rPr lang="en-US" dirty="0" smtClean="0"/>
+              <a:t>Backup Slides</a:t>
+            </a:r>
+            <a:endParaRPr lang="en-US" dirty="0"/>
+          </a:p>
+        </p:txBody>
+      </p:sp>
+      <p:sp>
+        <p:nvSpPr>
+          <p:cNvPr id="3" name="Content Placeholder 2"/>
+          <p:cNvSpPr>
+            <a:spLocks noGrp="1"/>
+          </p:cNvSpPr>
+          <p:nvPr>
+            <p:ph idx="1"/>
+          </p:nvPr>
+        </p:nvSpPr>
+        <p:spPr/>
+        <p:txBody>
+          <a:bodyPr/>
+          <a:lstStyle/>
+          <a:p>
+            <a:pPr marL="0" indent="0">
+              <a:buNone/>
+            </a:pPr>
+            <a:endParaRPr lang="en-US" dirty="0"/>
+          </a:p>
+        </p:txBody>
+      </p:sp>
+    </p:spTree>
+    <p:extLst>
+      <p:ext uri="{BB962C8B-B14F-4D97-AF65-F5344CB8AC3E}">
+        <p14:creationId xmlns:p14="http://schemas.microsoft.com/office/powerpoint/2010/main" val="1589961851"/>
+      </p:ext>
+    </p:extLst>
+  </p:cSld>
+  <p:clrMapOvr>
+    <a:masterClrMapping/>
+  </p:clrMapOvr>
+  <p:timing>
+    <p:tnLst>
+      <p:par>
+        <p:cTn id="1" dur="indefinite" restart="never" nodeType="tmRoot"/>
+      </p:par>
+    </p:tnLst>
+  </p:timing>
+</p:sld>
+</file>
+
+<file path=ppt/slides/slide25.xml><?xml version="1.0" encoding="utf-8"?>
+<p:sld xmlns:a="http://schemas.openxmlformats.org/drawingml/2006/main" xmlns:r="http://schemas.openxmlformats.org/officeDocument/2006/relationships" xmlns:p="http://schemas.openxmlformats.org/presentationml/2006/main">
+  <p:cSld>
+    <p:spTree>
+      <p:nvGrpSpPr>
+        <p:cNvPr id="1" name=""/>
+        <p:cNvGrpSpPr/>
+        <p:nvPr/>
+      </p:nvGrpSpPr>
+      <p:grpSpPr>
+        <a:xfrm>
+          <a:off x="0" y="0"/>
+          <a:ext cx="0" cy="0"/>
+          <a:chOff x="0" y="0"/>
+          <a:chExt cx="0" cy="0"/>
+        </a:xfrm>
+      </p:grpSpPr>
+      <p:sp>
+        <p:nvSpPr>
+          <p:cNvPr id="2" name="Title 1"/>
+          <p:cNvSpPr>
+            <a:spLocks noGrp="1"/>
+          </p:cNvSpPr>
+          <p:nvPr>
+            <p:ph type="title"/>
+          </p:nvPr>
+        </p:nvSpPr>
+        <p:spPr/>
+        <p:txBody>
+          <a:bodyPr/>
+          <a:lstStyle/>
+          <a:p>
+            <a:r>
+              <a:rPr lang="en-US" dirty="0" smtClean="0"/>
+              <a:t>h5py</a:t>
+            </a:r>
+            <a:endParaRPr lang="en-US" dirty="0"/>
+          </a:p>
+        </p:txBody>
+      </p:sp>
+      <p:sp>
+        <p:nvSpPr>
+          <p:cNvPr id="3" name="Content Placeholder 2"/>
+          <p:cNvSpPr>
+            <a:spLocks noGrp="1"/>
+          </p:cNvSpPr>
+          <p:nvPr>
+            <p:ph idx="1"/>
+          </p:nvPr>
+        </p:nvSpPr>
+        <p:spPr/>
+        <p:txBody>
+          <a:bodyPr/>
+          <a:lstStyle/>
+          <a:p>
+            <a:endParaRPr lang="en-US"/>
+          </a:p>
+        </p:txBody>
+      </p:sp>
+    </p:spTree>
+    <p:extLst>
+      <p:ext uri="{BB962C8B-B14F-4D97-AF65-F5344CB8AC3E}">
+        <p14:creationId xmlns:p14="http://schemas.microsoft.com/office/powerpoint/2010/main" val="2078919648"/>
+      </p:ext>
+    </p:extLst>
+  </p:cSld>
+  <p:clrMapOvr>
+    <a:masterClrMapping/>
+  </p:clrMapOvr>
+  <p:timing>
+    <p:tnLst>
+      <p:par>
+        <p:cTn id="1" dur="indefinite" restart="never" nodeType="tmRoot"/>
+      </p:par>
+    </p:tnLst>
+  </p:timing>
+</p:sld>
+</file>
+
+<file path=ppt/slides/slide26.xml><?xml version="1.0" encoding="utf-8"?>
+<p:sld xmlns:a="http://schemas.openxmlformats.org/drawingml/2006/main" xmlns:r="http://schemas.openxmlformats.org/officeDocument/2006/relationships" xmlns:p="http://schemas.openxmlformats.org/presentationml/2006/main">
+  <p:cSld>
+    <p:spTree>
+      <p:nvGrpSpPr>
+        <p:cNvPr id="1" name=""/>
+        <p:cNvGrpSpPr/>
+        <p:nvPr/>
+      </p:nvGrpSpPr>
+      <p:grpSpPr>
+        <a:xfrm>
+          <a:off x="0" y="0"/>
+          <a:ext cx="0" cy="0"/>
+          <a:chOff x="0" y="0"/>
+          <a:chExt cx="0" cy="0"/>
+        </a:xfrm>
+      </p:grpSpPr>
+      <p:sp>
+        <p:nvSpPr>
+          <p:cNvPr id="2" name="Title 1"/>
+          <p:cNvSpPr>
+            <a:spLocks noGrp="1"/>
+          </p:cNvSpPr>
+          <p:nvPr>
+            <p:ph type="title"/>
+          </p:nvPr>
+        </p:nvSpPr>
+        <p:spPr/>
+        <p:txBody>
+          <a:bodyPr/>
+          <a:lstStyle/>
+          <a:p>
+            <a:r>
+              <a:rPr lang="en-US" dirty="0" smtClean="0"/>
+              <a:t>Symbolic libraries: </a:t>
+            </a:r>
+            <a:r>
+              <a:rPr lang="en-US" dirty="0" err="1" smtClean="0"/>
+              <a:t>SymPy</a:t>
+            </a:r>
+            <a:r>
+              <a:rPr lang="en-US" dirty="0" smtClean="0"/>
+              <a:t> / Sage</a:t>
+            </a:r>
+            <a:endParaRPr lang="en-US" dirty="0"/>
+          </a:p>
+        </p:txBody>
+      </p:sp>
+      <p:sp>
+        <p:nvSpPr>
+          <p:cNvPr id="3" name="Content Placeholder 2"/>
+          <p:cNvSpPr>
+            <a:spLocks noGrp="1"/>
+          </p:cNvSpPr>
+          <p:nvPr>
+            <p:ph idx="1"/>
+          </p:nvPr>
+        </p:nvSpPr>
+        <p:spPr/>
+        <p:txBody>
+          <a:bodyPr/>
+          <a:lstStyle/>
+          <a:p>
+            <a:endParaRPr lang="en-US"/>
+          </a:p>
+        </p:txBody>
+      </p:sp>
+    </p:spTree>
+    <p:extLst>
+      <p:ext uri="{BB962C8B-B14F-4D97-AF65-F5344CB8AC3E}">
+        <p14:creationId xmlns:p14="http://schemas.microsoft.com/office/powerpoint/2010/main" val="3261099077"/>
+      </p:ext>
+    </p:extLst>
+  </p:cSld>
+  <p:clrMapOvr>
+    <a:masterClrMapping/>
+  </p:clrMapOvr>
+  <p:timing>
+    <p:tnLst>
+      <p:par>
+        <p:cTn id="1" dur="indefinite" restart="never" nodeType="tmRoot"/>
+      </p:par>
+    </p:tnLst>
+  </p:timing>
+</p:sld>
+</file>
+
+<file path=ppt/slides/slide27.xml><?xml version="1.0" encoding="utf-8"?>
+<p:sld xmlns:a="http://schemas.openxmlformats.org/drawingml/2006/main" xmlns:r="http://schemas.openxmlformats.org/officeDocument/2006/relationships" xmlns:p="http://schemas.openxmlformats.org/presentationml/2006/main">
+  <p:cSld>
+    <p:spTree>
+      <p:nvGrpSpPr>
+        <p:cNvPr id="1" name=""/>
+        <p:cNvGrpSpPr/>
+        <p:nvPr/>
+      </p:nvGrpSpPr>
+      <p:grpSpPr>
+        <a:xfrm>
+          <a:off x="0" y="0"/>
+          <a:ext cx="0" cy="0"/>
+          <a:chOff x="0" y="0"/>
+          <a:chExt cx="0" cy="0"/>
+        </a:xfrm>
+      </p:grpSpPr>
+      <p:sp>
+        <p:nvSpPr>
+          <p:cNvPr id="2" name="Title 1"/>
+          <p:cNvSpPr>
+            <a:spLocks noGrp="1"/>
+          </p:cNvSpPr>
+          <p:nvPr>
+            <p:ph type="title"/>
+          </p:nvPr>
+        </p:nvSpPr>
+        <p:spPr/>
+        <p:txBody>
+          <a:bodyPr/>
+          <a:lstStyle/>
+          <a:p>
+            <a:r>
+              <a:rPr lang="en-US" dirty="0"/>
+              <a:t>N</a:t>
+            </a:r>
+            <a:r>
+              <a:rPr lang="en-US" dirty="0" smtClean="0"/>
+              <a:t>ose</a:t>
+            </a:r>
+            <a:endParaRPr lang="en-US" dirty="0"/>
+          </a:p>
+        </p:txBody>
+      </p:sp>
+      <p:sp>
+        <p:nvSpPr>
+          <p:cNvPr id="3" name="Content Placeholder 2"/>
+          <p:cNvSpPr>
+            <a:spLocks noGrp="1"/>
+          </p:cNvSpPr>
+          <p:nvPr>
+            <p:ph idx="1"/>
+          </p:nvPr>
+        </p:nvSpPr>
+        <p:spPr/>
+        <p:txBody>
+          <a:bodyPr/>
+          <a:lstStyle/>
+          <a:p>
+            <a:endParaRPr lang="en-US"/>
+          </a:p>
+        </p:txBody>
+      </p:sp>
+    </p:spTree>
+    <p:extLst>
+      <p:ext uri="{BB962C8B-B14F-4D97-AF65-F5344CB8AC3E}">
+        <p14:creationId xmlns:p14="http://schemas.microsoft.com/office/powerpoint/2010/main" val="3993609276"/>
+      </p:ext>
+    </p:extLst>
+  </p:cSld>
+  <p:clrMapOvr>
+    <a:masterClrMapping/>
+  </p:clrMapOvr>
+  <p:timing>
+    <p:tnLst>
+      <p:par>
+        <p:cTn id="1" dur="indefinite" restart="never" nodeType="tmRoot"/>
+      </p:par>
+    </p:tnLst>
+  </p:timing>
+</p:sld>
+</file>
+
+<file path=ppt/slides/slide28.xml><?xml version="1.0" encoding="utf-8"?>
+<p:sld xmlns:a="http://schemas.openxmlformats.org/drawingml/2006/main" xmlns:r="http://schemas.openxmlformats.org/officeDocument/2006/relationships" xmlns:p="http://schemas.openxmlformats.org/presentationml/2006/main">
+  <p:cSld>
+    <p:spTree>
+      <p:nvGrpSpPr>
+        <p:cNvPr id="1" name=""/>
+        <p:cNvGrpSpPr/>
+        <p:nvPr/>
+      </p:nvGrpSpPr>
+      <p:grpSpPr>
+        <a:xfrm>
+          <a:off x="0" y="0"/>
+          <a:ext cx="0" cy="0"/>
+          <a:chOff x="0" y="0"/>
+          <a:chExt cx="0" cy="0"/>
+        </a:xfrm>
+      </p:grpSpPr>
+      <p:sp>
+        <p:nvSpPr>
+          <p:cNvPr id="2" name="Title 1"/>
+          <p:cNvSpPr>
+            <a:spLocks noGrp="1"/>
+          </p:cNvSpPr>
+          <p:nvPr>
+            <p:ph type="title"/>
+          </p:nvPr>
+        </p:nvSpPr>
+        <p:spPr/>
+        <p:txBody>
+          <a:bodyPr/>
+          <a:lstStyle/>
+          <a:p>
+            <a:r>
+              <a:rPr lang="en-US" dirty="0" smtClean="0"/>
+              <a:t>Profiling (</a:t>
+            </a:r>
+            <a:r>
+              <a:rPr lang="en-US" dirty="0" err="1" smtClean="0"/>
+              <a:t>cProfile</a:t>
+            </a:r>
+            <a:r>
+              <a:rPr lang="en-US" dirty="0" smtClean="0"/>
+              <a:t> + ???)</a:t>
+            </a:r>
+            <a:endParaRPr lang="en-US" dirty="0"/>
+          </a:p>
+        </p:txBody>
+      </p:sp>
+      <p:sp>
+        <p:nvSpPr>
+          <p:cNvPr id="3" name="Content Placeholder 2"/>
+          <p:cNvSpPr>
+            <a:spLocks noGrp="1"/>
+          </p:cNvSpPr>
+          <p:nvPr>
+            <p:ph idx="1"/>
+          </p:nvPr>
+        </p:nvSpPr>
+        <p:spPr/>
+        <p:txBody>
+          <a:bodyPr/>
+          <a:lstStyle/>
+          <a:p>
+            <a:r>
+              <a:rPr lang="en-US" dirty="0" smtClean="0"/>
+              <a:t>If code is slow, the first step to going faster is knowing </a:t>
+            </a:r>
+            <a:r>
+              <a:rPr lang="en-US" u="sng" dirty="0" smtClean="0"/>
+              <a:t>where</a:t>
+            </a:r>
+            <a:r>
+              <a:rPr lang="en-US" dirty="0" smtClean="0"/>
+              <a:t> and then </a:t>
+            </a:r>
+            <a:r>
+              <a:rPr lang="en-US" u="sng" dirty="0" smtClean="0"/>
+              <a:t>why</a:t>
+            </a:r>
+            <a:r>
+              <a:rPr lang="en-US" dirty="0" smtClean="0"/>
+              <a:t> it is slow</a:t>
+            </a:r>
+          </a:p>
+          <a:p>
+            <a:pPr lvl="1"/>
+            <a:r>
+              <a:rPr lang="en-US" dirty="0" smtClean="0"/>
+              <a:t>You could spend hours optimizing a routine that wasn’t slow to begin with!</a:t>
+            </a:r>
+            <a:endParaRPr lang="en-US" dirty="0"/>
+          </a:p>
+        </p:txBody>
+      </p:sp>
+    </p:spTree>
+    <p:extLst>
+      <p:ext uri="{BB962C8B-B14F-4D97-AF65-F5344CB8AC3E}">
+        <p14:creationId xmlns:p14="http://schemas.microsoft.com/office/powerpoint/2010/main" val="3572393508"/>
+      </p:ext>
+    </p:extLst>
+  </p:cSld>
+  <p:clrMapOvr>
+    <a:masterClrMapping/>
+  </p:clrMapOvr>
+  <p:timing>
+    <p:tnLst>
+      <p:par>
+        <p:cTn id="1" dur="indefinite" restart="never" nodeType="tmRoot"/>
+      </p:par>
+    </p:tnLst>
+  </p:timing>
+</p:sld>
+</file>
+
+<file path=ppt/slides/slide29.xml><?xml version="1.0" encoding="utf-8"?>
+<p:sld xmlns:a="http://schemas.openxmlformats.org/drawingml/2006/main" xmlns:r="http://schemas.openxmlformats.org/officeDocument/2006/relationships" xmlns:p="http://schemas.openxmlformats.org/presentationml/2006/main">
+  <p:cSld>
+    <p:spTree>
+      <p:nvGrpSpPr>
+        <p:cNvPr id="1" name=""/>
+        <p:cNvGrpSpPr/>
+        <p:nvPr/>
+      </p:nvGrpSpPr>
+      <p:grpSpPr>
+        <a:xfrm>
+          <a:off x="0" y="0"/>
+          <a:ext cx="0" cy="0"/>
+          <a:chOff x="0" y="0"/>
+          <a:chExt cx="0" cy="0"/>
+        </a:xfrm>
+      </p:grpSpPr>
+      <p:sp>
+        <p:nvSpPr>
+          <p:cNvPr id="2" name="Title 1"/>
+          <p:cNvSpPr>
+            <a:spLocks noGrp="1"/>
+          </p:cNvSpPr>
+          <p:nvPr>
+            <p:ph type="title"/>
+          </p:nvPr>
+        </p:nvSpPr>
+        <p:spPr/>
+        <p:txBody>
+          <a:bodyPr/>
+          <a:lstStyle/>
+          <a:p>
+            <a:r>
+              <a:rPr lang="en-US" dirty="0" err="1" smtClean="0"/>
+              <a:t>Numba</a:t>
+            </a:r>
+            <a:endParaRPr lang="en-US" dirty="0"/>
+          </a:p>
+        </p:txBody>
+      </p:sp>
+      <p:sp>
+        <p:nvSpPr>
+          <p:cNvPr id="3" name="Content Placeholder 2"/>
+          <p:cNvSpPr>
+            <a:spLocks noGrp="1"/>
+          </p:cNvSpPr>
+          <p:nvPr>
+            <p:ph idx="1"/>
+          </p:nvPr>
+        </p:nvSpPr>
+        <p:spPr/>
+        <p:txBody>
+          <a:bodyPr/>
+          <a:lstStyle/>
+          <a:p>
+            <a:r>
+              <a:rPr lang="en-US" dirty="0" smtClean="0"/>
+              <a:t>Going fast, but </a:t>
+            </a:r>
+            <a:r>
+              <a:rPr lang="en-US" u="sng" dirty="0" smtClean="0"/>
+              <a:t>not a cure-all</a:t>
+            </a:r>
+            <a:endParaRPr lang="en-US" dirty="0" smtClean="0"/>
+          </a:p>
+          <a:p>
+            <a:r>
+              <a:rPr lang="en-US" dirty="0" smtClean="0"/>
+              <a:t>JIT compilation</a:t>
+            </a:r>
+          </a:p>
+          <a:p>
+            <a:r>
+              <a:rPr lang="en-US" dirty="0" err="1" smtClean="0"/>
+              <a:t>Numpy</a:t>
+            </a:r>
+            <a:r>
+              <a:rPr lang="en-US" dirty="0" smtClean="0"/>
+              <a:t> support</a:t>
+            </a:r>
+          </a:p>
+          <a:p>
+            <a:r>
+              <a:rPr lang="en-US" dirty="0" err="1" smtClean="0"/>
+              <a:t>Vectorizing</a:t>
+            </a:r>
+            <a:r>
+              <a:rPr lang="en-US" dirty="0" smtClean="0"/>
+              <a:t> functions</a:t>
+            </a:r>
+            <a:endParaRPr lang="en-US" dirty="0"/>
+          </a:p>
+        </p:txBody>
+      </p:sp>
+    </p:spTree>
+    <p:extLst>
+      <p:ext uri="{BB962C8B-B14F-4D97-AF65-F5344CB8AC3E}">
+        <p14:creationId xmlns:p14="http://schemas.microsoft.com/office/powerpoint/2010/main" val="2362128199"/>
+      </p:ext>
+    </p:extLst>
+  </p:cSld>
+  <p:clrMapOvr>
+    <a:masterClrMapping/>
+  </p:clrMapOvr>
+  <p:timing>
+    <p:tnLst>
+      <p:par>
+        <p:cTn id="1" dur="indefinite" restart="never" nodeType="tmRoot"/>
+      </p:par>
+    </p:tnLst>
+  </p:timing>
+</p:sld>
+</file>
+
+<file path=ppt/slides/slide3.xml><?xml version="1.0" encoding="utf-8"?>
+<p:sld xmlns:a="http://schemas.openxmlformats.org/drawingml/2006/main" xmlns:r="http://schemas.openxmlformats.org/officeDocument/2006/relationships" xmlns:p="http://schemas.openxmlformats.org/presentationml/2006/main">
+  <p:cSld>
+    <p:spTree>
+      <p:nvGrpSpPr>
+        <p:cNvPr id="1" name=""/>
+        <p:cNvGrpSpPr/>
+        <p:nvPr/>
+      </p:nvGrpSpPr>
+      <p:grpSpPr>
+        <a:xfrm>
+          <a:off x="0" y="0"/>
+          <a:ext cx="0" cy="0"/>
+          <a:chOff x="0" y="0"/>
+          <a:chExt cx="0" cy="0"/>
+        </a:xfrm>
+      </p:grpSpPr>
+      <p:sp>
+        <p:nvSpPr>
+          <p:cNvPr id="2" name="Title 1"/>
+          <p:cNvSpPr>
+            <a:spLocks noGrp="1"/>
+          </p:cNvSpPr>
+          <p:nvPr>
+            <p:ph type="title"/>
+          </p:nvPr>
+        </p:nvSpPr>
+        <p:spPr/>
+        <p:txBody>
+          <a:bodyPr/>
+          <a:lstStyle/>
+          <a:p>
+            <a:r>
+              <a:rPr lang="en-US" dirty="0" smtClean="0"/>
+              <a:t>Scope of this talk</a:t>
+            </a:r>
+            <a:endParaRPr lang="en-US" dirty="0"/>
+          </a:p>
+        </p:txBody>
+      </p:sp>
+      <p:sp>
+        <p:nvSpPr>
+          <p:cNvPr id="3" name="Content Placeholder 2"/>
+          <p:cNvSpPr>
+            <a:spLocks noGrp="1"/>
+          </p:cNvSpPr>
+          <p:nvPr>
+            <p:ph idx="1"/>
+          </p:nvPr>
+        </p:nvSpPr>
+        <p:spPr/>
+        <p:txBody>
+          <a:bodyPr/>
+          <a:lstStyle/>
+          <a:p>
+            <a:r>
+              <a:rPr lang="en-US" dirty="0" smtClean="0"/>
               <a:t>We will </a:t>
             </a:r>
             <a:r>
@@ -4985,48 +7312,84 @@
           <a:p>
             <a:pPr lvl="1"/>
             <a:r>
-              <a:rPr lang="en-US" dirty="0" err="1" smtClean="0"/>
+              <a:rPr lang="en-US" dirty="0" err="1" smtClean="0">
+                <a:solidFill>
+                  <a:schemeClr val="tx2"/>
+                </a:solidFill>
+              </a:rPr>
               <a:t>matplotlib</a:t>
             </a:r>
             <a:r>
-              <a:rPr lang="en-US" dirty="0" smtClean="0"/>
+              <a:rPr lang="en-US" dirty="0" smtClean="0">
+                <a:solidFill>
+                  <a:schemeClr val="tx2"/>
+                </a:solidFill>
+              </a:rPr>
               <a:t>, </a:t>
             </a:r>
             <a:r>
-              <a:rPr lang="en-US" dirty="0" err="1" smtClean="0"/>
+              <a:rPr lang="en-US" dirty="0" err="1" smtClean="0">
+                <a:solidFill>
+                  <a:schemeClr val="tx2"/>
+                </a:solidFill>
+              </a:rPr>
               <a:t>bokeh</a:t>
             </a:r>
             <a:r>
-              <a:rPr lang="en-US" dirty="0" smtClean="0"/>
+              <a:rPr lang="en-US" dirty="0" smtClean="0">
+                <a:solidFill>
+                  <a:schemeClr val="tx2"/>
+                </a:solidFill>
+              </a:rPr>
               <a:t>, </a:t>
             </a:r>
             <a:r>
-              <a:rPr lang="en-US" dirty="0" err="1" smtClean="0"/>
+              <a:rPr lang="en-US" dirty="0" err="1" smtClean="0">
+                <a:solidFill>
+                  <a:schemeClr val="tx2"/>
+                </a:solidFill>
+              </a:rPr>
               <a:t>seaborn</a:t>
             </a:r>
             <a:r>
-              <a:rPr lang="en-US" dirty="0" smtClean="0"/>
+              <a:rPr lang="en-US" dirty="0" smtClean="0">
+                <a:solidFill>
+                  <a:schemeClr val="tx2"/>
+                </a:solidFill>
+              </a:rPr>
               <a:t>, </a:t>
             </a:r>
             <a:r>
-              <a:rPr lang="en-US" dirty="0" err="1" smtClean="0"/>
+              <a:rPr lang="en-US" dirty="0" err="1" smtClean="0">
+                <a:solidFill>
+                  <a:schemeClr val="tx2"/>
+                </a:solidFill>
+              </a:rPr>
               <a:t>plotly</a:t>
             </a:r>
             <a:r>
-              <a:rPr lang="en-US" dirty="0" smtClean="0"/>
+              <a:rPr lang="en-US" dirty="0" smtClean="0">
+                <a:solidFill>
+                  <a:schemeClr val="tx2"/>
+                </a:solidFill>
+              </a:rPr>
               <a:t>, </a:t>
             </a:r>
             <a:r>
-              <a:rPr lang="en-US" dirty="0" err="1" smtClean="0"/>
+              <a:rPr lang="en-US" dirty="0" err="1" smtClean="0">
+                <a:solidFill>
+                  <a:schemeClr val="tx2"/>
+                </a:solidFill>
+              </a:rPr>
               <a:t>ggplot</a:t>
             </a:r>
             <a:r>
-              <a:rPr lang="en-US" dirty="0" smtClean="0"/>
-              <a:t>, </a:t>
-            </a:r>
-            <a:r>
-              <a:rPr lang="en-US" dirty="0" smtClean="0"/>
-              <a:t>VTK</a:t>
+              <a:rPr lang="en-US" dirty="0" smtClean="0">
+                <a:solidFill>
+                  <a:schemeClr val="tx2"/>
+                </a:solidFill>
+              </a:rPr>
+              <a:t>, VTK</a:t>
             </a:r>
           </a:p>
           <a:p>
@@ -5204,714 +7567,7 @@
 </p:sld>
 </file>
 
-<file path=ppt/slides/slide20.xml><?xml version="1.0" encoding="utf-8"?>
-<p:sld xmlns:a="http://schemas.openxmlformats.org/drawingml/2006/main" xmlns:r="http://schemas.openxmlformats.org/officeDocument/2006/relationships" xmlns:p="http://schemas.openxmlformats.org/presentationml/2006/main">
-  <p:cSld>
-    <p:spTree>
-      <p:nvGrpSpPr>
-        <p:cNvPr id="1" name=""/>
-        <p:cNvGrpSpPr/>
-        <p:nvPr/>
-      </p:nvGrpSpPr>
-      <p:grpSpPr>
-        <a:xfrm>
-          <a:off x="0" y="0"/>
-          <a:ext cx="0" cy="0"/>
-          <a:chOff x="0" y="0"/>
-          <a:chExt cx="0" cy="0"/>
-        </a:xfrm>
-      </p:grpSpPr>
-      <p:sp>
-        <p:nvSpPr>
-          <p:cNvPr id="2" name="Title 1"/>
-          <p:cNvSpPr>
-            <a:spLocks noGrp="1"/>
-          </p:cNvSpPr>
-          <p:nvPr>
-            <p:ph type="title"/>
-          </p:nvPr>
-        </p:nvSpPr>
-        <p:spPr/>
-        <p:txBody>
-          <a:bodyPr/>
-          <a:lstStyle/>
-          <a:p>
-            <a:r>
-              <a:rPr lang="en-US" dirty="0" smtClean="0"/>
-              <a:t>h5py</a:t>
-            </a:r>
-            <a:endParaRPr lang="en-US" dirty="0"/>
-          </a:p>
-        </p:txBody>
-      </p:sp>
-      <p:sp>
-        <p:nvSpPr>
-          <p:cNvPr id="3" name="Content Placeholder 2"/>
-          <p:cNvSpPr>
-            <a:spLocks noGrp="1"/>
-          </p:cNvSpPr>
-          <p:nvPr>
-            <p:ph idx="1"/>
-          </p:nvPr>
-        </p:nvSpPr>
-        <p:spPr/>
-        <p:txBody>
-          <a:bodyPr/>
-          <a:lstStyle/>
-          <a:p>
-            <a:endParaRPr lang="en-US"/>
-          </a:p>
-        </p:txBody>
-      </p:sp>
-    </p:spTree>
-    <p:extLst>
-      <p:ext uri="{BB962C8B-B14F-4D97-AF65-F5344CB8AC3E}">
-        <p14:creationId xmlns:p14="http://schemas.microsoft.com/office/powerpoint/2010/main" val="2078919648"/>
-      </p:ext>
-    </p:extLst>
-  </p:cSld>
-  <p:clrMapOvr>
-    <a:masterClrMapping/>
-  </p:clrMapOvr>
-  <p:timing>
-    <p:tnLst>
-      <p:par>
-        <p:cTn id="1" dur="indefinite" restart="never" nodeType="tmRoot"/>
-      </p:par>
-    </p:tnLst>
-  </p:timing>
-</p:sld>
-</file>
-
-<file path=ppt/slides/slide21.xml><?xml version="1.0" encoding="utf-8"?>
-<p:sld xmlns:a="http://schemas.openxmlformats.org/drawingml/2006/main" xmlns:r="http://schemas.openxmlformats.org/officeDocument/2006/relationships" xmlns:p="http://schemas.openxmlformats.org/presentationml/2006/main">
-  <p:cSld>
-    <p:spTree>
-      <p:nvGrpSpPr>
-        <p:cNvPr id="1" name=""/>
-        <p:cNvGrpSpPr/>
-        <p:nvPr/>
-      </p:nvGrpSpPr>
-      <p:grpSpPr>
-        <a:xfrm>
-          <a:off x="0" y="0"/>
-          <a:ext cx="0" cy="0"/>
-          <a:chOff x="0" y="0"/>
-          <a:chExt cx="0" cy="0"/>
-        </a:xfrm>
-      </p:grpSpPr>
-      <p:sp>
-        <p:nvSpPr>
-          <p:cNvPr id="2" name="Title 1"/>
-          <p:cNvSpPr>
-            <a:spLocks noGrp="1"/>
-          </p:cNvSpPr>
-          <p:nvPr>
-            <p:ph type="title"/>
-          </p:nvPr>
-        </p:nvSpPr>
-        <p:spPr/>
-        <p:txBody>
-          <a:bodyPr/>
-          <a:lstStyle/>
-          <a:p>
-            <a:r>
-              <a:rPr lang="en-US" smtClean="0"/>
-              <a:t>Astropy</a:t>
-            </a:r>
-            <a:endParaRPr lang="en-US"/>
-          </a:p>
-        </p:txBody>
-      </p:sp>
-      <p:sp>
-        <p:nvSpPr>
-          <p:cNvPr id="3" name="Content Placeholder 2"/>
-          <p:cNvSpPr>
-            <a:spLocks noGrp="1"/>
-          </p:cNvSpPr>
-          <p:nvPr>
-            <p:ph idx="1"/>
-          </p:nvPr>
-        </p:nvSpPr>
-        <p:spPr/>
-        <p:txBody>
-          <a:bodyPr/>
-          <a:lstStyle/>
-          <a:p>
-            <a:r>
-              <a:rPr lang="en-US" dirty="0" smtClean="0"/>
-              <a:t>Leo?</a:t>
-            </a:r>
-            <a:endParaRPr lang="en-US" dirty="0"/>
-          </a:p>
-        </p:txBody>
-      </p:sp>
-    </p:spTree>
-    <p:extLst>
-      <p:ext uri="{BB962C8B-B14F-4D97-AF65-F5344CB8AC3E}">
-        <p14:creationId xmlns:p14="http://schemas.microsoft.com/office/powerpoint/2010/main" val="290858453"/>
-      </p:ext>
-    </p:extLst>
-  </p:cSld>
-  <p:clrMapOvr>
-    <a:masterClrMapping/>
-  </p:clrMapOvr>
-  <p:timing>
-    <p:tnLst>
-      <p:par>
-        <p:cTn id="1" dur="indefinite" restart="never" nodeType="tmRoot"/>
-      </p:par>
-    </p:tnLst>
-  </p:timing>
-</p:sld>
-</file>
-
-<file path=ppt/slides/slide22.xml><?xml version="1.0" encoding="utf-8"?>
-<p:sld xmlns:a="http://schemas.openxmlformats.org/drawingml/2006/main" xmlns:r="http://schemas.openxmlformats.org/officeDocument/2006/relationships" xmlns:p="http://schemas.openxmlformats.org/presentationml/2006/main">
-  <p:cSld>
-    <p:spTree>
-      <p:nvGrpSpPr>
-        <p:cNvPr id="1" name=""/>
-        <p:cNvGrpSpPr/>
-        <p:nvPr/>
-      </p:nvGrpSpPr>
-      <p:grpSpPr>
-        <a:xfrm>
-          <a:off x="0" y="0"/>
-          <a:ext cx="0" cy="0"/>
-          <a:chOff x="0" y="0"/>
-          <a:chExt cx="0" cy="0"/>
-        </a:xfrm>
-      </p:grpSpPr>
-      <p:sp>
-        <p:nvSpPr>
-          <p:cNvPr id="2" name="Title 1"/>
-          <p:cNvSpPr>
-            <a:spLocks noGrp="1"/>
-          </p:cNvSpPr>
-          <p:nvPr>
-            <p:ph type="title"/>
-          </p:nvPr>
-        </p:nvSpPr>
-        <p:spPr>
-          <a:xfrm>
-            <a:off x="457200" y="2874722"/>
-            <a:ext cx="8229600" cy="803756"/>
-          </a:xfrm>
-        </p:spPr>
-        <p:txBody>
-          <a:bodyPr/>
-          <a:lstStyle/>
-          <a:p>
-            <a:r>
-              <a:rPr lang="en-US" dirty="0" smtClean="0"/>
-              <a:t>Thank you!</a:t>
-            </a:r>
-            <a:endParaRPr lang="en-US" dirty="0"/>
-          </a:p>
-        </p:txBody>
-      </p:sp>
-    </p:spTree>
-    <p:extLst>
-      <p:ext uri="{BB962C8B-B14F-4D97-AF65-F5344CB8AC3E}">
-        <p14:creationId xmlns:p14="http://schemas.microsoft.com/office/powerpoint/2010/main" val="1844849267"/>
-      </p:ext>
-    </p:extLst>
-  </p:cSld>
-  <p:clrMapOvr>
-    <a:masterClrMapping/>
-  </p:clrMapOvr>
-  <p:timing>
-    <p:tnLst>
-      <p:par>
-        <p:cTn id="1" dur="indefinite" restart="never" nodeType="tmRoot"/>
-      </p:par>
-    </p:tnLst>
-  </p:timing>
-</p:sld>
-</file>
-
-<file path=ppt/slides/slide23.xml><?xml version="1.0" encoding="utf-8"?>
-<p:sld xmlns:a="http://schemas.openxmlformats.org/drawingml/2006/main" xmlns:r="http://schemas.openxmlformats.org/officeDocument/2006/relationships" xmlns:p="http://schemas.openxmlformats.org/presentationml/2006/main">
-  <p:cSld>
-    <p:spTree>
-      <p:nvGrpSpPr>
-        <p:cNvPr id="1" name=""/>
-        <p:cNvGrpSpPr/>
-        <p:nvPr/>
-      </p:nvGrpSpPr>
-      <p:grpSpPr>
-        <a:xfrm>
-          <a:off x="0" y="0"/>
-          <a:ext cx="0" cy="0"/>
-          <a:chOff x="0" y="0"/>
-          <a:chExt cx="0" cy="0"/>
-        </a:xfrm>
-      </p:grpSpPr>
-      <p:sp>
-        <p:nvSpPr>
-          <p:cNvPr id="2" name="Title 1"/>
-          <p:cNvSpPr>
-            <a:spLocks noGrp="1"/>
-          </p:cNvSpPr>
-          <p:nvPr>
-            <p:ph type="title"/>
-          </p:nvPr>
-        </p:nvSpPr>
-        <p:spPr/>
-        <p:txBody>
-          <a:bodyPr/>
-          <a:lstStyle/>
-          <a:p>
-            <a:r>
-              <a:rPr lang="en-US" dirty="0" smtClean="0"/>
-              <a:t>Backup Slides</a:t>
-            </a:r>
-            <a:endParaRPr lang="en-US" dirty="0"/>
-          </a:p>
-        </p:txBody>
-      </p:sp>
-      <p:sp>
-        <p:nvSpPr>
-          <p:cNvPr id="3" name="Content Placeholder 2"/>
-          <p:cNvSpPr>
-            <a:spLocks noGrp="1"/>
-          </p:cNvSpPr>
-          <p:nvPr>
-            <p:ph idx="1"/>
-          </p:nvPr>
-        </p:nvSpPr>
-        <p:spPr/>
-        <p:txBody>
-          <a:bodyPr/>
-          <a:lstStyle/>
-          <a:p>
-            <a:pPr marL="0" indent="0">
-              <a:buNone/>
-            </a:pPr>
-            <a:endParaRPr lang="en-US" dirty="0"/>
-          </a:p>
-        </p:txBody>
-      </p:sp>
-    </p:spTree>
-    <p:extLst>
-      <p:ext uri="{BB962C8B-B14F-4D97-AF65-F5344CB8AC3E}">
-        <p14:creationId xmlns:p14="http://schemas.microsoft.com/office/powerpoint/2010/main" val="1589961851"/>
-      </p:ext>
-    </p:extLst>
-  </p:cSld>
-  <p:clrMapOvr>
-    <a:masterClrMapping/>
-  </p:clrMapOvr>
-  <p:timing>
-    <p:tnLst>
-      <p:par>
-        <p:cTn id="1" dur="indefinite" restart="never" nodeType="tmRoot"/>
-      </p:par>
-    </p:tnLst>
-  </p:timing>
-</p:sld>
-</file>
-
-<file path=ppt/slides/slide24.xml><?xml version="1.0" encoding="utf-8"?>
-<p:sld xmlns:a="http://schemas.openxmlformats.org/drawingml/2006/main" xmlns:r="http://schemas.openxmlformats.org/officeDocument/2006/relationships" xmlns:p="http://schemas.openxmlformats.org/presentationml/2006/main">
-  <p:cSld>
-    <p:spTree>
-      <p:nvGrpSpPr>
-        <p:cNvPr id="1" name=""/>
-        <p:cNvGrpSpPr/>
-        <p:nvPr/>
-      </p:nvGrpSpPr>
-      <p:grpSpPr>
-        <a:xfrm>
-          <a:off x="0" y="0"/>
-          <a:ext cx="0" cy="0"/>
-          <a:chOff x="0" y="0"/>
-          <a:chExt cx="0" cy="0"/>
-        </a:xfrm>
-      </p:grpSpPr>
-      <p:sp>
-        <p:nvSpPr>
-          <p:cNvPr id="2" name="Title 1"/>
-          <p:cNvSpPr>
-            <a:spLocks noGrp="1"/>
-          </p:cNvSpPr>
-          <p:nvPr>
-            <p:ph type="title"/>
-          </p:nvPr>
-        </p:nvSpPr>
-        <p:spPr/>
-        <p:txBody>
-          <a:bodyPr/>
-          <a:lstStyle/>
-          <a:p>
-            <a:r>
-              <a:rPr lang="en-US" dirty="0" smtClean="0"/>
-              <a:t>Symbolic libraries: </a:t>
-            </a:r>
-            <a:r>
-              <a:rPr lang="en-US" dirty="0" err="1" smtClean="0"/>
-              <a:t>SymPy</a:t>
-            </a:r>
-            <a:r>
-              <a:rPr lang="en-US" dirty="0" smtClean="0"/>
-              <a:t> / Sage</a:t>
-            </a:r>
-            <a:endParaRPr lang="en-US" dirty="0"/>
-          </a:p>
-        </p:txBody>
-      </p:sp>
-      <p:sp>
-        <p:nvSpPr>
-          <p:cNvPr id="3" name="Content Placeholder 2"/>
-          <p:cNvSpPr>
-            <a:spLocks noGrp="1"/>
-          </p:cNvSpPr>
-          <p:nvPr>
-            <p:ph idx="1"/>
-          </p:nvPr>
-        </p:nvSpPr>
-        <p:spPr/>
-        <p:txBody>
-          <a:bodyPr/>
-          <a:lstStyle/>
-          <a:p>
-            <a:endParaRPr lang="en-US"/>
-          </a:p>
-        </p:txBody>
-      </p:sp>
-    </p:spTree>
-    <p:extLst>
-      <p:ext uri="{BB962C8B-B14F-4D97-AF65-F5344CB8AC3E}">
-        <p14:creationId xmlns:p14="http://schemas.microsoft.com/office/powerpoint/2010/main" val="3261099077"/>
-      </p:ext>
-    </p:extLst>
-  </p:cSld>
-  <p:clrMapOvr>
-    <a:masterClrMapping/>
-  </p:clrMapOvr>
-  <p:timing>
-    <p:tnLst>
-      <p:par>
-        <p:cTn id="1" dur="indefinite" restart="never" nodeType="tmRoot"/>
-      </p:par>
-    </p:tnLst>
-  </p:timing>
-</p:sld>
-</file>
-
-<file path=ppt/slides/slide25.xml><?xml version="1.0" encoding="utf-8"?>
-<p:sld xmlns:a="http://schemas.openxmlformats.org/drawingml/2006/main" xmlns:r="http://schemas.openxmlformats.org/officeDocument/2006/relationships" xmlns:p="http://schemas.openxmlformats.org/presentationml/2006/main">
-  <p:cSld>
-    <p:spTree>
-      <p:nvGrpSpPr>
-        <p:cNvPr id="1" name=""/>
-        <p:cNvGrpSpPr/>
-        <p:nvPr/>
-      </p:nvGrpSpPr>
-      <p:grpSpPr>
-        <a:xfrm>
-          <a:off x="0" y="0"/>
-          <a:ext cx="0" cy="0"/>
-          <a:chOff x="0" y="0"/>
-          <a:chExt cx="0" cy="0"/>
-        </a:xfrm>
-      </p:grpSpPr>
-      <p:sp>
-        <p:nvSpPr>
-          <p:cNvPr id="2" name="Title 1"/>
-          <p:cNvSpPr>
-            <a:spLocks noGrp="1"/>
-          </p:cNvSpPr>
-          <p:nvPr>
-            <p:ph type="title"/>
-          </p:nvPr>
-        </p:nvSpPr>
-        <p:spPr/>
-        <p:txBody>
-          <a:bodyPr/>
-          <a:lstStyle/>
-          <a:p>
-            <a:r>
-              <a:rPr lang="en-US" dirty="0"/>
-              <a:t>N</a:t>
-            </a:r>
-            <a:r>
-              <a:rPr lang="en-US" dirty="0" smtClean="0"/>
-              <a:t>ose</a:t>
-            </a:r>
-            <a:endParaRPr lang="en-US" dirty="0"/>
-          </a:p>
-        </p:txBody>
-      </p:sp>
-      <p:sp>
-        <p:nvSpPr>
-          <p:cNvPr id="3" name="Content Placeholder 2"/>
-          <p:cNvSpPr>
-            <a:spLocks noGrp="1"/>
-          </p:cNvSpPr>
-          <p:nvPr>
-            <p:ph idx="1"/>
-          </p:nvPr>
-        </p:nvSpPr>
-        <p:spPr/>
-        <p:txBody>
-          <a:bodyPr/>
-          <a:lstStyle/>
-          <a:p>
-            <a:endParaRPr lang="en-US"/>
-          </a:p>
-        </p:txBody>
-      </p:sp>
-    </p:spTree>
-    <p:extLst>
-      <p:ext uri="{BB962C8B-B14F-4D97-AF65-F5344CB8AC3E}">
-        <p14:creationId xmlns:p14="http://schemas.microsoft.com/office/powerpoint/2010/main" val="3993609276"/>
-      </p:ext>
-    </p:extLst>
-  </p:cSld>
-  <p:clrMapOvr>
-    <a:masterClrMapping/>
-  </p:clrMapOvr>
-  <p:timing>
-    <p:tnLst>
-      <p:par>
-        <p:cTn id="1" dur="indefinite" restart="never" nodeType="tmRoot"/>
-      </p:par>
-    </p:tnLst>
-  </p:timing>
-</p:sld>
-</file>
-
-<file path=ppt/slides/slide26.xml><?xml version="1.0" encoding="utf-8"?>
-<p:sld xmlns:a="http://schemas.openxmlformats.org/drawingml/2006/main" xmlns:r="http://schemas.openxmlformats.org/officeDocument/2006/relationships" xmlns:p="http://schemas.openxmlformats.org/presentationml/2006/main">
-  <p:cSld>
-    <p:spTree>
-      <p:nvGrpSpPr>
-        <p:cNvPr id="1" name=""/>
-        <p:cNvGrpSpPr/>
-        <p:nvPr/>
-      </p:nvGrpSpPr>
-      <p:grpSpPr>
-        <a:xfrm>
-          <a:off x="0" y="0"/>
-          <a:ext cx="0" cy="0"/>
-          <a:chOff x="0" y="0"/>
-          <a:chExt cx="0" cy="0"/>
-        </a:xfrm>
-      </p:grpSpPr>
-      <p:sp>
-        <p:nvSpPr>
-          <p:cNvPr id="2" name="Title 1"/>
-          <p:cNvSpPr>
-            <a:spLocks noGrp="1"/>
-          </p:cNvSpPr>
-          <p:nvPr>
-            <p:ph type="title"/>
-          </p:nvPr>
-        </p:nvSpPr>
-        <p:spPr/>
-        <p:txBody>
-          <a:bodyPr/>
-          <a:lstStyle/>
-          <a:p>
-            <a:r>
-              <a:rPr lang="en-US" dirty="0" smtClean="0"/>
-              <a:t>Profiling (</a:t>
-            </a:r>
-            <a:r>
-              <a:rPr lang="en-US" dirty="0" err="1" smtClean="0"/>
-              <a:t>cProfile</a:t>
-            </a:r>
-            <a:r>
-              <a:rPr lang="en-US" dirty="0" smtClean="0"/>
-              <a:t> + ???)</a:t>
-            </a:r>
-            <a:endParaRPr lang="en-US" dirty="0"/>
-          </a:p>
-        </p:txBody>
-      </p:sp>
-      <p:sp>
-        <p:nvSpPr>
-          <p:cNvPr id="3" name="Content Placeholder 2"/>
-          <p:cNvSpPr>
-            <a:spLocks noGrp="1"/>
-          </p:cNvSpPr>
-          <p:nvPr>
-            <p:ph idx="1"/>
-          </p:nvPr>
-        </p:nvSpPr>
-        <p:spPr/>
-        <p:txBody>
-          <a:bodyPr/>
-          <a:lstStyle/>
-          <a:p>
-            <a:r>
-              <a:rPr lang="en-US" dirty="0" smtClean="0"/>
-              <a:t>If code is slow, the first step to going faster is knowing </a:t>
-            </a:r>
-            <a:r>
-              <a:rPr lang="en-US" u="sng" dirty="0" smtClean="0"/>
-              <a:t>where</a:t>
-            </a:r>
-            <a:r>
-              <a:rPr lang="en-US" dirty="0" smtClean="0"/>
-              <a:t> and then </a:t>
-            </a:r>
-            <a:r>
-              <a:rPr lang="en-US" u="sng" dirty="0" smtClean="0"/>
-              <a:t>why</a:t>
-            </a:r>
-            <a:r>
-              <a:rPr lang="en-US" dirty="0" smtClean="0"/>
-              <a:t> it is slow</a:t>
-            </a:r>
-          </a:p>
-          <a:p>
-            <a:pPr lvl="1"/>
-            <a:r>
-              <a:rPr lang="en-US" dirty="0" smtClean="0"/>
-              <a:t>You could spend hours optimizing a routine that wasn’t slow to begin with!</a:t>
-            </a:r>
-            <a:endParaRPr lang="en-US" dirty="0"/>
-          </a:p>
-        </p:txBody>
-      </p:sp>
-    </p:spTree>
-    <p:extLst>
-      <p:ext uri="{BB962C8B-B14F-4D97-AF65-F5344CB8AC3E}">
-        <p14:creationId xmlns:p14="http://schemas.microsoft.com/office/powerpoint/2010/main" val="3572393508"/>
-      </p:ext>
-    </p:extLst>
-  </p:cSld>
-  <p:clrMapOvr>
-    <a:masterClrMapping/>
-  </p:clrMapOvr>
-  <p:timing>
-    <p:tnLst>
-      <p:par>
-        <p:cTn id="1" dur="indefinite" restart="never" nodeType="tmRoot"/>
-      </p:par>
-    </p:tnLst>
-  </p:timing>
-</p:sld>
-</file>
-
-<file path=ppt/slides/slide27.xml><?xml version="1.0" encoding="utf-8"?>
-<p:sld xmlns:a="http://schemas.openxmlformats.org/drawingml/2006/main" xmlns:r="http://schemas.openxmlformats.org/officeDocument/2006/relationships" xmlns:p="http://schemas.openxmlformats.org/presentationml/2006/main">
-  <p:cSld>
-    <p:spTree>
-      <p:nvGrpSpPr>
-        <p:cNvPr id="1" name=""/>
-        <p:cNvGrpSpPr/>
-        <p:nvPr/>
-      </p:nvGrpSpPr>
-      <p:grpSpPr>
-        <a:xfrm>
-          <a:off x="0" y="0"/>
-          <a:ext cx="0" cy="0"/>
-          <a:chOff x="0" y="0"/>
-          <a:chExt cx="0" cy="0"/>
-        </a:xfrm>
-      </p:grpSpPr>
-      <p:sp>
-        <p:nvSpPr>
-          <p:cNvPr id="2" name="Title 1"/>
-          <p:cNvSpPr>
-            <a:spLocks noGrp="1"/>
-          </p:cNvSpPr>
-          <p:nvPr>
-            <p:ph type="title"/>
-          </p:nvPr>
-        </p:nvSpPr>
-        <p:spPr/>
-        <p:txBody>
-          <a:bodyPr/>
-          <a:lstStyle/>
-          <a:p>
-            <a:r>
-              <a:rPr lang="en-US" dirty="0" err="1" smtClean="0"/>
-              <a:t>Numba</a:t>
-            </a:r>
-            <a:endParaRPr lang="en-US" dirty="0"/>
-          </a:p>
-        </p:txBody>
-      </p:sp>
-      <p:sp>
-        <p:nvSpPr>
-          <p:cNvPr id="3" name="Content Placeholder 2"/>
-          <p:cNvSpPr>
-            <a:spLocks noGrp="1"/>
-          </p:cNvSpPr>
-          <p:nvPr>
-            <p:ph idx="1"/>
-          </p:nvPr>
-        </p:nvSpPr>
-        <p:spPr/>
-        <p:txBody>
-          <a:bodyPr/>
-          <a:lstStyle/>
-          <a:p>
-            <a:r>
-              <a:rPr lang="en-US" dirty="0" smtClean="0"/>
-              <a:t>Going fast, but </a:t>
-            </a:r>
-            <a:r>
-              <a:rPr lang="en-US" u="sng" dirty="0" smtClean="0"/>
-              <a:t>not a cure-all</a:t>
-            </a:r>
-            <a:endParaRPr lang="en-US" dirty="0" smtClean="0"/>
-          </a:p>
-          <a:p>
-            <a:r>
-              <a:rPr lang="en-US" dirty="0" smtClean="0"/>
-              <a:t>JIT compilation</a:t>
-            </a:r>
-          </a:p>
-          <a:p>
-            <a:r>
-              <a:rPr lang="en-US" dirty="0" err="1" smtClean="0"/>
-              <a:t>Numpy</a:t>
-            </a:r>
-            <a:r>
-              <a:rPr lang="en-US" dirty="0" smtClean="0"/>
-              <a:t> support</a:t>
-            </a:r>
-          </a:p>
-          <a:p>
-            <a:r>
-              <a:rPr lang="en-US" dirty="0" err="1" smtClean="0"/>
-              <a:t>Vectorizing</a:t>
-            </a:r>
-            <a:r>
-              <a:rPr lang="en-US" dirty="0" smtClean="0"/>
-              <a:t> functions</a:t>
-            </a:r>
-            <a:endParaRPr lang="en-US" dirty="0"/>
-          </a:p>
-        </p:txBody>
-      </p:sp>
-    </p:spTree>
-    <p:extLst>
-      <p:ext uri="{BB962C8B-B14F-4D97-AF65-F5344CB8AC3E}">
-        <p14:creationId xmlns:p14="http://schemas.microsoft.com/office/powerpoint/2010/main" val="2362128199"/>
-      </p:ext>
-    </p:extLst>
-  </p:cSld>
-  <p:clrMapOvr>
-    <a:masterClrMapping/>
-  </p:clrMapOvr>
-  <p:timing>
-    <p:tnLst>
-      <p:par>
-        <p:cTn id="1" dur="indefinite" restart="never" nodeType="tmRoot"/>
-      </p:par>
-    </p:tnLst>
-  </p:timing>
-</p:sld>
-</file>
-
-<file path=ppt/slides/slide28.xml><?xml version="1.0" encoding="utf-8"?>
+<file path=ppt/slides/slide30.xml><?xml version="1.0" encoding="utf-8"?>
 <p:sld xmlns:a="http://schemas.openxmlformats.org/drawingml/2006/main" xmlns:r="http://schemas.openxmlformats.org/officeDocument/2006/relationships" xmlns:p="http://schemas.openxmlformats.org/presentationml/2006/main">
   <p:cSld>
     <p:spTree>
@@ -5990,7 +7646,7 @@
 </p:sld>
 </file>
 
-<file path=ppt/slides/slide3.xml><?xml version="1.0" encoding="utf-8"?>
+<file path=ppt/slides/slide4.xml><?xml version="1.0" encoding="utf-8"?>
 <p:sld xmlns:a="http://schemas.openxmlformats.org/drawingml/2006/main" xmlns:r="http://schemas.openxmlformats.org/officeDocument/2006/relationships" xmlns:p="http://schemas.openxmlformats.org/presentationml/2006/main">
   <p:cSld>
     <p:spTree>
@@ -6046,9 +7702,10 @@
           <a:lstStyle/>
           <a:p>
             <a:r>
-              <a:rPr lang="en-US" dirty="0"/>
-              <a:t>Fairly self-explanatory:</a:t>
-            </a:r>
+              <a:rPr lang="en-US" dirty="0" smtClean="0"/>
+              <a:t>Some fairly self-explanatory ones:</a:t>
+            </a:r>
+            <a:endParaRPr lang="en-US" dirty="0"/>
           </a:p>
           <a:p>
             <a:pPr lvl="1"/>
@@ -6219,6 +7876,23 @@
               </a:rPr>
               <a:t>pickle</a:t>
             </a:r>
+            <a:r>
+              <a:rPr lang="en-US" dirty="0" smtClean="0"/>
+              <a:t>,</a:t>
+            </a:r>
+            <a:r>
+              <a:rPr lang="en-US" dirty="0" smtClean="0">
+                <a:solidFill>
+                  <a:schemeClr val="tx2"/>
+                </a:solidFill>
+              </a:rPr>
+              <a:t> collections</a:t>
+            </a:r>
+            <a:endParaRPr lang="en-US" dirty="0" smtClean="0">
+              <a:solidFill>
+                <a:schemeClr val="tx2"/>
+              </a:solidFill>
+            </a:endParaRPr>
           </a:p>
           <a:p>
             <a:endParaRPr lang="en-US" dirty="0"/>
@@ -6428,7 +8102,7 @@
 </p:sld>
 </file>
 
-<file path=ppt/slides/slide4.xml><?xml version="1.0" encoding="utf-8"?>
+<file path=ppt/slides/slide5.xml><?xml version="1.0" encoding="utf-8"?>
 <p:sld xmlns:a="http://schemas.openxmlformats.org/drawingml/2006/main" xmlns:r="http://schemas.openxmlformats.org/officeDocument/2006/relationships" xmlns:p="http://schemas.openxmlformats.org/presentationml/2006/main">
   <p:cSld>
     <p:spTree>
@@ -6727,7 +8401,7 @@
 </p:sld>
 </file>
 
-<file path=ppt/slides/slide5.xml><?xml version="1.0" encoding="utf-8"?>
+<file path=ppt/slides/slide6.xml><?xml version="1.0" encoding="utf-8"?>
 <p:sld xmlns:a="http://schemas.openxmlformats.org/drawingml/2006/main" xmlns:r="http://schemas.openxmlformats.org/officeDocument/2006/relationships" xmlns:p="http://schemas.openxmlformats.org/presentationml/2006/main">
   <p:cSld>
     <p:spTree>
@@ -6871,7 +8545,7 @@
 </p:sld>
 </file>
 
-<file path=ppt/slides/slide6.xml><?xml version="1.0" encoding="utf-8"?>
+<file path=ppt/slides/slide7.xml><?xml version="1.0" encoding="utf-8"?>
 <p:sld xmlns:a="http://schemas.openxmlformats.org/drawingml/2006/main" xmlns:r="http://schemas.openxmlformats.org/officeDocument/2006/relationships" xmlns:p="http://schemas.openxmlformats.org/presentationml/2006/main">
   <p:cSld>
     <p:spTree>
@@ -6959,11 +8633,7 @@
           <a:p>
             <a:r>
               <a:rPr lang="en-US" dirty="0" smtClean="0"/>
-              <a:t>Notebook </a:t>
-            </a:r>
-            <a:r>
-              <a:rPr lang="en-US" dirty="0" smtClean="0"/>
-              <a:t>interface</a:t>
+              <a:t>Notebook interface</a:t>
             </a:r>
           </a:p>
           <a:p>
@@ -6995,7 +8665,7 @@
 </p:sld>
 </file>
 
-<file path=ppt/slides/slide7.xml><?xml version="1.0" encoding="utf-8"?>
+<file path=ppt/slides/slide8.xml><?xml version="1.0" encoding="utf-8"?>
 <p:sld xmlns:a="http://schemas.openxmlformats.org/drawingml/2006/main" xmlns:r="http://schemas.openxmlformats.org/officeDocument/2006/relationships" xmlns:p="http://schemas.openxmlformats.org/presentationml/2006/main">
   <p:cSld>
     <p:spTree>
@@ -7308,7 +8978,7 @@
 </p:sld>
 </file>
 
-<file path=ppt/slides/slide8.xml><?xml version="1.0" encoding="utf-8"?>
+<file path=ppt/slides/slide9.xml><?xml version="1.0" encoding="utf-8"?>
 <p:sld xmlns:a="http://schemas.openxmlformats.org/drawingml/2006/main" xmlns:r="http://schemas.openxmlformats.org/officeDocument/2006/relationships" xmlns:p="http://schemas.openxmlformats.org/presentationml/2006/main">
   <p:cSld>
     <p:spTree>
@@ -7503,329 +9173,6 @@
                                           <p:spTgt spid="3">
                                             <p:txEl>
                                               <p:pRg st="1" end="1"/>
-                                            </p:txEl>
-                                          </p:spTgt>
-                                        </p:tgtEl>
-                                        <p:attrNameLst>
-                                          <p:attrName>style.visibility</p:attrName>
-                                        </p:attrNameLst>
-                                      </p:cBhvr>
-                                      <p:to>
-                                        <p:strVal val="visible"/>
-                                      </p:to>
-                                    </p:set>
-                                  </p:childTnLst>
-                                </p:cTn>
-                              </p:par>
-                            </p:childTnLst>
-                          </p:cTn>
-                        </p:par>
-                      </p:childTnLst>
-                    </p:cTn>
-                  </p:par>
-                </p:childTnLst>
-              </p:cTn>
-              <p:prevCondLst>
-                <p:cond evt="onPrev" delay="0">
-                  <p:tgtEl>
-                    <p:sldTgt/>
-                  </p:tgtEl>
-                </p:cond>
-              </p:prevCondLst>
-              <p:nextCondLst>
-                <p:cond evt="onNext" delay="0">
-                  <p:tgtEl>
-                    <p:sldTgt/>
-                  </p:tgtEl>
-                </p:cond>
-              </p:nextCondLst>
-            </p:seq>
-          </p:childTnLst>
-        </p:cTn>
-      </p:par>
-    </p:tnLst>
-  </p:timing>
-</p:sld>
-</file>
-
-<file path=ppt/slides/slide9.xml><?xml version="1.0" encoding="utf-8"?>
-<p:sld xmlns:a="http://schemas.openxmlformats.org/drawingml/2006/main" xmlns:r="http://schemas.openxmlformats.org/officeDocument/2006/relationships" xmlns:p="http://schemas.openxmlformats.org/presentationml/2006/main">
-  <p:cSld>
-    <p:spTree>
-      <p:nvGrpSpPr>
-        <p:cNvPr id="1" name=""/>
-        <p:cNvGrpSpPr/>
-        <p:nvPr/>
-      </p:nvGrpSpPr>
-      <p:grpSpPr>
-        <a:xfrm>
-          <a:off x="0" y="0"/>
-          <a:ext cx="0" cy="0"/>
-          <a:chOff x="0" y="0"/>
-          <a:chExt cx="0" cy="0"/>
-        </a:xfrm>
-      </p:grpSpPr>
-      <p:sp>
-        <p:nvSpPr>
-          <p:cNvPr id="2" name="Title 1"/>
-          <p:cNvSpPr>
-            <a:spLocks noGrp="1"/>
-          </p:cNvSpPr>
-          <p:nvPr>
-            <p:ph type="title"/>
-          </p:nvPr>
-        </p:nvSpPr>
-        <p:spPr/>
-        <p:txBody>
-          <a:bodyPr/>
-          <a:lstStyle/>
-          <a:p>
-            <a:r>
-              <a:rPr lang="en-US" dirty="0" smtClean="0"/>
-              <a:t>Misc. </a:t>
-            </a:r>
-            <a:r>
-              <a:rPr lang="en-US" dirty="0" err="1" smtClean="0"/>
-              <a:t>Numpy</a:t>
-            </a:r>
-            <a:r>
-              <a:rPr lang="en-US" dirty="0" smtClean="0"/>
-              <a:t> tips</a:t>
-            </a:r>
-            <a:endParaRPr lang="en-US" dirty="0"/>
-          </a:p>
-        </p:txBody>
-      </p:sp>
-      <p:sp>
-        <p:nvSpPr>
-          <p:cNvPr id="3" name="Content Placeholder 2"/>
-          <p:cNvSpPr>
-            <a:spLocks noGrp="1"/>
-          </p:cNvSpPr>
-          <p:nvPr>
-            <p:ph idx="1"/>
-          </p:nvPr>
-        </p:nvSpPr>
-        <p:spPr/>
-        <p:txBody>
-          <a:bodyPr/>
-          <a:lstStyle/>
-          <a:p>
-            <a:r>
-              <a:rPr lang="en-US" dirty="0" err="1" smtClean="0">
-                <a:solidFill>
-                  <a:schemeClr val="tx2"/>
-                </a:solidFill>
-              </a:rPr>
-              <a:t>ndarray.shape</a:t>
-            </a:r>
-            <a:r>
-              <a:rPr lang="en-US" dirty="0"/>
-              <a:t> </a:t>
-            </a:r>
-            <a:r>
-              <a:rPr lang="en-US" dirty="0" smtClean="0"/>
-              <a:t>- one-stop shop for info on what an array looks like</a:t>
-            </a:r>
-          </a:p>
-          <a:p>
-            <a:r>
-              <a:rPr lang="en-US" dirty="0" smtClean="0"/>
-              <a:t>Arithmetic operations </a:t>
-            </a:r>
-            <a:r>
-              <a:rPr lang="en-US" u="sng" dirty="0" smtClean="0"/>
-              <a:t>default to elementwise</a:t>
-            </a:r>
-            <a:r>
-              <a:rPr lang="en-US" dirty="0" smtClean="0"/>
-              <a:t>.  I.e. </a:t>
-            </a:r>
-            <a:r>
-              <a:rPr lang="en-US" dirty="0" smtClean="0">
-                <a:solidFill>
-                  <a:schemeClr val="tx2"/>
-                </a:solidFill>
-              </a:rPr>
-              <a:t>A*B</a:t>
-            </a:r>
-            <a:r>
-              <a:rPr lang="en-US" dirty="0" smtClean="0"/>
-              <a:t> does not mean inner product!  Use </a:t>
-            </a:r>
-            <a:r>
-              <a:rPr lang="en-US" dirty="0" smtClean="0">
-                <a:solidFill>
-                  <a:schemeClr val="tx2"/>
-                </a:solidFill>
-              </a:rPr>
-              <a:t>numpy.dot()</a:t>
-            </a:r>
-            <a:r>
-              <a:rPr lang="en-US" dirty="0" smtClean="0"/>
-              <a:t> instead.</a:t>
-            </a:r>
-          </a:p>
-          <a:p>
-            <a:r>
-              <a:rPr lang="en-US" dirty="0" smtClean="0"/>
-              <a:t>Useful functions: </a:t>
-            </a:r>
-            <a:r>
-              <a:rPr lang="en-US" dirty="0" err="1" smtClean="0">
-                <a:solidFill>
-                  <a:schemeClr val="tx2"/>
-                </a:solidFill>
-              </a:rPr>
-              <a:t>arange</a:t>
-            </a:r>
-            <a:r>
-              <a:rPr lang="en-US" dirty="0" smtClean="0"/>
-              <a:t>, </a:t>
-            </a:r>
-            <a:r>
-              <a:rPr lang="en-US" dirty="0" err="1" smtClean="0">
-                <a:solidFill>
-                  <a:schemeClr val="tx2"/>
-                </a:solidFill>
-              </a:rPr>
-              <a:t>linspace</a:t>
-            </a:r>
-            <a:r>
-              <a:rPr lang="en-US" dirty="0" smtClean="0"/>
-              <a:t>, </a:t>
-            </a:r>
-            <a:r>
-              <a:rPr lang="en-US" dirty="0" smtClean="0">
-                <a:solidFill>
-                  <a:schemeClr val="tx2"/>
-                </a:solidFill>
-              </a:rPr>
-              <a:t>eye</a:t>
-            </a:r>
-            <a:r>
-              <a:rPr lang="en-US" dirty="0" smtClean="0"/>
-              <a:t>, </a:t>
-            </a:r>
-            <a:r>
-              <a:rPr lang="en-US" dirty="0" smtClean="0">
-                <a:solidFill>
-                  <a:schemeClr val="tx2"/>
-                </a:solidFill>
-              </a:rPr>
-              <a:t>ones</a:t>
-            </a:r>
-            <a:r>
-              <a:rPr lang="en-US" dirty="0" smtClean="0"/>
-              <a:t>, </a:t>
-            </a:r>
-            <a:r>
-              <a:rPr lang="en-US" dirty="0" smtClean="0">
-                <a:solidFill>
-                  <a:schemeClr val="tx2"/>
-                </a:solidFill>
-              </a:rPr>
-              <a:t>zeros</a:t>
-            </a:r>
-          </a:p>
-        </p:txBody>
-      </p:sp>
-    </p:spTree>
-    <p:extLst>
-      <p:ext uri="{BB962C8B-B14F-4D97-AF65-F5344CB8AC3E}">
-        <p14:creationId xmlns:p14="http://schemas.microsoft.com/office/powerpoint/2010/main" val="716624712"/>
-      </p:ext>
-    </p:extLst>
-  </p:cSld>
-  <p:clrMapOvr>
-    <a:masterClrMapping/>
-  </p:clrMapOvr>
-  <p:timing>
-    <p:tnLst>
-      <p:par>
-        <p:cTn id="1" dur="indefinite" restart="never" nodeType="tmRoot">
-          <p:childTnLst>
-            <p:seq concurrent="1" nextAc="seek">
-              <p:cTn id="2" dur="indefinite" nodeType="mainSeq">
-                <p:childTnLst>
-                  <p:par>
-                    <p:cTn id="3" fill="hold">
-                      <p:stCondLst>
-                        <p:cond delay="indefinite"/>
-                      </p:stCondLst>
-                      <p:childTnLst>
-                        <p:par>
-                          <p:cTn id="4" fill="hold">
-                            <p:stCondLst>
-                              <p:cond delay="0"/>
-                            </p:stCondLst>
-                            <p:childTnLst>
-                              <p:par>
-                                <p:cTn id="5" presetID="1" presetClass="entr" presetSubtype="0" fill="hold" nodeType="clickEffect">
-                                  <p:stCondLst>
-                                    <p:cond delay="0"/>
-                                  </p:stCondLst>
-                                  <p:childTnLst>
-                                    <p:set>
-                                      <p:cBhvr>
-                                        <p:cTn id="6" dur="1" fill="hold">
-                                          <p:stCondLst>
-                                            <p:cond delay="0"/>
-                                          </p:stCondLst>
-                                        </p:cTn>
-                                        <p:tgtEl>
-                                          <p:spTgt spid="3">
-                                            <p:txEl>
-                                              <p:pRg st="1" end="1"/>
-                                            </p:txEl>
-                                          </p:spTgt>
-                                        </p:tgtEl>
-                                        <p:attrNameLst>
-                                          <p:attrName>style.visibility</p:attrName>
-                                        </p:attrNameLst>
-                                      </p:cBhvr>
-                                      <p:to>
-                                        <p:strVal val="visible"/>
-                                      </p:to>
-                                    </p:set>
-                                  </p:childTnLst>
-                                </p:cTn>
-                              </p:par>
-                            </p:childTnLst>
-                          </p:cTn>
-                        </p:par>
-                      </p:childTnLst>
-                    </p:cTn>
-                  </p:par>
-                  <p:par>
-                    <p:cTn id="7" fill="hold">
-                      <p:stCondLst>
-                        <p:cond delay="indefinite"/>
-                      </p:stCondLst>
-                      <p:childTnLst>
-                        <p:par>
-                          <p:cTn id="8" fill="hold">
-                            <p:stCondLst>
-                              <p:cond delay="0"/>
-                            </p:stCondLst>
-                            <p:childTnLst>
-                              <p:par>
-                                <p:cTn id="9" presetID="1" presetClass="entr" presetSubtype="0" fill="hold" nodeType="clickEffect">
-                                  <p:stCondLst>
-                                    <p:cond delay="0"/>
-                                  </p:stCondLst>
-                                  <p:childTnLst>
-                                    <p:set>
-                                      <p:cBhvr>
-                                        <p:cTn id="10" dur="1" fill="hold">
-                                          <p:stCondLst>
-                                            <p:cond delay="0"/>
-                                          </p:stCondLst>
-                                        </p:cTn>
-                                        <p:tgtEl>
-                                          <p:spTgt spid="3">
-                                            <p:txEl>
-                                              <p:pRg st="2" end="2"/>
                                             </p:txEl>
                                           </p:spTgt>
                                         </p:tgtEl>

</xml_diff>

<commit_message>
More info on pandas, more memes
</commit_message>
<xml_diff>
--- a/2016/computing_workgroup/python_modules/python_scientific_modules.pptx
+++ b/2016/computing_workgroup/python_modules/python_scientific_modules.pptx
@@ -3582,8 +3582,19 @@
             </a:r>
             <a:r>
               <a:rPr lang="en-US" dirty="0" smtClean="0"/>
-              <a:t> etc.</a:t>
-            </a:r>
+              <a:t> etc</a:t>
+            </a:r>
+            <a:r>
+              <a:rPr lang="en-US" dirty="0" smtClean="0"/>
+              <a:t>.</a:t>
+            </a:r>
+          </a:p>
+          <a:p>
+            <a:r>
+              <a:rPr lang="en-US" dirty="0" smtClean="0"/>
+              <a:t>Saving/loading arrays to/from files</a:t>
+            </a:r>
+            <a:endParaRPr lang="en-US" dirty="0" smtClean="0"/>
           </a:p>
         </p:txBody>
       </p:sp>
@@ -5344,8 +5355,124 @@
           <a:p>
             <a:r>
               <a:rPr lang="en-US" dirty="0" smtClean="0"/>
-              <a:t>Like R, but in Python!</a:t>
-            </a:r>
+              <a:t>Like R, but in Python</a:t>
+            </a:r>
+            <a:r>
+              <a:rPr lang="en-US" dirty="0" smtClean="0"/>
+              <a:t>!</a:t>
+            </a:r>
+          </a:p>
+          <a:p>
+            <a:r>
+              <a:rPr lang="en-US" dirty="0" smtClean="0"/>
+              <a:t>10 minutes to pandas:</a:t>
+            </a:r>
+            <a:br>
+              <a:rPr lang="en-US" dirty="0" smtClean="0"/>
+            </a:br>
+            <a:r>
+              <a:rPr lang="en-US" dirty="0" smtClean="0">
+                <a:hlinkClick r:id="rId2"/>
+              </a:rPr>
+              <a:t>http</a:t>
+            </a:r>
+            <a:r>
+              <a:rPr lang="en-US" dirty="0">
+                <a:hlinkClick r:id="rId2"/>
+              </a:rPr>
+              <a:t>://</a:t>
+            </a:r>
+            <a:r>
+              <a:rPr lang="en-US" dirty="0" smtClean="0">
+                <a:hlinkClick r:id="rId2"/>
+              </a:rPr>
+              <a:t>pandas.pydata.org/pandas-docs/version/0.18.1/10min.html</a:t>
+            </a:r>
+            <a:r>
+              <a:rPr lang="en-US" dirty="0" smtClean="0"/>
+              <a:t> </a:t>
+            </a:r>
+            <a:endParaRPr lang="en-US" dirty="0" smtClean="0"/>
+          </a:p>
+        </p:txBody>
+      </p:sp>
+      <p:pic>
+        <p:nvPicPr>
+          <p:cNvPr id="2052" name="Picture 4" descr="http://67.media.tumblr.com/c04462965362847c6eff54db63735dde/tumblr_o2cfo4EaUv1u659tro1_500.jpg"/>
+          <p:cNvPicPr>
+            <a:picLocks noChangeAspect="1" noChangeArrowheads="1"/>
+          </p:cNvPicPr>
+          <p:nvPr/>
+        </p:nvPicPr>
+        <p:blipFill rotWithShape="1">
+          <a:blip r:embed="rId3">
+            <a:extLst>
+              <a:ext uri="{28A0092B-C50C-407E-A947-70E740481C1C}">
+                <a14:useLocalDpi xmlns:a14="http://schemas.microsoft.com/office/drawing/2010/main" val="0"/>
+              </a:ext>
+            </a:extLst>
+          </a:blip>
+          <a:srcRect l="17888" r="25045" b="6556"/>
+          <a:stretch/>
+        </p:blipFill>
+        <p:spPr bwMode="auto">
+          <a:xfrm>
+            <a:off x="7497598" y="0"/>
+            <a:ext cx="1646402" cy="1795463"/>
+          </a:xfrm>
+          <a:prstGeom prst="rect">
+            <a:avLst/>
+          </a:prstGeom>
+          <a:noFill/>
+          <a:extLst>
+            <a:ext uri="{909E8E84-426E-40DD-AFC4-6F175D3DCCD1}">
+              <a14:hiddenFill xmlns:a14="http://schemas.microsoft.com/office/drawing/2010/main">
+                <a:solidFill>
+                  <a:srgbClr val="FFFFFF"/>
+                </a:solidFill>
+              </a14:hiddenFill>
+            </a:ext>
+          </a:extLst>
+        </p:spPr>
+      </p:pic>
+      <p:sp>
+        <p:nvSpPr>
+          <p:cNvPr id="5" name="TextBox 4"/>
+          <p:cNvSpPr txBox="1"/>
+          <p:nvPr/>
+        </p:nvSpPr>
+        <p:spPr>
+          <a:xfrm>
+            <a:off x="1092202" y="149655"/>
+            <a:ext cx="914398" cy="307777"/>
+          </a:xfrm>
+          <a:prstGeom prst="rect">
+            <a:avLst/>
+          </a:prstGeom>
+          <a:solidFill>
+            <a:schemeClr val="accent2"/>
+          </a:solidFill>
+        </p:spPr>
+        <p:txBody>
+          <a:bodyPr wrap="square" rtlCol="0">
+            <a:noAutofit/>
+          </a:bodyPr>
+          <a:lstStyle/>
+          <a:p>
+            <a:pPr algn="ctr"/>
+            <a:r>
+              <a:rPr lang="en-US" sz="1400" dirty="0" smtClean="0">
+                <a:solidFill>
+                  <a:schemeClr val="bg1"/>
+                </a:solidFill>
+              </a:rPr>
+              <a:t>PANDAS</a:t>
+            </a:r>
+            <a:endParaRPr lang="en-US" sz="1400" dirty="0">
+              <a:solidFill>
+                <a:schemeClr val="bg1"/>
+              </a:solidFill>
+            </a:endParaRPr>
           </a:p>
         </p:txBody>
       </p:sp>

</xml_diff>

<commit_message>
Talk-ready version with references to notebooks in this repo
</commit_message>
<xml_diff>
--- a/2016/computing_workgroup/python_modules/python_scientific_modules.pptx
+++ b/2016/computing_workgroup/python_modules/python_scientific_modules.pptx
@@ -5,7 +5,7 @@
     <p:sldMasterId id="2147483648" r:id="rId1"/>
   </p:sldMasterIdLst>
   <p:notesMasterIdLst>
-    <p:notesMasterId r:id="rId32"/>
+    <p:notesMasterId r:id="rId28"/>
   </p:notesMasterIdLst>
   <p:sldIdLst>
     <p:sldId id="256" r:id="rId2"/>
@@ -32,12 +32,8 @@
     <p:sldId id="383" r:id="rId23"/>
     <p:sldId id="339" r:id="rId24"/>
     <p:sldId id="340" r:id="rId25"/>
-    <p:sldId id="365" r:id="rId26"/>
-    <p:sldId id="357" r:id="rId27"/>
-    <p:sldId id="362" r:id="rId28"/>
-    <p:sldId id="364" r:id="rId29"/>
-    <p:sldId id="356" r:id="rId30"/>
-    <p:sldId id="366" r:id="rId31"/>
+    <p:sldId id="384" r:id="rId26"/>
+    <p:sldId id="356" r:id="rId27"/>
   </p:sldIdLst>
   <p:sldSz cx="9144000" cy="6858000" type="screen4x3"/>
   <p:notesSz cx="6858000" cy="9144000"/>
@@ -237,7 +233,7 @@
           <a:p>
             <a:fld id="{6096A192-89F2-44C6-B07F-1B83CE44D511}" type="datetimeFigureOut">
               <a:rPr lang="en-US" smtClean="0"/>
-              <a:t>9/12/2016</a:t>
+              <a:t>9/13/2016</a:t>
             </a:fld>
             <a:endParaRPr lang="en-US"/>
           </a:p>
@@ -798,7 +794,7 @@
           <a:p>
             <a:fld id="{7181039F-CB0C-E14D-A7EF-3BACE2CEF4EA}" type="datetimeFigureOut">
               <a:rPr lang="en-US" smtClean="0"/>
-              <a:t>9/12/2016</a:t>
+              <a:t>9/13/2016</a:t>
             </a:fld>
             <a:endParaRPr lang="en-US"/>
           </a:p>
@@ -1058,7 +1054,7 @@
           <a:p>
             <a:fld id="{7181039F-CB0C-E14D-A7EF-3BACE2CEF4EA}" type="datetimeFigureOut">
               <a:rPr lang="en-US" smtClean="0"/>
-              <a:t>9/12/2016</a:t>
+              <a:t>9/13/2016</a:t>
             </a:fld>
             <a:endParaRPr lang="en-US"/>
           </a:p>
@@ -1323,7 +1319,7 @@
           <a:p>
             <a:fld id="{7181039F-CB0C-E14D-A7EF-3BACE2CEF4EA}" type="datetimeFigureOut">
               <a:rPr lang="en-US" smtClean="0"/>
-              <a:t>9/12/2016</a:t>
+              <a:t>9/13/2016</a:t>
             </a:fld>
             <a:endParaRPr lang="en-US"/>
           </a:p>
@@ -1486,7 +1482,7 @@
           <a:p>
             <a:fld id="{7181039F-CB0C-E14D-A7EF-3BACE2CEF4EA}" type="datetimeFigureOut">
               <a:rPr lang="en-US" smtClean="0"/>
-              <a:t>9/12/2016</a:t>
+              <a:t>9/13/2016</a:t>
             </a:fld>
             <a:endParaRPr lang="en-US"/>
           </a:p>
@@ -1763,7 +1759,7 @@
           <a:p>
             <a:fld id="{7181039F-CB0C-E14D-A7EF-3BACE2CEF4EA}" type="datetimeFigureOut">
               <a:rPr lang="en-US" smtClean="0"/>
-              <a:t>9/12/2016</a:t>
+              <a:t>9/13/2016</a:t>
             </a:fld>
             <a:endParaRPr lang="en-US"/>
           </a:p>
@@ -2022,7 +2018,7 @@
           <a:p>
             <a:fld id="{7181039F-CB0C-E14D-A7EF-3BACE2CEF4EA}" type="datetimeFigureOut">
               <a:rPr lang="en-US" smtClean="0"/>
-              <a:t>9/12/2016</a:t>
+              <a:t>9/13/2016</a:t>
             </a:fld>
             <a:endParaRPr lang="en-US"/>
           </a:p>
@@ -2235,7 +2231,7 @@
           <a:p>
             <a:fld id="{7181039F-CB0C-E14D-A7EF-3BACE2CEF4EA}" type="datetimeFigureOut">
               <a:rPr lang="en-US" smtClean="0"/>
-              <a:t>9/12/2016</a:t>
+              <a:t>9/13/2016</a:t>
             </a:fld>
             <a:endParaRPr lang="en-US"/>
           </a:p>
@@ -2949,7 +2945,7 @@
                 <a:latin typeface="Miriam" panose="020B0502050101010101" pitchFamily="34" charset="-79"/>
                 <a:cs typeface="Miriam" panose="020B0502050101010101" pitchFamily="34" charset="-79"/>
               </a:rPr>
-              <a:t>September 12, 2016</a:t>
+              <a:t>September 13, 2016</a:t>
             </a:fld>
             <a:endParaRPr lang="en-US" sz="1600" dirty="0" smtClean="0">
               <a:latin typeface="Miriam" panose="020B0502050101010101" pitchFamily="34" charset="-79"/>
@@ -3582,11 +3578,7 @@
             </a:r>
             <a:r>
               <a:rPr lang="en-US" dirty="0" smtClean="0"/>
-              <a:t> etc</a:t>
-            </a:r>
-            <a:r>
-              <a:rPr lang="en-US" dirty="0" smtClean="0"/>
-              <a:t>.</a:t>
+              <a:t> etc.</a:t>
             </a:r>
           </a:p>
           <a:p>
@@ -3594,7 +3586,6 @@
               <a:rPr lang="en-US" dirty="0" smtClean="0"/>
               <a:t>Saving/loading arrays to/from files</a:t>
             </a:r>
-            <a:endParaRPr lang="en-US" dirty="0" smtClean="0"/>
           </a:p>
         </p:txBody>
       </p:sp>
@@ -3996,7 +3987,11 @@
             </a:r>
             <a:r>
               <a:rPr lang="en-US" dirty="0" smtClean="0"/>
-              <a:t> is all about shuffling arrays…</a:t>
+              <a:t> is all about shuffling arrays</a:t>
+            </a:r>
+            <a:r>
+              <a:rPr lang="en-US" dirty="0" smtClean="0"/>
+              <a:t>…</a:t>
             </a:r>
           </a:p>
           <a:p>
@@ -4030,9 +4025,6 @@
               <a:rPr lang="en-US" dirty="0" smtClean="0"/>
               <a:t>.”</a:t>
             </a:r>
-          </a:p>
-          <a:p>
-            <a:endParaRPr lang="en-US" dirty="0" smtClean="0"/>
           </a:p>
         </p:txBody>
       </p:sp>
@@ -4049,7 +4041,79 @@
   <p:timing>
     <p:tnLst>
       <p:par>
-        <p:cTn id="1" dur="indefinite" restart="never" nodeType="tmRoot"/>
+        <p:cTn id="1" dur="indefinite" restart="never" nodeType="tmRoot">
+          <p:childTnLst>
+            <p:seq concurrent="1" nextAc="seek">
+              <p:cTn id="2" dur="indefinite" nodeType="mainSeq">
+                <p:childTnLst>
+                  <p:par>
+                    <p:cTn id="3" fill="hold">
+                      <p:stCondLst>
+                        <p:cond delay="indefinite"/>
+                      </p:stCondLst>
+                      <p:childTnLst>
+                        <p:par>
+                          <p:cTn id="4" fill="hold">
+                            <p:stCondLst>
+                              <p:cond delay="0"/>
+                            </p:stCondLst>
+                            <p:childTnLst>
+                              <p:par>
+                                <p:cTn id="5" presetID="1" presetClass="entr" presetSubtype="0" fill="hold" nodeType="clickEffect">
+                                  <p:stCondLst>
+                                    <p:cond delay="0"/>
+                                  </p:stCondLst>
+                                  <p:childTnLst>
+                                    <p:set>
+                                      <p:cBhvr>
+                                        <p:cTn id="6" dur="1" fill="hold">
+                                          <p:stCondLst>
+                                            <p:cond delay="0"/>
+                                          </p:stCondLst>
+                                        </p:cTn>
+                                        <p:tgtEl>
+                                          <p:spTgt spid="3">
+                                            <p:txEl>
+                                              <p:pRg st="2" end="2"/>
+                                            </p:txEl>
+                                          </p:spTgt>
+                                        </p:tgtEl>
+                                        <p:attrNameLst>
+                                          <p:attrName>style.visibility</p:attrName>
+                                        </p:attrNameLst>
+                                      </p:cBhvr>
+                                      <p:to>
+                                        <p:strVal val="visible"/>
+                                      </p:to>
+                                    </p:set>
+                                  </p:childTnLst>
+                                </p:cTn>
+                              </p:par>
+                            </p:childTnLst>
+                          </p:cTn>
+                        </p:par>
+                      </p:childTnLst>
+                    </p:cTn>
+                  </p:par>
+                </p:childTnLst>
+              </p:cTn>
+              <p:prevCondLst>
+                <p:cond evt="onPrev" delay="0">
+                  <p:tgtEl>
+                    <p:sldTgt/>
+                  </p:tgtEl>
+                </p:cond>
+              </p:prevCondLst>
+              <p:nextCondLst>
+                <p:cond evt="onNext" delay="0">
+                  <p:tgtEl>
+                    <p:sldTgt/>
+                  </p:tgtEl>
+                </p:cond>
+              </p:nextCondLst>
+            </p:seq>
+          </p:childTnLst>
+        </p:cTn>
       </p:par>
     </p:tnLst>
   </p:timing>
@@ -4621,25 +4685,55 @@
           <a:p>
             <a:r>
               <a:rPr lang="en-US" dirty="0" smtClean="0"/>
-              <a:t>Simple example of integration</a:t>
-            </a:r>
-          </a:p>
-          <a:p>
-            <a:r>
-              <a:rPr lang="en-US" dirty="0" smtClean="0"/>
-              <a:t>Brief discussion of options</a:t>
-            </a:r>
-          </a:p>
-          <a:p>
-            <a:r>
-              <a:rPr lang="en-US" dirty="0" smtClean="0"/>
-              <a:t>Special callout of </a:t>
-            </a:r>
-            <a:r>
-              <a:rPr lang="en-US" dirty="0" err="1" smtClean="0"/>
-              <a:t>odeint</a:t>
-            </a:r>
-            <a:endParaRPr lang="en-US" dirty="0" smtClean="0"/>
+              <a:t>The </a:t>
+            </a:r>
+            <a:r>
+              <a:rPr lang="en-US" dirty="0" smtClean="0">
+                <a:solidFill>
+                  <a:schemeClr val="tx2"/>
+                </a:solidFill>
+              </a:rPr>
+              <a:t>integrate</a:t>
+            </a:r>
+            <a:r>
+              <a:rPr lang="en-US" dirty="0" smtClean="0"/>
+              <a:t> package has useful tools for simple numerical integration</a:t>
+            </a:r>
+          </a:p>
+          <a:p>
+            <a:r>
+              <a:rPr lang="en-US" dirty="0" smtClean="0"/>
+              <a:t>See </a:t>
+            </a:r>
+            <a:r>
+              <a:rPr lang="en-US" dirty="0" err="1" smtClean="0">
+                <a:solidFill>
+                  <a:schemeClr val="tx2"/>
+                </a:solidFill>
+              </a:rPr>
+              <a:t>scipy</a:t>
+            </a:r>
+            <a:r>
+              <a:rPr lang="en-US" dirty="0" smtClean="0">
+                <a:solidFill>
+                  <a:schemeClr val="tx2"/>
+                </a:solidFill>
+              </a:rPr>
+              <a:t>/</a:t>
+            </a:r>
+            <a:r>
+              <a:rPr lang="en-US" dirty="0" err="1" smtClean="0">
+                <a:solidFill>
+                  <a:schemeClr val="tx2"/>
+                </a:solidFill>
+              </a:rPr>
+              <a:t>numerical_integration.ipynb</a:t>
+            </a:r>
+            <a:endParaRPr lang="en-US" dirty="0" smtClean="0">
+              <a:solidFill>
+                <a:schemeClr val="tx2"/>
+              </a:solidFill>
+            </a:endParaRPr>
           </a:p>
         </p:txBody>
       </p:sp>
@@ -4738,21 +4832,38 @@
               <a:rPr lang="en-US" dirty="0"/>
             </a:br>
             <a:r>
-              <a:rPr lang="en-US" sz="1800" dirty="0">
-                <a:hlinkClick r:id="rId2"/>
+              <a:rPr lang="en-US" dirty="0" smtClean="0"/>
+              <a:t>see </a:t>
+            </a:r>
+            <a:r>
+              <a:rPr lang="en-US" dirty="0" err="1" smtClean="0">
+                <a:solidFill>
+                  <a:schemeClr val="tx2"/>
+                </a:solidFill>
               </a:rPr>
-              <a:t>http://</a:t>
-            </a:r>
-            <a:r>
-              <a:rPr lang="en-US" sz="1800" dirty="0" smtClean="0">
-                <a:hlinkClick r:id="rId2"/>
+              <a:t>scipy</a:t>
+            </a:r>
+            <a:r>
+              <a:rPr lang="en-US" dirty="0" smtClean="0">
+                <a:solidFill>
+                  <a:schemeClr val="tx2"/>
+                </a:solidFill>
               </a:rPr>
-              <a:t>scipy-cookbook.readthedocs.io/items/FittingData.html</a:t>
-            </a:r>
-            <a:r>
-              <a:rPr lang="en-US" sz="1800" dirty="0" smtClean="0"/>
-              <a:t> </a:t>
-            </a:r>
+              <a:t>/</a:t>
+            </a:r>
+            <a:r>
+              <a:rPr lang="en-US" dirty="0" err="1" smtClean="0">
+                <a:solidFill>
+                  <a:schemeClr val="tx2"/>
+                </a:solidFill>
+              </a:rPr>
+              <a:t>fitting_data.ipynb</a:t>
+            </a:r>
+            <a:endParaRPr lang="en-US" dirty="0" smtClean="0">
+              <a:solidFill>
+                <a:schemeClr val="tx2"/>
+              </a:solidFill>
+            </a:endParaRPr>
           </a:p>
           <a:p>
             <a:r>
@@ -4778,8 +4889,13 @@
           <a:p>
             <a:r>
               <a:rPr lang="en-US" dirty="0" smtClean="0"/>
-              <a:t>Non-linear solvers callout</a:t>
-            </a:r>
+              <a:t>Non-linear </a:t>
+            </a:r>
+            <a:r>
+              <a:rPr lang="en-US" dirty="0" smtClean="0"/>
+              <a:t>solvers</a:t>
+            </a:r>
+            <a:endParaRPr lang="en-US" dirty="0" smtClean="0"/>
           </a:p>
         </p:txBody>
       </p:sp>
@@ -4874,13 +4990,50 @@
           <a:p>
             <a:r>
               <a:rPr lang="en-US" dirty="0" smtClean="0"/>
-              <a:t>Low/high/bandpass filter example (see cookbook)</a:t>
-            </a:r>
-          </a:p>
-          <a:p>
-            <a:r>
-              <a:rPr lang="en-US" dirty="0" smtClean="0"/>
-              <a:t>Also of interest is </a:t>
+              <a:t>Low/high/bandpass </a:t>
+            </a:r>
+            <a:r>
+              <a:rPr lang="en-US" dirty="0" smtClean="0"/>
+              <a:t>filters, see </a:t>
+            </a:r>
+            <a:r>
+              <a:rPr lang="en-US" dirty="0" err="1" smtClean="0">
+                <a:solidFill>
+                  <a:schemeClr val="tx2"/>
+                </a:solidFill>
+              </a:rPr>
+              <a:t>scipy</a:t>
+            </a:r>
+            <a:r>
+              <a:rPr lang="en-US" dirty="0" smtClean="0">
+                <a:solidFill>
+                  <a:schemeClr val="tx2"/>
+                </a:solidFill>
+              </a:rPr>
+              <a:t>/</a:t>
+            </a:r>
+            <a:r>
+              <a:rPr lang="en-US" dirty="0" err="1" smtClean="0">
+                <a:solidFill>
+                  <a:schemeClr val="tx2"/>
+                </a:solidFill>
+              </a:rPr>
+              <a:t>FIR_filter.ipynb</a:t>
+            </a:r>
+            <a:endParaRPr lang="en-US" dirty="0" smtClean="0">
+              <a:solidFill>
+                <a:schemeClr val="tx2"/>
+              </a:solidFill>
+            </a:endParaRPr>
+          </a:p>
+          <a:p>
+            <a:r>
+              <a:rPr lang="en-US" dirty="0" smtClean="0"/>
+              <a:t>Also </a:t>
+            </a:r>
+            <a:r>
+              <a:rPr lang="en-US" dirty="0" smtClean="0"/>
+              <a:t>of interest is </a:t>
             </a:r>
             <a:r>
               <a:rPr lang="en-US" dirty="0" err="1" smtClean="0">
@@ -4892,13 +5045,36 @@
             </a:r>
             <a:r>
               <a:rPr lang="en-US" dirty="0" smtClean="0"/>
-              <a:t>, which has FFT / DCT / DST transform implementations.</a:t>
-            </a:r>
-            <a:endParaRPr lang="en-US" dirty="0" smtClean="0">
-              <a:solidFill>
-                <a:schemeClr val="tx2"/>
-              </a:solidFill>
-            </a:endParaRPr>
+              <a:t>, which has </a:t>
+            </a:r>
+            <a:r>
+              <a:rPr lang="en-US" dirty="0" smtClean="0"/>
+              <a:t>(</a:t>
+            </a:r>
+            <a:r>
+              <a:rPr lang="en-US" dirty="0" smtClean="0">
+                <a:solidFill>
+                  <a:schemeClr val="accent2"/>
+                </a:solidFill>
+              </a:rPr>
+              <a:t>potentially slow!</a:t>
+            </a:r>
+            <a:r>
+              <a:rPr lang="en-US" dirty="0" smtClean="0"/>
+              <a:t>) </a:t>
+            </a:r>
+            <a:r>
+              <a:rPr lang="en-US" dirty="0" smtClean="0"/>
+              <a:t>FFT </a:t>
+            </a:r>
+            <a:r>
+              <a:rPr lang="en-US" dirty="0" smtClean="0"/>
+              <a:t>/ DCT / DST transform implementations</a:t>
+            </a:r>
+            <a:r>
+              <a:rPr lang="en-US" dirty="0" smtClean="0"/>
+              <a:t>.</a:t>
+            </a:r>
           </a:p>
         </p:txBody>
       </p:sp>
@@ -5344,7 +5520,9 @@
         </p:nvSpPr>
         <p:spPr/>
         <p:txBody>
-          <a:bodyPr/>
+          <a:bodyPr>
+            <a:normAutofit/>
+          </a:bodyPr>
           <a:lstStyle/>
           <a:p>
             <a:r>
@@ -5355,17 +5533,60 @@
           <a:p>
             <a:r>
               <a:rPr lang="en-US" dirty="0" smtClean="0"/>
-              <a:t>Like R, but in Python</a:t>
-            </a:r>
-            <a:r>
-              <a:rPr lang="en-US" dirty="0" smtClean="0"/>
-              <a:t>!</a:t>
-            </a:r>
-          </a:p>
-          <a:p>
-            <a:r>
-              <a:rPr lang="en-US" dirty="0" smtClean="0"/>
-              <a:t>10 minutes to pandas:</a:t>
+              <a:t>Like R, but in Python!</a:t>
+            </a:r>
+          </a:p>
+          <a:p>
+            <a:r>
+              <a:rPr lang="en-US" dirty="0"/>
+              <a:t>T</a:t>
+            </a:r>
+            <a:r>
+              <a:rPr lang="en-US" dirty="0" smtClean="0"/>
+              <a:t>utorial given at </a:t>
+            </a:r>
+            <a:r>
+              <a:rPr lang="en-US" dirty="0" err="1"/>
+              <a:t>SciPy</a:t>
+            </a:r>
+            <a:r>
+              <a:rPr lang="en-US" dirty="0"/>
+              <a:t> 2015, see </a:t>
+            </a:r>
+            <a:r>
+              <a:rPr lang="en-US" dirty="0">
+                <a:solidFill>
+                  <a:schemeClr val="tx2"/>
+                </a:solidFill>
+              </a:rPr>
+              <a:t>pandas/*.</a:t>
+            </a:r>
+            <a:r>
+              <a:rPr lang="en-US" dirty="0" err="1" smtClean="0">
+                <a:solidFill>
+                  <a:schemeClr val="tx2"/>
+                </a:solidFill>
+              </a:rPr>
+              <a:t>ipynb</a:t>
+            </a:r>
+            <a:endParaRPr lang="en-US" dirty="0" smtClean="0"/>
+          </a:p>
+          <a:p>
+            <a:r>
+              <a:rPr lang="en-US" dirty="0" smtClean="0"/>
+              <a:t>10 </a:t>
+            </a:r>
+            <a:r>
+              <a:rPr lang="en-US" dirty="0" smtClean="0"/>
+              <a:t>minutes to pandas</a:t>
+            </a:r>
+            <a:r>
+              <a:rPr lang="en-US" dirty="0" smtClean="0"/>
+              <a:t>:</a:t>
+            </a:r>
+            <a:r>
+              <a:rPr lang="en-US" dirty="0" smtClean="0"/>
+              <a:t/>
             </a:r>
             <a:br>
               <a:rPr lang="en-US" dirty="0" smtClean="0"/>
@@ -5489,7 +5710,177 @@
   <p:timing>
     <p:tnLst>
       <p:par>
-        <p:cTn id="1" dur="indefinite" restart="never" nodeType="tmRoot"/>
+        <p:cTn id="1" dur="indefinite" restart="never" nodeType="tmRoot">
+          <p:childTnLst>
+            <p:seq concurrent="1" nextAc="seek">
+              <p:cTn id="2" dur="indefinite" nodeType="mainSeq">
+                <p:childTnLst>
+                  <p:par>
+                    <p:cTn id="3" fill="hold">
+                      <p:stCondLst>
+                        <p:cond delay="indefinite"/>
+                      </p:stCondLst>
+                      <p:childTnLst>
+                        <p:par>
+                          <p:cTn id="4" fill="hold">
+                            <p:stCondLst>
+                              <p:cond delay="0"/>
+                            </p:stCondLst>
+                            <p:childTnLst>
+                              <p:par>
+                                <p:cTn id="5" presetID="1" presetClass="entr" presetSubtype="0" fill="hold" nodeType="clickEffect">
+                                  <p:stCondLst>
+                                    <p:cond delay="0"/>
+                                  </p:stCondLst>
+                                  <p:childTnLst>
+                                    <p:set>
+                                      <p:cBhvr>
+                                        <p:cTn id="6" dur="1" fill="hold">
+                                          <p:stCondLst>
+                                            <p:cond delay="0"/>
+                                          </p:stCondLst>
+                                        </p:cTn>
+                                        <p:tgtEl>
+                                          <p:spTgt spid="3">
+                                            <p:txEl>
+                                              <p:pRg st="1" end="1"/>
+                                            </p:txEl>
+                                          </p:spTgt>
+                                        </p:tgtEl>
+                                        <p:attrNameLst>
+                                          <p:attrName>style.visibility</p:attrName>
+                                        </p:attrNameLst>
+                                      </p:cBhvr>
+                                      <p:to>
+                                        <p:strVal val="visible"/>
+                                      </p:to>
+                                    </p:set>
+                                  </p:childTnLst>
+                                </p:cTn>
+                              </p:par>
+                            </p:childTnLst>
+                          </p:cTn>
+                        </p:par>
+                      </p:childTnLst>
+                    </p:cTn>
+                  </p:par>
+                  <p:par>
+                    <p:cTn id="7" fill="hold">
+                      <p:stCondLst>
+                        <p:cond delay="indefinite"/>
+                      </p:stCondLst>
+                      <p:childTnLst>
+                        <p:par>
+                          <p:cTn id="8" fill="hold">
+                            <p:stCondLst>
+                              <p:cond delay="0"/>
+                            </p:stCondLst>
+                            <p:childTnLst>
+                              <p:par>
+                                <p:cTn id="9" presetID="1" presetClass="entr" presetSubtype="0" fill="hold" nodeType="clickEffect">
+                                  <p:stCondLst>
+                                    <p:cond delay="0"/>
+                                  </p:stCondLst>
+                                  <p:childTnLst>
+                                    <p:set>
+                                      <p:cBhvr>
+                                        <p:cTn id="10" dur="1" fill="hold">
+                                          <p:stCondLst>
+                                            <p:cond delay="0"/>
+                                          </p:stCondLst>
+                                        </p:cTn>
+                                        <p:tgtEl>
+                                          <p:spTgt spid="3">
+                                            <p:txEl>
+                                              <p:pRg st="2" end="2"/>
+                                            </p:txEl>
+                                          </p:spTgt>
+                                        </p:tgtEl>
+                                        <p:attrNameLst>
+                                          <p:attrName>style.visibility</p:attrName>
+                                        </p:attrNameLst>
+                                      </p:cBhvr>
+                                      <p:to>
+                                        <p:strVal val="visible"/>
+                                      </p:to>
+                                    </p:set>
+                                  </p:childTnLst>
+                                </p:cTn>
+                              </p:par>
+                            </p:childTnLst>
+                          </p:cTn>
+                        </p:par>
+                      </p:childTnLst>
+                    </p:cTn>
+                  </p:par>
+                  <p:par>
+                    <p:cTn id="11" fill="hold">
+                      <p:stCondLst>
+                        <p:cond delay="indefinite"/>
+                      </p:stCondLst>
+                      <p:childTnLst>
+                        <p:par>
+                          <p:cTn id="12" fill="hold">
+                            <p:stCondLst>
+                              <p:cond delay="0"/>
+                            </p:stCondLst>
+                            <p:childTnLst>
+                              <p:par>
+                                <p:cTn id="13" presetID="1" presetClass="entr" presetSubtype="0" fill="hold" nodeType="clickEffect">
+                                  <p:stCondLst>
+                                    <p:cond delay="0"/>
+                                  </p:stCondLst>
+                                  <p:childTnLst>
+                                    <p:set>
+                                      <p:cBhvr>
+                                        <p:cTn id="14" dur="1" fill="hold">
+                                          <p:stCondLst>
+                                            <p:cond delay="0"/>
+                                          </p:stCondLst>
+                                        </p:cTn>
+                                        <p:tgtEl>
+                                          <p:spTgt spid="3">
+                                            <p:txEl>
+                                              <p:pRg st="3" end="3"/>
+                                            </p:txEl>
+                                          </p:spTgt>
+                                        </p:tgtEl>
+                                        <p:attrNameLst>
+                                          <p:attrName>style.visibility</p:attrName>
+                                        </p:attrNameLst>
+                                      </p:cBhvr>
+                                      <p:to>
+                                        <p:strVal val="visible"/>
+                                      </p:to>
+                                    </p:set>
+                                  </p:childTnLst>
+                                </p:cTn>
+                              </p:par>
+                            </p:childTnLst>
+                          </p:cTn>
+                        </p:par>
+                      </p:childTnLst>
+                    </p:cTn>
+                  </p:par>
+                </p:childTnLst>
+              </p:cTn>
+              <p:prevCondLst>
+                <p:cond evt="onPrev" delay="0">
+                  <p:tgtEl>
+                    <p:sldTgt/>
+                  </p:tgtEl>
+                </p:cond>
+              </p:prevCondLst>
+              <p:nextCondLst>
+                <p:cond evt="onNext" delay="0">
+                  <p:tgtEl>
+                    <p:sldTgt/>
+                  </p:tgtEl>
+                </p:cond>
+              </p:nextCondLst>
+            </p:seq>
+          </p:childTnLst>
+        </p:cTn>
       </p:par>
     </p:tnLst>
   </p:timing>
@@ -6234,7 +6625,6 @@
               <a:rPr lang="en-US" dirty="0" smtClean="0"/>
               <a:t>…</a:t>
             </a:r>
-            <a:endParaRPr lang="en-US" dirty="0" smtClean="0"/>
           </a:p>
         </p:txBody>
       </p:sp>
@@ -6925,7 +7315,7 @@
           <a:p>
             <a:r>
               <a:rPr lang="en-US" dirty="0" smtClean="0"/>
-              <a:t>h5py</a:t>
+              <a:t>Stuff I haven’t gotten to…</a:t>
             </a:r>
             <a:endParaRPr lang="en-US" dirty="0"/>
           </a:p>
@@ -6946,14 +7336,85 @@
           <a:bodyPr/>
           <a:lstStyle/>
           <a:p>
-            <a:endParaRPr lang="en-US"/>
+            <a:r>
+              <a:rPr lang="en-US" dirty="0" smtClean="0"/>
+              <a:t>h5py</a:t>
+            </a:r>
+          </a:p>
+          <a:p>
+            <a:r>
+              <a:rPr lang="en-US" dirty="0" err="1" smtClean="0"/>
+              <a:t>SymPy</a:t>
+            </a:r>
+            <a:r>
+              <a:rPr lang="en-US" dirty="0"/>
+              <a:t> </a:t>
+            </a:r>
+            <a:r>
+              <a:rPr lang="en-US" dirty="0" smtClean="0"/>
+              <a:t>/ Sage</a:t>
+            </a:r>
+          </a:p>
+          <a:p>
+            <a:r>
+              <a:rPr lang="en-US" dirty="0" smtClean="0"/>
+              <a:t>Nose</a:t>
+            </a:r>
+          </a:p>
+          <a:p>
+            <a:r>
+              <a:rPr lang="en-US" dirty="0" smtClean="0"/>
+              <a:t>Profiling with </a:t>
+            </a:r>
+            <a:r>
+              <a:rPr lang="en-US" dirty="0" err="1" smtClean="0"/>
+              <a:t>cProfile</a:t>
+            </a:r>
+            <a:r>
+              <a:rPr lang="en-US" dirty="0" smtClean="0"/>
+              <a:t> etc.</a:t>
+            </a:r>
+          </a:p>
+          <a:p>
+            <a:r>
+              <a:rPr lang="en-US" dirty="0" err="1" smtClean="0"/>
+              <a:t>Numba</a:t>
+            </a:r>
+            <a:r>
+              <a:rPr lang="en-US" dirty="0" smtClean="0"/>
+              <a:t>, </a:t>
+            </a:r>
+            <a:r>
+              <a:rPr lang="en-US" dirty="0" err="1" smtClean="0"/>
+              <a:t>Cython</a:t>
+            </a:r>
+            <a:r>
+              <a:rPr lang="en-US" dirty="0" smtClean="0"/>
+              <a:t>, writing ‘traditional’ languages using </a:t>
+            </a:r>
+            <a:r>
+              <a:rPr lang="en-US" dirty="0" err="1" smtClean="0"/>
+              <a:t>numpy</a:t>
+            </a:r>
+            <a:r>
+              <a:rPr lang="en-US" dirty="0" smtClean="0"/>
+              <a:t>/</a:t>
+            </a:r>
+            <a:r>
+              <a:rPr lang="en-US" dirty="0" err="1" smtClean="0"/>
+              <a:t>scipy</a:t>
+            </a:r>
+            <a:endParaRPr lang="en-US" dirty="0" smtClean="0"/>
+          </a:p>
+          <a:p>
+            <a:endParaRPr lang="en-US" dirty="0"/>
           </a:p>
         </p:txBody>
       </p:sp>
     </p:spTree>
     <p:extLst>
       <p:ext uri="{BB962C8B-B14F-4D97-AF65-F5344CB8AC3E}">
-        <p14:creationId xmlns:p14="http://schemas.microsoft.com/office/powerpoint/2010/main" val="2078919648"/>
+        <p14:creationId xmlns:p14="http://schemas.microsoft.com/office/powerpoint/2010/main" val="2711068173"/>
       </p:ext>
     </p:extLst>
   </p:cSld>
@@ -6971,290 +7432,6 @@
 </file>
 
 <file path=ppt/slides/slide26.xml><?xml version="1.0" encoding="utf-8"?>
-<p:sld xmlns:a="http://schemas.openxmlformats.org/drawingml/2006/main" xmlns:r="http://schemas.openxmlformats.org/officeDocument/2006/relationships" xmlns:p="http://schemas.openxmlformats.org/presentationml/2006/main">
-  <p:cSld>
-    <p:spTree>
-      <p:nvGrpSpPr>
-        <p:cNvPr id="1" name=""/>
-        <p:cNvGrpSpPr/>
-        <p:nvPr/>
-      </p:nvGrpSpPr>
-      <p:grpSpPr>
-        <a:xfrm>
-          <a:off x="0" y="0"/>
-          <a:ext cx="0" cy="0"/>
-          <a:chOff x="0" y="0"/>
-          <a:chExt cx="0" cy="0"/>
-        </a:xfrm>
-      </p:grpSpPr>
-      <p:sp>
-        <p:nvSpPr>
-          <p:cNvPr id="2" name="Title 1"/>
-          <p:cNvSpPr>
-            <a:spLocks noGrp="1"/>
-          </p:cNvSpPr>
-          <p:nvPr>
-            <p:ph type="title"/>
-          </p:nvPr>
-        </p:nvSpPr>
-        <p:spPr/>
-        <p:txBody>
-          <a:bodyPr/>
-          <a:lstStyle/>
-          <a:p>
-            <a:r>
-              <a:rPr lang="en-US" dirty="0" smtClean="0"/>
-              <a:t>Symbolic libraries: </a:t>
-            </a:r>
-            <a:r>
-              <a:rPr lang="en-US" dirty="0" err="1" smtClean="0"/>
-              <a:t>SymPy</a:t>
-            </a:r>
-            <a:r>
-              <a:rPr lang="en-US" dirty="0" smtClean="0"/>
-              <a:t> / Sage</a:t>
-            </a:r>
-            <a:endParaRPr lang="en-US" dirty="0"/>
-          </a:p>
-        </p:txBody>
-      </p:sp>
-      <p:sp>
-        <p:nvSpPr>
-          <p:cNvPr id="3" name="Content Placeholder 2"/>
-          <p:cNvSpPr>
-            <a:spLocks noGrp="1"/>
-          </p:cNvSpPr>
-          <p:nvPr>
-            <p:ph idx="1"/>
-          </p:nvPr>
-        </p:nvSpPr>
-        <p:spPr/>
-        <p:txBody>
-          <a:bodyPr/>
-          <a:lstStyle/>
-          <a:p>
-            <a:endParaRPr lang="en-US"/>
-          </a:p>
-        </p:txBody>
-      </p:sp>
-    </p:spTree>
-    <p:extLst>
-      <p:ext uri="{BB962C8B-B14F-4D97-AF65-F5344CB8AC3E}">
-        <p14:creationId xmlns:p14="http://schemas.microsoft.com/office/powerpoint/2010/main" val="3261099077"/>
-      </p:ext>
-    </p:extLst>
-  </p:cSld>
-  <p:clrMapOvr>
-    <a:masterClrMapping/>
-  </p:clrMapOvr>
-  <p:timing>
-    <p:tnLst>
-      <p:par>
-        <p:cTn id="1" dur="indefinite" restart="never" nodeType="tmRoot"/>
-      </p:par>
-    </p:tnLst>
-  </p:timing>
-</p:sld>
-</file>
-
-<file path=ppt/slides/slide27.xml><?xml version="1.0" encoding="utf-8"?>
-<p:sld xmlns:a="http://schemas.openxmlformats.org/drawingml/2006/main" xmlns:r="http://schemas.openxmlformats.org/officeDocument/2006/relationships" xmlns:p="http://schemas.openxmlformats.org/presentationml/2006/main">
-  <p:cSld>
-    <p:spTree>
-      <p:nvGrpSpPr>
-        <p:cNvPr id="1" name=""/>
-        <p:cNvGrpSpPr/>
-        <p:nvPr/>
-      </p:nvGrpSpPr>
-      <p:grpSpPr>
-        <a:xfrm>
-          <a:off x="0" y="0"/>
-          <a:ext cx="0" cy="0"/>
-          <a:chOff x="0" y="0"/>
-          <a:chExt cx="0" cy="0"/>
-        </a:xfrm>
-      </p:grpSpPr>
-      <p:sp>
-        <p:nvSpPr>
-          <p:cNvPr id="2" name="Title 1"/>
-          <p:cNvSpPr>
-            <a:spLocks noGrp="1"/>
-          </p:cNvSpPr>
-          <p:nvPr>
-            <p:ph type="title"/>
-          </p:nvPr>
-        </p:nvSpPr>
-        <p:spPr/>
-        <p:txBody>
-          <a:bodyPr/>
-          <a:lstStyle/>
-          <a:p>
-            <a:r>
-              <a:rPr lang="en-US" dirty="0"/>
-              <a:t>N</a:t>
-            </a:r>
-            <a:r>
-              <a:rPr lang="en-US" dirty="0" smtClean="0"/>
-              <a:t>ose</a:t>
-            </a:r>
-            <a:endParaRPr lang="en-US" dirty="0"/>
-          </a:p>
-        </p:txBody>
-      </p:sp>
-      <p:sp>
-        <p:nvSpPr>
-          <p:cNvPr id="3" name="Content Placeholder 2"/>
-          <p:cNvSpPr>
-            <a:spLocks noGrp="1"/>
-          </p:cNvSpPr>
-          <p:nvPr>
-            <p:ph idx="1"/>
-          </p:nvPr>
-        </p:nvSpPr>
-        <p:spPr/>
-        <p:txBody>
-          <a:bodyPr/>
-          <a:lstStyle/>
-          <a:p>
-            <a:endParaRPr lang="en-US"/>
-          </a:p>
-        </p:txBody>
-      </p:sp>
-    </p:spTree>
-    <p:extLst>
-      <p:ext uri="{BB962C8B-B14F-4D97-AF65-F5344CB8AC3E}">
-        <p14:creationId xmlns:p14="http://schemas.microsoft.com/office/powerpoint/2010/main" val="3993609276"/>
-      </p:ext>
-    </p:extLst>
-  </p:cSld>
-  <p:clrMapOvr>
-    <a:masterClrMapping/>
-  </p:clrMapOvr>
-  <p:timing>
-    <p:tnLst>
-      <p:par>
-        <p:cTn id="1" dur="indefinite" restart="never" nodeType="tmRoot"/>
-      </p:par>
-    </p:tnLst>
-  </p:timing>
-</p:sld>
-</file>
-
-<file path=ppt/slides/slide28.xml><?xml version="1.0" encoding="utf-8"?>
-<p:sld xmlns:a="http://schemas.openxmlformats.org/drawingml/2006/main" xmlns:r="http://schemas.openxmlformats.org/officeDocument/2006/relationships" xmlns:p="http://schemas.openxmlformats.org/presentationml/2006/main">
-  <p:cSld>
-    <p:spTree>
-      <p:nvGrpSpPr>
-        <p:cNvPr id="1" name=""/>
-        <p:cNvGrpSpPr/>
-        <p:nvPr/>
-      </p:nvGrpSpPr>
-      <p:grpSpPr>
-        <a:xfrm>
-          <a:off x="0" y="0"/>
-          <a:ext cx="0" cy="0"/>
-          <a:chOff x="0" y="0"/>
-          <a:chExt cx="0" cy="0"/>
-        </a:xfrm>
-      </p:grpSpPr>
-      <p:sp>
-        <p:nvSpPr>
-          <p:cNvPr id="2" name="Title 1"/>
-          <p:cNvSpPr>
-            <a:spLocks noGrp="1"/>
-          </p:cNvSpPr>
-          <p:nvPr>
-            <p:ph type="title"/>
-          </p:nvPr>
-        </p:nvSpPr>
-        <p:spPr/>
-        <p:txBody>
-          <a:bodyPr/>
-          <a:lstStyle/>
-          <a:p>
-            <a:r>
-              <a:rPr lang="en-US" dirty="0" smtClean="0"/>
-              <a:t>Profiling (</a:t>
-            </a:r>
-            <a:r>
-              <a:rPr lang="en-US" dirty="0" err="1" smtClean="0"/>
-              <a:t>cProfile</a:t>
-            </a:r>
-            <a:r>
-              <a:rPr lang="en-US" dirty="0" smtClean="0"/>
-              <a:t> + ???)</a:t>
-            </a:r>
-            <a:endParaRPr lang="en-US" dirty="0"/>
-          </a:p>
-        </p:txBody>
-      </p:sp>
-      <p:sp>
-        <p:nvSpPr>
-          <p:cNvPr id="3" name="Content Placeholder 2"/>
-          <p:cNvSpPr>
-            <a:spLocks noGrp="1"/>
-          </p:cNvSpPr>
-          <p:nvPr>
-            <p:ph idx="1"/>
-          </p:nvPr>
-        </p:nvSpPr>
-        <p:spPr/>
-        <p:txBody>
-          <a:bodyPr/>
-          <a:lstStyle/>
-          <a:p>
-            <a:r>
-              <a:rPr lang="en-US" dirty="0" smtClean="0"/>
-              <a:t>If code is slow, the first step to going faster is knowing </a:t>
-            </a:r>
-            <a:r>
-              <a:rPr lang="en-US" u="sng" dirty="0" smtClean="0"/>
-              <a:t>where</a:t>
-            </a:r>
-            <a:r>
-              <a:rPr lang="en-US" dirty="0" smtClean="0"/>
-              <a:t> and then </a:t>
-            </a:r>
-            <a:r>
-              <a:rPr lang="en-US" u="sng" dirty="0" smtClean="0"/>
-              <a:t>why</a:t>
-            </a:r>
-            <a:r>
-              <a:rPr lang="en-US" dirty="0" smtClean="0"/>
-              <a:t> it is slow</a:t>
-            </a:r>
-          </a:p>
-          <a:p>
-            <a:pPr lvl="1"/>
-            <a:r>
-              <a:rPr lang="en-US" dirty="0" smtClean="0"/>
-              <a:t>You could spend hours optimizing a routine that wasn’t slow to begin with!</a:t>
-            </a:r>
-            <a:endParaRPr lang="en-US" dirty="0"/>
-          </a:p>
-        </p:txBody>
-      </p:sp>
-    </p:spTree>
-    <p:extLst>
-      <p:ext uri="{BB962C8B-B14F-4D97-AF65-F5344CB8AC3E}">
-        <p14:creationId xmlns:p14="http://schemas.microsoft.com/office/powerpoint/2010/main" val="3572393508"/>
-      </p:ext>
-    </p:extLst>
-  </p:cSld>
-  <p:clrMapOvr>
-    <a:masterClrMapping/>
-  </p:clrMapOvr>
-  <p:timing>
-    <p:tnLst>
-      <p:par>
-        <p:cTn id="1" dur="indefinite" restart="never" nodeType="tmRoot"/>
-      </p:par>
-    </p:tnLst>
-  </p:timing>
-</p:sld>
-</file>
-
-<file path=ppt/slides/slide29.xml><?xml version="1.0" encoding="utf-8"?>
 <p:sld xmlns:a="http://schemas.openxmlformats.org/drawingml/2006/main" xmlns:r="http://schemas.openxmlformats.org/officeDocument/2006/relationships" xmlns:p="http://schemas.openxmlformats.org/presentationml/2006/main">
   <p:cSld>
     <p:spTree>
@@ -7694,85 +7871,6 @@
 </p:sld>
 </file>
 
-<file path=ppt/slides/slide30.xml><?xml version="1.0" encoding="utf-8"?>
-<p:sld xmlns:a="http://schemas.openxmlformats.org/drawingml/2006/main" xmlns:r="http://schemas.openxmlformats.org/officeDocument/2006/relationships" xmlns:p="http://schemas.openxmlformats.org/presentationml/2006/main">
-  <p:cSld>
-    <p:spTree>
-      <p:nvGrpSpPr>
-        <p:cNvPr id="1" name=""/>
-        <p:cNvGrpSpPr/>
-        <p:nvPr/>
-      </p:nvGrpSpPr>
-      <p:grpSpPr>
-        <a:xfrm>
-          <a:off x="0" y="0"/>
-          <a:ext cx="0" cy="0"/>
-          <a:chOff x="0" y="0"/>
-          <a:chExt cx="0" cy="0"/>
-        </a:xfrm>
-      </p:grpSpPr>
-      <p:sp>
-        <p:nvSpPr>
-          <p:cNvPr id="2" name="Title 1"/>
-          <p:cNvSpPr>
-            <a:spLocks noGrp="1"/>
-          </p:cNvSpPr>
-          <p:nvPr>
-            <p:ph type="title"/>
-          </p:nvPr>
-        </p:nvSpPr>
-        <p:spPr/>
-        <p:txBody>
-          <a:bodyPr/>
-          <a:lstStyle/>
-          <a:p>
-            <a:r>
-              <a:rPr lang="en-US" dirty="0" err="1" smtClean="0"/>
-              <a:t>Cython</a:t>
-            </a:r>
-            <a:endParaRPr lang="en-US" dirty="0"/>
-          </a:p>
-        </p:txBody>
-      </p:sp>
-      <p:sp>
-        <p:nvSpPr>
-          <p:cNvPr id="3" name="Content Placeholder 2"/>
-          <p:cNvSpPr>
-            <a:spLocks noGrp="1"/>
-          </p:cNvSpPr>
-          <p:nvPr>
-            <p:ph idx="1"/>
-          </p:nvPr>
-        </p:nvSpPr>
-        <p:spPr/>
-        <p:txBody>
-          <a:bodyPr/>
-          <a:lstStyle/>
-          <a:p>
-            <a:endParaRPr lang="en-US"/>
-          </a:p>
-        </p:txBody>
-      </p:sp>
-    </p:spTree>
-    <p:extLst>
-      <p:ext uri="{BB962C8B-B14F-4D97-AF65-F5344CB8AC3E}">
-        <p14:creationId xmlns:p14="http://schemas.microsoft.com/office/powerpoint/2010/main" val="1811172399"/>
-      </p:ext>
-    </p:extLst>
-  </p:cSld>
-  <p:clrMapOvr>
-    <a:masterClrMapping/>
-  </p:clrMapOvr>
-  <p:timing>
-    <p:tnLst>
-      <p:par>
-        <p:cTn id="1" dur="indefinite" restart="never" nodeType="tmRoot"/>
-      </p:par>
-    </p:tnLst>
-  </p:timing>
-</p:sld>
-</file>
-
 <file path=ppt/slides/slide4.xml><?xml version="1.0" encoding="utf-8"?>
 <p:sld xmlns:a="http://schemas.openxmlformats.org/drawingml/2006/main" xmlns:r="http://schemas.openxmlformats.org/officeDocument/2006/relationships" xmlns:p="http://schemas.openxmlformats.org/presentationml/2006/main">
   <p:cSld>
@@ -8015,11 +8113,6 @@
               </a:rPr>
               <a:t> collections</a:t>
             </a:r>
-            <a:endParaRPr lang="en-US" dirty="0" smtClean="0">
-              <a:solidFill>
-                <a:schemeClr val="tx2"/>
-              </a:solidFill>
-            </a:endParaRPr>
           </a:p>
           <a:p>
             <a:endParaRPr lang="en-US" dirty="0"/>
@@ -8740,10 +8833,40 @@
           <a:lstStyle/>
           <a:p>
             <a:r>
+              <a:rPr lang="en-US" dirty="0" err="1" smtClean="0"/>
+              <a:t>IPython</a:t>
+            </a:r>
+            <a:r>
+              <a:rPr lang="en-US" dirty="0" smtClean="0"/>
+              <a:t> – more sophisticated interactivity</a:t>
+            </a:r>
+          </a:p>
+          <a:p>
+            <a:r>
+              <a:rPr lang="en-US" dirty="0" err="1" smtClean="0"/>
+              <a:t>Jupyter</a:t>
+            </a:r>
+            <a:r>
+              <a:rPr lang="en-US" dirty="0" smtClean="0"/>
+              <a:t> – a “notebook” interface on top</a:t>
+            </a:r>
+          </a:p>
+          <a:p>
+            <a:r>
+              <a:rPr lang="en-US" dirty="0" smtClean="0"/>
+              <a:t>You can try it: </a:t>
+            </a:r>
+            <a:r>
+              <a:rPr lang="en-US" dirty="0" smtClean="0">
+                <a:hlinkClick r:id="rId2"/>
+              </a:rPr>
+              <a:t>http</a:t>
+            </a:r>
+            <a:r>
               <a:rPr lang="en-US" dirty="0">
                 <a:hlinkClick r:id="rId2"/>
               </a:rPr>
-              <a:t>http://try.jupyter.org</a:t>
+              <a:t>://try.jupyter.org</a:t>
             </a:r>
             <a:r>
               <a:rPr lang="en-US" dirty="0" smtClean="0">
@@ -8759,16 +8882,20 @@
           </a:p>
           <a:p>
             <a:r>
-              <a:rPr lang="en-US" dirty="0" smtClean="0"/>
-              <a:t>Notebook interface</a:t>
-            </a:r>
-          </a:p>
-          <a:p>
-            <a:r>
-              <a:rPr lang="en-US" dirty="0" smtClean="0"/>
-              <a:t>Terminal-in-a-cell trick</a:t>
-            </a:r>
-            <a:endParaRPr lang="en-US" dirty="0"/>
+              <a:rPr lang="en-US" dirty="0"/>
+              <a:t>This is </a:t>
+            </a:r>
+            <a:r>
+              <a:rPr lang="en-US" dirty="0" smtClean="0"/>
+              <a:t>becoming a scientific Python norm, so it’s well worth learning now!</a:t>
+            </a:r>
+            <a:endParaRPr lang="en-US" dirty="0" smtClean="0"/>
+          </a:p>
+          <a:p>
+            <a:r>
+              <a:rPr lang="en-US" dirty="0" smtClean="0"/>
+              <a:t>Demo notebook</a:t>
+            </a:r>
           </a:p>
         </p:txBody>
       </p:sp>
@@ -8785,7 +8912,226 @@
   <p:timing>
     <p:tnLst>
       <p:par>
-        <p:cTn id="1" dur="indefinite" restart="never" nodeType="tmRoot"/>
+        <p:cTn id="1" dur="indefinite" restart="never" nodeType="tmRoot">
+          <p:childTnLst>
+            <p:seq concurrent="1" nextAc="seek">
+              <p:cTn id="2" dur="indefinite" nodeType="mainSeq">
+                <p:childTnLst>
+                  <p:par>
+                    <p:cTn id="3" fill="hold">
+                      <p:stCondLst>
+                        <p:cond delay="indefinite"/>
+                      </p:stCondLst>
+                      <p:childTnLst>
+                        <p:par>
+                          <p:cTn id="4" fill="hold">
+                            <p:stCondLst>
+                              <p:cond delay="0"/>
+                            </p:stCondLst>
+                            <p:childTnLst>
+                              <p:par>
+                                <p:cTn id="5" presetID="1" presetClass="entr" presetSubtype="0" fill="hold" nodeType="clickEffect">
+                                  <p:stCondLst>
+                                    <p:cond delay="0"/>
+                                  </p:stCondLst>
+                                  <p:childTnLst>
+                                    <p:set>
+                                      <p:cBhvr>
+                                        <p:cTn id="6" dur="1" fill="hold">
+                                          <p:stCondLst>
+                                            <p:cond delay="0"/>
+                                          </p:stCondLst>
+                                        </p:cTn>
+                                        <p:tgtEl>
+                                          <p:spTgt spid="3">
+                                            <p:txEl>
+                                              <p:pRg st="1" end="1"/>
+                                            </p:txEl>
+                                          </p:spTgt>
+                                        </p:tgtEl>
+                                        <p:attrNameLst>
+                                          <p:attrName>style.visibility</p:attrName>
+                                        </p:attrNameLst>
+                                      </p:cBhvr>
+                                      <p:to>
+                                        <p:strVal val="visible"/>
+                                      </p:to>
+                                    </p:set>
+                                  </p:childTnLst>
+                                </p:cTn>
+                              </p:par>
+                            </p:childTnLst>
+                          </p:cTn>
+                        </p:par>
+                      </p:childTnLst>
+                    </p:cTn>
+                  </p:par>
+                  <p:par>
+                    <p:cTn id="7" fill="hold">
+                      <p:stCondLst>
+                        <p:cond delay="indefinite"/>
+                      </p:stCondLst>
+                      <p:childTnLst>
+                        <p:par>
+                          <p:cTn id="8" fill="hold">
+                            <p:stCondLst>
+                              <p:cond delay="0"/>
+                            </p:stCondLst>
+                            <p:childTnLst>
+                              <p:par>
+                                <p:cTn id="9" presetID="1" presetClass="entr" presetSubtype="0" fill="hold" nodeType="clickEffect">
+                                  <p:stCondLst>
+                                    <p:cond delay="0"/>
+                                  </p:stCondLst>
+                                  <p:childTnLst>
+                                    <p:set>
+                                      <p:cBhvr>
+                                        <p:cTn id="10" dur="1" fill="hold">
+                                          <p:stCondLst>
+                                            <p:cond delay="0"/>
+                                          </p:stCondLst>
+                                        </p:cTn>
+                                        <p:tgtEl>
+                                          <p:spTgt spid="3">
+                                            <p:txEl>
+                                              <p:pRg st="2" end="2"/>
+                                            </p:txEl>
+                                          </p:spTgt>
+                                        </p:tgtEl>
+                                        <p:attrNameLst>
+                                          <p:attrName>style.visibility</p:attrName>
+                                        </p:attrNameLst>
+                                      </p:cBhvr>
+                                      <p:to>
+                                        <p:strVal val="visible"/>
+                                      </p:to>
+                                    </p:set>
+                                  </p:childTnLst>
+                                </p:cTn>
+                              </p:par>
+                            </p:childTnLst>
+                          </p:cTn>
+                        </p:par>
+                      </p:childTnLst>
+                    </p:cTn>
+                  </p:par>
+                  <p:par>
+                    <p:cTn id="11" fill="hold">
+                      <p:stCondLst>
+                        <p:cond delay="indefinite"/>
+                      </p:stCondLst>
+                      <p:childTnLst>
+                        <p:par>
+                          <p:cTn id="12" fill="hold">
+                            <p:stCondLst>
+                              <p:cond delay="0"/>
+                            </p:stCondLst>
+                            <p:childTnLst>
+                              <p:par>
+                                <p:cTn id="13" presetID="1" presetClass="entr" presetSubtype="0" fill="hold" nodeType="clickEffect">
+                                  <p:stCondLst>
+                                    <p:cond delay="0"/>
+                                  </p:stCondLst>
+                                  <p:childTnLst>
+                                    <p:set>
+                                      <p:cBhvr>
+                                        <p:cTn id="14" dur="1" fill="hold">
+                                          <p:stCondLst>
+                                            <p:cond delay="0"/>
+                                          </p:stCondLst>
+                                        </p:cTn>
+                                        <p:tgtEl>
+                                          <p:spTgt spid="3">
+                                            <p:txEl>
+                                              <p:pRg st="3" end="3"/>
+                                            </p:txEl>
+                                          </p:spTgt>
+                                        </p:tgtEl>
+                                        <p:attrNameLst>
+                                          <p:attrName>style.visibility</p:attrName>
+                                        </p:attrNameLst>
+                                      </p:cBhvr>
+                                      <p:to>
+                                        <p:strVal val="visible"/>
+                                      </p:to>
+                                    </p:set>
+                                  </p:childTnLst>
+                                </p:cTn>
+                              </p:par>
+                            </p:childTnLst>
+                          </p:cTn>
+                        </p:par>
+                      </p:childTnLst>
+                    </p:cTn>
+                  </p:par>
+                  <p:par>
+                    <p:cTn id="15" fill="hold">
+                      <p:stCondLst>
+                        <p:cond delay="indefinite"/>
+                      </p:stCondLst>
+                      <p:childTnLst>
+                        <p:par>
+                          <p:cTn id="16" fill="hold">
+                            <p:stCondLst>
+                              <p:cond delay="0"/>
+                            </p:stCondLst>
+                            <p:childTnLst>
+                              <p:par>
+                                <p:cTn id="17" presetID="1" presetClass="entr" presetSubtype="0" fill="hold" nodeType="clickEffect">
+                                  <p:stCondLst>
+                                    <p:cond delay="0"/>
+                                  </p:stCondLst>
+                                  <p:childTnLst>
+                                    <p:set>
+                                      <p:cBhvr>
+                                        <p:cTn id="18" dur="1" fill="hold">
+                                          <p:stCondLst>
+                                            <p:cond delay="0"/>
+                                          </p:stCondLst>
+                                        </p:cTn>
+                                        <p:tgtEl>
+                                          <p:spTgt spid="3">
+                                            <p:txEl>
+                                              <p:pRg st="4" end="4"/>
+                                            </p:txEl>
+                                          </p:spTgt>
+                                        </p:tgtEl>
+                                        <p:attrNameLst>
+                                          <p:attrName>style.visibility</p:attrName>
+                                        </p:attrNameLst>
+                                      </p:cBhvr>
+                                      <p:to>
+                                        <p:strVal val="visible"/>
+                                      </p:to>
+                                    </p:set>
+                                  </p:childTnLst>
+                                </p:cTn>
+                              </p:par>
+                            </p:childTnLst>
+                          </p:cTn>
+                        </p:par>
+                      </p:childTnLst>
+                    </p:cTn>
+                  </p:par>
+                </p:childTnLst>
+              </p:cTn>
+              <p:prevCondLst>
+                <p:cond evt="onPrev" delay="0">
+                  <p:tgtEl>
+                    <p:sldTgt/>
+                  </p:tgtEl>
+                </p:cond>
+              </p:prevCondLst>
+              <p:nextCondLst>
+                <p:cond evt="onNext" delay="0">
+                  <p:tgtEl>
+                    <p:sldTgt/>
+                  </p:tgtEl>
+                </p:cond>
+              </p:nextCondLst>
+            </p:seq>
+          </p:childTnLst>
+        </p:cTn>
       </p:par>
     </p:tnLst>
   </p:timing>
@@ -9164,57 +9510,76 @@
           <a:p>
             <a:r>
               <a:rPr lang="en-US" dirty="0" smtClean="0"/>
-              <a:t>Crash-course notebook intro to </a:t>
-            </a:r>
-            <a:r>
-              <a:rPr lang="en-US" dirty="0" err="1" smtClean="0"/>
+              <a:t>Crash-course </a:t>
+            </a:r>
+            <a:r>
+              <a:rPr lang="en-US" dirty="0" smtClean="0"/>
+              <a:t>intro </a:t>
+            </a:r>
+            <a:r>
+              <a:rPr lang="en-US" dirty="0" smtClean="0"/>
+              <a:t>to </a:t>
+            </a:r>
+            <a:r>
+              <a:rPr lang="en-US" dirty="0" err="1" smtClean="0">
+                <a:solidFill>
+                  <a:schemeClr val="tx2"/>
+                </a:solidFill>
+              </a:rPr>
               <a:t>numpy</a:t>
             </a:r>
             <a:r>
               <a:rPr lang="en-US" dirty="0" smtClean="0"/>
-              <a:t>: </a:t>
+              <a:t>, see </a:t>
+            </a:r>
+            <a:r>
+              <a:rPr lang="en-US" dirty="0" err="1" smtClean="0">
+                <a:solidFill>
+                  <a:schemeClr val="tx2"/>
+                </a:solidFill>
+              </a:rPr>
+              <a:t>numpy</a:t>
             </a:r>
             <a:r>
               <a:rPr lang="en-US" dirty="0" smtClean="0">
-                <a:hlinkClick r:id="rId2"/>
+                <a:solidFill>
+                  <a:schemeClr val="tx2"/>
+                </a:solidFill>
               </a:rPr>
-              <a:t>https</a:t>
+              <a:t>/</a:t>
+            </a:r>
+            <a:r>
+              <a:rPr lang="en-US" dirty="0" err="1" smtClean="0">
+                <a:solidFill>
+                  <a:schemeClr val="tx2"/>
+                </a:solidFill>
+              </a:rPr>
+              <a:t>numpy_intro.ipynb</a:t>
+            </a:r>
+            <a:endParaRPr lang="en-US" dirty="0" smtClean="0">
+              <a:solidFill>
+                <a:schemeClr val="tx2"/>
+              </a:solidFill>
+            </a:endParaRPr>
+          </a:p>
+          <a:p>
+            <a:r>
+              <a:rPr lang="en-US" dirty="0" smtClean="0"/>
+              <a:t>Lots more info </a:t>
+            </a:r>
+            <a:r>
+              <a:rPr lang="en-US" dirty="0"/>
+              <a:t>in </a:t>
             </a:r>
             <a:r>
               <a:rPr lang="en-US" dirty="0">
                 <a:hlinkClick r:id="rId2"/>
               </a:rPr>
-              <a:t>://</a:t>
+              <a:t>official </a:t>
             </a:r>
             <a:r>
               <a:rPr lang="en-US" dirty="0" smtClean="0">
                 <a:hlinkClick r:id="rId2"/>
-              </a:rPr>
-              <a:t>git.io/vi4sE</a:t>
-            </a:r>
-            <a:r>
-              <a:rPr lang="en-US" dirty="0" smtClean="0"/>
-              <a:t> </a:t>
-            </a:r>
-          </a:p>
-          <a:p>
-            <a:r>
-              <a:rPr lang="en-US" dirty="0" smtClean="0"/>
-              <a:t>Lots more info </a:t>
-            </a:r>
-            <a:r>
-              <a:rPr lang="en-US" dirty="0"/>
-              <a:t>in </a:t>
-            </a:r>
-            <a:r>
-              <a:rPr lang="en-US" dirty="0">
-                <a:hlinkClick r:id="rId3"/>
-              </a:rPr>
-              <a:t>official </a:t>
-            </a:r>
-            <a:r>
-              <a:rPr lang="en-US" dirty="0" smtClean="0">
-                <a:hlinkClick r:id="rId3"/>
               </a:rPr>
               <a:t>docs</a:t>
             </a:r>

</xml_diff>